<commit_message>
Pt2 lecture 4: hashtables. Presentation minor fixes
</commit_message>
<xml_diff>
--- a/pt2/lectures/lecture4/lecture4.pptx
+++ b/pt2/lectures/lecture4/lecture4.pptx
@@ -212,7 +212,7 @@
           <a:p>
             <a:fld id="{7AB54776-5C19-4010-B03E-1D9819AD498B}" type="datetimeFigureOut">
               <a:rPr lang="en-US" smtClean="0"/>
-              <a:t>10/14/2021</a:t>
+              <a:t>10/13/2022</a:t>
             </a:fld>
             <a:endParaRPr lang="en-US"/>
           </a:p>
@@ -1286,7 +1286,7 @@
           <a:p>
             <a:fld id="{78B714E4-0873-4C87-8B25-50C01080B0FC}" type="datetimeFigureOut">
               <a:rPr lang="en-US" smtClean="0"/>
-              <a:t>10/14/2021</a:t>
+              <a:t>10/13/2022</a:t>
             </a:fld>
             <a:endParaRPr lang="en-US"/>
           </a:p>
@@ -1537,7 +1537,7 @@
           <a:p>
             <a:fld id="{78B714E4-0873-4C87-8B25-50C01080B0FC}" type="datetimeFigureOut">
               <a:rPr lang="en-US" smtClean="0"/>
-              <a:t>10/14/2021</a:t>
+              <a:t>10/13/2022</a:t>
             </a:fld>
             <a:endParaRPr lang="en-US"/>
           </a:p>
@@ -1851,7 +1851,7 @@
           <a:p>
             <a:fld id="{78B714E4-0873-4C87-8B25-50C01080B0FC}" type="datetimeFigureOut">
               <a:rPr lang="en-US" smtClean="0"/>
-              <a:t>10/14/2021</a:t>
+              <a:t>10/13/2022</a:t>
             </a:fld>
             <a:endParaRPr lang="en-US"/>
           </a:p>
@@ -2192,7 +2192,7 @@
           <a:p>
             <a:fld id="{78B714E4-0873-4C87-8B25-50C01080B0FC}" type="datetimeFigureOut">
               <a:rPr lang="en-US" smtClean="0"/>
-              <a:t>10/14/2021</a:t>
+              <a:t>10/13/2022</a:t>
             </a:fld>
             <a:endParaRPr lang="en-US"/>
           </a:p>
@@ -2506,7 +2506,7 @@
           <a:p>
             <a:fld id="{78B714E4-0873-4C87-8B25-50C01080B0FC}" type="datetimeFigureOut">
               <a:rPr lang="en-US" smtClean="0"/>
-              <a:t>10/14/2021</a:t>
+              <a:t>10/13/2022</a:t>
             </a:fld>
             <a:endParaRPr lang="en-US"/>
           </a:p>
@@ -2899,7 +2899,7 @@
           <a:p>
             <a:fld id="{78B714E4-0873-4C87-8B25-50C01080B0FC}" type="datetimeFigureOut">
               <a:rPr lang="en-US" smtClean="0"/>
-              <a:t>10/14/2021</a:t>
+              <a:t>10/13/2022</a:t>
             </a:fld>
             <a:endParaRPr lang="en-US"/>
           </a:p>
@@ -3069,7 +3069,7 @@
           <a:p>
             <a:fld id="{78B714E4-0873-4C87-8B25-50C01080B0FC}" type="datetimeFigureOut">
               <a:rPr lang="en-US" smtClean="0"/>
-              <a:t>10/14/2021</a:t>
+              <a:t>10/13/2022</a:t>
             </a:fld>
             <a:endParaRPr lang="en-US"/>
           </a:p>
@@ -3249,7 +3249,7 @@
           <a:p>
             <a:fld id="{78B714E4-0873-4C87-8B25-50C01080B0FC}" type="datetimeFigureOut">
               <a:rPr lang="en-US" smtClean="0"/>
-              <a:t>10/14/2021</a:t>
+              <a:t>10/13/2022</a:t>
             </a:fld>
             <a:endParaRPr lang="en-US"/>
           </a:p>
@@ -3425,7 +3425,7 @@
           <a:p>
             <a:fld id="{78B714E4-0873-4C87-8B25-50C01080B0FC}" type="datetimeFigureOut">
               <a:rPr lang="en-US" smtClean="0"/>
-              <a:t>10/14/2021</a:t>
+              <a:t>10/13/2022</a:t>
             </a:fld>
             <a:endParaRPr lang="en-US"/>
           </a:p>
@@ -3672,7 +3672,7 @@
           <a:p>
             <a:fld id="{78B714E4-0873-4C87-8B25-50C01080B0FC}" type="datetimeFigureOut">
               <a:rPr lang="en-US" smtClean="0"/>
-              <a:t>10/14/2021</a:t>
+              <a:t>10/13/2022</a:t>
             </a:fld>
             <a:endParaRPr lang="en-US"/>
           </a:p>
@@ -3904,7 +3904,7 @@
           <a:p>
             <a:fld id="{78B714E4-0873-4C87-8B25-50C01080B0FC}" type="datetimeFigureOut">
               <a:rPr lang="en-US" smtClean="0"/>
-              <a:t>10/14/2021</a:t>
+              <a:t>10/13/2022</a:t>
             </a:fld>
             <a:endParaRPr lang="en-US"/>
           </a:p>
@@ -4278,7 +4278,7 @@
           <a:p>
             <a:fld id="{78B714E4-0873-4C87-8B25-50C01080B0FC}" type="datetimeFigureOut">
               <a:rPr lang="en-US" smtClean="0"/>
-              <a:t>10/14/2021</a:t>
+              <a:t>10/13/2022</a:t>
             </a:fld>
             <a:endParaRPr lang="en-US"/>
           </a:p>
@@ -4401,7 +4401,7 @@
           <a:p>
             <a:fld id="{78B714E4-0873-4C87-8B25-50C01080B0FC}" type="datetimeFigureOut">
               <a:rPr lang="en-US" smtClean="0"/>
-              <a:t>10/14/2021</a:t>
+              <a:t>10/13/2022</a:t>
             </a:fld>
             <a:endParaRPr lang="en-US"/>
           </a:p>
@@ -4496,7 +4496,7 @@
           <a:p>
             <a:fld id="{78B714E4-0873-4C87-8B25-50C01080B0FC}" type="datetimeFigureOut">
               <a:rPr lang="en-US" smtClean="0"/>
-              <a:t>10/14/2021</a:t>
+              <a:t>10/13/2022</a:t>
             </a:fld>
             <a:endParaRPr lang="en-US"/>
           </a:p>
@@ -4751,7 +4751,7 @@
           <a:p>
             <a:fld id="{78B714E4-0873-4C87-8B25-50C01080B0FC}" type="datetimeFigureOut">
               <a:rPr lang="en-US" smtClean="0"/>
-              <a:t>10/14/2021</a:t>
+              <a:t>10/13/2022</a:t>
             </a:fld>
             <a:endParaRPr lang="en-US"/>
           </a:p>
@@ -5014,7 +5014,7 @@
           <a:p>
             <a:fld id="{78B714E4-0873-4C87-8B25-50C01080B0FC}" type="datetimeFigureOut">
               <a:rPr lang="en-US" smtClean="0"/>
-              <a:t>10/14/2021</a:t>
+              <a:t>10/13/2022</a:t>
             </a:fld>
             <a:endParaRPr lang="en-US"/>
           </a:p>
@@ -5757,7 +5757,7 @@
           <a:p>
             <a:fld id="{78B714E4-0873-4C87-8B25-50C01080B0FC}" type="datetimeFigureOut">
               <a:rPr lang="en-US" smtClean="0"/>
-              <a:t>10/14/2021</a:t>
+              <a:t>10/13/2022</a:t>
             </a:fld>
             <a:endParaRPr lang="en-US"/>
           </a:p>
@@ -6381,16 +6381,16 @@
             </a:r>
           </a:p>
           <a:p>
-            <a:pPr marL="461963" indent="-404813" algn="l">
+            <a:pPr marL="627063" indent="-339725" algn="l">
               <a:buSzPct val="100000"/>
               <a:buFont typeface="Arial" panose="020B0604020202020204" pitchFamily="34" charset="0"/>
               <a:buChar char="•"/>
               <a:tabLst>
-                <a:tab pos="395288" algn="l"/>
+                <a:tab pos="687388" algn="l"/>
               </a:tabLst>
             </a:pPr>
             <a:r>
-              <a:rPr lang="ru-RU" sz="2800" smtClean="0"/>
+              <a:rPr lang="ru-RU" sz="2800" dirty="0" smtClean="0"/>
               <a:t>Неупорядоченные </a:t>
             </a:r>
             <a:r>
@@ -6679,13 +6679,10 @@
                       <m:t>;</m:t>
                     </m:r>
                     <m:r>
-                      <m:rPr>
-                        <m:sty m:val="p"/>
-                      </m:rPr>
-                      <a:rPr lang="en-US" b="0" i="0" smtClean="0">
-                        <a:latin typeface="Cambria Math" panose="02040503050406030204" pitchFamily="18" charset="0"/>
-                      </a:rPr>
-                      <m:t>p</m:t>
+                      <a:rPr lang="en-US" b="0" i="1" smtClean="0">
+                        <a:latin typeface="Cambria Math" panose="02040503050406030204" pitchFamily="18" charset="0"/>
+                      </a:rPr>
+                      <m:t>𝑝</m:t>
                     </m:r>
                     <m:r>
                       <a:rPr lang="en-US" b="0" i="0" smtClean="0">
@@ -7308,269 +7305,297 @@
                 </a14:m>
                 <a:r>
                   <a:rPr lang="ru-RU" b="0" dirty="0" smtClean="0"/>
-                  <a:t>равны, можно представить </a:t>
-                </a:r>
+                  <a:t>равны, можно представить:</a:t>
+                </a:r>
+              </a:p>
+              <a:p>
+                <a:pPr marL="0" indent="0">
+                  <a:buNone/>
+                </a:pPr>
                 <a14:m>
-                  <m:oMath xmlns:m="http://schemas.openxmlformats.org/officeDocument/2006/math">
-                    <m:r>
-                      <a:rPr lang="en-US" i="1" smtClean="0">
-                        <a:latin typeface="Cambria Math" panose="02040503050406030204" pitchFamily="18" charset="0"/>
-                        <a:ea typeface="Cambria Math" panose="02040503050406030204" pitchFamily="18" charset="0"/>
-                      </a:rPr>
-                      <m:t>𝑞</m:t>
-                    </m:r>
-                    <m:r>
-                      <a:rPr lang="en-US" b="0" i="0" smtClean="0">
-                        <a:latin typeface="Cambria Math" panose="02040503050406030204" pitchFamily="18" charset="0"/>
-                        <a:ea typeface="Cambria Math" panose="02040503050406030204" pitchFamily="18" charset="0"/>
-                      </a:rPr>
-                      <m:t>=</m:t>
-                    </m:r>
-                    <m:d>
-                      <m:dPr>
-                        <m:ctrlPr>
-                          <a:rPr lang="en-US" i="1">
-                            <a:latin typeface="Cambria Math" panose="02040503050406030204" pitchFamily="18" charset="0"/>
-                            <a:ea typeface="Cambria Math" panose="02040503050406030204" pitchFamily="18" charset="0"/>
-                          </a:rPr>
-                        </m:ctrlPr>
-                      </m:dPr>
-                      <m:e>
-                        <m:r>
-                          <a:rPr lang="en-US" i="1">
-                            <a:latin typeface="Cambria Math" panose="02040503050406030204" pitchFamily="18" charset="0"/>
-                            <a:ea typeface="Cambria Math" panose="02040503050406030204" pitchFamily="18" charset="0"/>
-                          </a:rPr>
-                          <m:t>𝑎𝑥</m:t>
-                        </m:r>
-                        <m:r>
-                          <a:rPr lang="en-US" i="1">
-                            <a:latin typeface="Cambria Math" panose="02040503050406030204" pitchFamily="18" charset="0"/>
-                            <a:ea typeface="Cambria Math" panose="02040503050406030204" pitchFamily="18" charset="0"/>
-                          </a:rPr>
-                          <m:t>+</m:t>
-                        </m:r>
-                        <m:r>
-                          <a:rPr lang="en-US" i="1">
-                            <a:latin typeface="Cambria Math" panose="02040503050406030204" pitchFamily="18" charset="0"/>
-                            <a:ea typeface="Cambria Math" panose="02040503050406030204" pitchFamily="18" charset="0"/>
-                          </a:rPr>
-                          <m:t>𝑏</m:t>
-                        </m:r>
-                      </m:e>
-                    </m:d>
-                    <m:r>
-                      <a:rPr lang="ru-RU" b="0" i="1" smtClean="0">
-                        <a:latin typeface="Cambria Math" panose="02040503050406030204" pitchFamily="18" charset="0"/>
-                        <a:ea typeface="Cambria Math" panose="02040503050406030204" pitchFamily="18" charset="0"/>
-                      </a:rPr>
-                      <m:t>=</m:t>
-                    </m:r>
-                    <m:r>
-                      <a:rPr lang="en-US" b="0" i="1" smtClean="0">
-                        <a:latin typeface="Cambria Math" panose="02040503050406030204" pitchFamily="18" charset="0"/>
-                        <a:ea typeface="Cambria Math" panose="02040503050406030204" pitchFamily="18" charset="0"/>
-                      </a:rPr>
-                      <m:t>𝑟</m:t>
-                    </m:r>
-                    <m:r>
-                      <a:rPr lang="en-US" b="0" i="1" smtClean="0">
-                        <a:latin typeface="Cambria Math" panose="02040503050406030204" pitchFamily="18" charset="0"/>
-                        <a:ea typeface="Cambria Math" panose="02040503050406030204" pitchFamily="18" charset="0"/>
-                      </a:rPr>
-                      <m:t>+</m:t>
-                    </m:r>
-                    <m:r>
-                      <a:rPr lang="en-US" b="0" i="1" smtClean="0">
-                        <a:latin typeface="Cambria Math" panose="02040503050406030204" pitchFamily="18" charset="0"/>
-                        <a:ea typeface="Cambria Math" panose="02040503050406030204" pitchFamily="18" charset="0"/>
-                      </a:rPr>
-                      <m:t>𝑝𝑛</m:t>
-                    </m:r>
-                    <m:r>
-                      <a:rPr lang="en-US" b="0" i="1" smtClean="0">
-                        <a:latin typeface="Cambria Math" panose="02040503050406030204" pitchFamily="18" charset="0"/>
-                        <a:ea typeface="Cambria Math" panose="02040503050406030204" pitchFamily="18" charset="0"/>
-                      </a:rPr>
-                      <m:t> </m:t>
-                    </m:r>
-                    <m:d>
-                      <m:dPr>
-                        <m:ctrlPr>
-                          <a:rPr lang="en-US" b="0" i="1" smtClean="0">
-                            <a:latin typeface="Cambria Math" panose="02040503050406030204" pitchFamily="18" charset="0"/>
-                            <a:ea typeface="Cambria Math" panose="02040503050406030204" pitchFamily="18" charset="0"/>
-                          </a:rPr>
-                        </m:ctrlPr>
-                      </m:dPr>
-                      <m:e>
-                        <m:r>
-                          <a:rPr lang="en-US" b="0" i="1" smtClean="0">
-                            <a:latin typeface="Cambria Math" panose="02040503050406030204" pitchFamily="18" charset="0"/>
-                            <a:ea typeface="Cambria Math" panose="02040503050406030204" pitchFamily="18" charset="0"/>
-                          </a:rPr>
-                          <m:t>1</m:t>
-                        </m:r>
-                      </m:e>
-                    </m:d>
-                    <m:r>
-                      <a:rPr lang="en-US" b="0" i="1" smtClean="0">
-                        <a:latin typeface="Cambria Math" panose="02040503050406030204" pitchFamily="18" charset="0"/>
-                        <a:ea typeface="Cambria Math" panose="02040503050406030204" pitchFamily="18" charset="0"/>
-                      </a:rPr>
-                      <m:t>; </m:t>
-                    </m:r>
-                    <m:r>
-                      <a:rPr lang="en-US" b="0" i="1" smtClean="0">
-                        <a:latin typeface="Cambria Math" panose="02040503050406030204" pitchFamily="18" charset="0"/>
-                        <a:ea typeface="Cambria Math" panose="02040503050406030204" pitchFamily="18" charset="0"/>
-                      </a:rPr>
-                      <m:t>𝑠</m:t>
-                    </m:r>
-                    <m:r>
-                      <a:rPr lang="en-US" b="0" i="1" smtClean="0">
-                        <a:latin typeface="Cambria Math" panose="02040503050406030204" pitchFamily="18" charset="0"/>
-                        <a:ea typeface="Cambria Math" panose="02040503050406030204" pitchFamily="18" charset="0"/>
-                      </a:rPr>
-                      <m:t>=</m:t>
-                    </m:r>
-                    <m:d>
-                      <m:dPr>
-                        <m:ctrlPr>
-                          <a:rPr lang="en-US" i="1">
-                            <a:latin typeface="Cambria Math" panose="02040503050406030204" pitchFamily="18" charset="0"/>
-                            <a:ea typeface="Cambria Math" panose="02040503050406030204" pitchFamily="18" charset="0"/>
-                          </a:rPr>
-                        </m:ctrlPr>
-                      </m:dPr>
-                      <m:e>
-                        <m:r>
-                          <a:rPr lang="en-US" i="1">
-                            <a:latin typeface="Cambria Math" panose="02040503050406030204" pitchFamily="18" charset="0"/>
-                            <a:ea typeface="Cambria Math" panose="02040503050406030204" pitchFamily="18" charset="0"/>
-                          </a:rPr>
-                          <m:t>𝑎𝑥</m:t>
-                        </m:r>
-                        <m:r>
-                          <a:rPr lang="en-US" i="1">
-                            <a:latin typeface="Cambria Math" panose="02040503050406030204" pitchFamily="18" charset="0"/>
-                            <a:ea typeface="Cambria Math" panose="02040503050406030204" pitchFamily="18" charset="0"/>
-                          </a:rPr>
-                          <m:t>+</m:t>
-                        </m:r>
-                        <m:r>
-                          <a:rPr lang="en-US" i="1">
-                            <a:latin typeface="Cambria Math" panose="02040503050406030204" pitchFamily="18" charset="0"/>
-                            <a:ea typeface="Cambria Math" panose="02040503050406030204" pitchFamily="18" charset="0"/>
-                          </a:rPr>
-                          <m:t>𝑏</m:t>
-                        </m:r>
-                      </m:e>
-                    </m:d>
-                    <m:r>
-                      <a:rPr lang="ru-RU" i="1">
-                        <a:latin typeface="Cambria Math" panose="02040503050406030204" pitchFamily="18" charset="0"/>
-                        <a:ea typeface="Cambria Math" panose="02040503050406030204" pitchFamily="18" charset="0"/>
-                      </a:rPr>
-                      <m:t>=</m:t>
-                    </m:r>
-                    <m:r>
-                      <a:rPr lang="en-US" i="1">
-                        <a:latin typeface="Cambria Math" panose="02040503050406030204" pitchFamily="18" charset="0"/>
-                        <a:ea typeface="Cambria Math" panose="02040503050406030204" pitchFamily="18" charset="0"/>
-                      </a:rPr>
-                      <m:t>𝑟</m:t>
-                    </m:r>
-                    <m:r>
-                      <a:rPr lang="en-US" i="1">
-                        <a:latin typeface="Cambria Math" panose="02040503050406030204" pitchFamily="18" charset="0"/>
-                        <a:ea typeface="Cambria Math" panose="02040503050406030204" pitchFamily="18" charset="0"/>
-                      </a:rPr>
-                      <m:t>+</m:t>
-                    </m:r>
-                    <m:r>
-                      <a:rPr lang="en-US" i="1">
-                        <a:latin typeface="Cambria Math" panose="02040503050406030204" pitchFamily="18" charset="0"/>
-                        <a:ea typeface="Cambria Math" panose="02040503050406030204" pitchFamily="18" charset="0"/>
-                      </a:rPr>
-                      <m:t>𝑝𝑙</m:t>
-                    </m:r>
-                    <m:r>
-                      <a:rPr lang="en-US" b="0" i="1" smtClean="0">
-                        <a:latin typeface="Cambria Math" panose="02040503050406030204" pitchFamily="18" charset="0"/>
-                        <a:ea typeface="Cambria Math" panose="02040503050406030204" pitchFamily="18" charset="0"/>
-                      </a:rPr>
-                      <m:t> </m:t>
-                    </m:r>
-                    <m:d>
-                      <m:dPr>
-                        <m:ctrlPr>
-                          <a:rPr lang="en-US" b="0" i="1" smtClean="0">
-                            <a:latin typeface="Cambria Math" panose="02040503050406030204" pitchFamily="18" charset="0"/>
-                            <a:ea typeface="Cambria Math" panose="02040503050406030204" pitchFamily="18" charset="0"/>
-                          </a:rPr>
-                        </m:ctrlPr>
-                      </m:dPr>
-                      <m:e>
-                        <m:r>
-                          <a:rPr lang="en-US" b="0" i="1" smtClean="0">
-                            <a:latin typeface="Cambria Math" panose="02040503050406030204" pitchFamily="18" charset="0"/>
-                            <a:ea typeface="Cambria Math" panose="02040503050406030204" pitchFamily="18" charset="0"/>
-                          </a:rPr>
-                          <m:t>2</m:t>
-                        </m:r>
-                      </m:e>
-                    </m:d>
-                    <m:r>
-                      <a:rPr lang="en-US" b="0" i="1" smtClean="0">
-                        <a:latin typeface="Cambria Math" panose="02040503050406030204" pitchFamily="18" charset="0"/>
-                        <a:ea typeface="Cambria Math" panose="02040503050406030204" pitchFamily="18" charset="0"/>
-                      </a:rPr>
-                      <m:t>, </m:t>
-                    </m:r>
-                    <m:r>
-                      <a:rPr lang="en-US" b="0" i="1" smtClean="0">
-                        <a:latin typeface="Cambria Math" panose="02040503050406030204" pitchFamily="18" charset="0"/>
-                        <a:ea typeface="Cambria Math" panose="02040503050406030204" pitchFamily="18" charset="0"/>
-                      </a:rPr>
-                      <m:t>𝑛</m:t>
-                    </m:r>
-                    <m:r>
-                      <a:rPr lang="en-US" b="0" i="1" smtClean="0">
-                        <a:latin typeface="Cambria Math" panose="02040503050406030204" pitchFamily="18" charset="0"/>
-                        <a:ea typeface="Cambria Math" panose="02040503050406030204" pitchFamily="18" charset="0"/>
-                      </a:rPr>
-                      <m:t>,</m:t>
-                    </m:r>
-                    <m:r>
-                      <a:rPr lang="en-US" b="0" i="1" smtClean="0">
-                        <a:latin typeface="Cambria Math" panose="02040503050406030204" pitchFamily="18" charset="0"/>
-                        <a:ea typeface="Cambria Math" panose="02040503050406030204" pitchFamily="18" charset="0"/>
-                      </a:rPr>
-                      <m:t>𝑙</m:t>
-                    </m:r>
-                    <m:r>
-                      <a:rPr lang="en-US" b="0" i="1" smtClean="0">
-                        <a:latin typeface="Cambria Math" panose="02040503050406030204" pitchFamily="18" charset="0"/>
-                        <a:ea typeface="Cambria Math" panose="02040503050406030204" pitchFamily="18" charset="0"/>
-                      </a:rPr>
-                      <m:t>∈</m:t>
-                    </m:r>
-                    <m:r>
-                      <a:rPr lang="en-US" b="0" i="1" smtClean="0">
-                        <a:latin typeface="Cambria Math" panose="02040503050406030204" pitchFamily="18" charset="0"/>
-                        <a:ea typeface="Cambria Math" panose="02040503050406030204" pitchFamily="18" charset="0"/>
-                      </a:rPr>
-                      <m:t>𝑍</m:t>
-                    </m:r>
-                    <m:r>
-                      <a:rPr lang="ru-RU" i="1">
-                        <a:latin typeface="Cambria Math" panose="02040503050406030204" pitchFamily="18" charset="0"/>
-                        <a:ea typeface="Cambria Math" panose="02040503050406030204" pitchFamily="18" charset="0"/>
-                      </a:rPr>
-                      <m:t> </m:t>
-                    </m:r>
-                  </m:oMath>
+                  <m:oMathPara xmlns:m="http://schemas.openxmlformats.org/officeDocument/2006/math">
+                    <m:oMathParaPr>
+                      <m:jc m:val="centerGroup"/>
+                    </m:oMathParaPr>
+                    <m:oMath xmlns:m="http://schemas.openxmlformats.org/officeDocument/2006/math">
+                      <m:r>
+                        <a:rPr lang="en-US" i="1" smtClean="0">
+                          <a:latin typeface="Cambria Math" panose="02040503050406030204" pitchFamily="18" charset="0"/>
+                          <a:ea typeface="Cambria Math" panose="02040503050406030204" pitchFamily="18" charset="0"/>
+                        </a:rPr>
+                        <m:t>𝑞</m:t>
+                      </m:r>
+                      <m:r>
+                        <a:rPr lang="en-US" b="0" i="0" smtClean="0">
+                          <a:latin typeface="Cambria Math" panose="02040503050406030204" pitchFamily="18" charset="0"/>
+                          <a:ea typeface="Cambria Math" panose="02040503050406030204" pitchFamily="18" charset="0"/>
+                        </a:rPr>
+                        <m:t>=</m:t>
+                      </m:r>
+                      <m:d>
+                        <m:dPr>
+                          <m:ctrlPr>
+                            <a:rPr lang="en-US" i="1">
+                              <a:latin typeface="Cambria Math" panose="02040503050406030204" pitchFamily="18" charset="0"/>
+                              <a:ea typeface="Cambria Math" panose="02040503050406030204" pitchFamily="18" charset="0"/>
+                            </a:rPr>
+                          </m:ctrlPr>
+                        </m:dPr>
+                        <m:e>
+                          <m:r>
+                            <a:rPr lang="en-US" i="1">
+                              <a:latin typeface="Cambria Math" panose="02040503050406030204" pitchFamily="18" charset="0"/>
+                              <a:ea typeface="Cambria Math" panose="02040503050406030204" pitchFamily="18" charset="0"/>
+                            </a:rPr>
+                            <m:t>𝑎𝑥</m:t>
+                          </m:r>
+                          <m:r>
+                            <a:rPr lang="en-US" i="1">
+                              <a:latin typeface="Cambria Math" panose="02040503050406030204" pitchFamily="18" charset="0"/>
+                              <a:ea typeface="Cambria Math" panose="02040503050406030204" pitchFamily="18" charset="0"/>
+                            </a:rPr>
+                            <m:t>+</m:t>
+                          </m:r>
+                          <m:r>
+                            <a:rPr lang="en-US" i="1">
+                              <a:latin typeface="Cambria Math" panose="02040503050406030204" pitchFamily="18" charset="0"/>
+                              <a:ea typeface="Cambria Math" panose="02040503050406030204" pitchFamily="18" charset="0"/>
+                            </a:rPr>
+                            <m:t>𝑏</m:t>
+                          </m:r>
+                        </m:e>
+                      </m:d>
+                      <m:r>
+                        <a:rPr lang="ru-RU" b="0" i="1" smtClean="0">
+                          <a:latin typeface="Cambria Math" panose="02040503050406030204" pitchFamily="18" charset="0"/>
+                          <a:ea typeface="Cambria Math" panose="02040503050406030204" pitchFamily="18" charset="0"/>
+                        </a:rPr>
+                        <m:t>=</m:t>
+                      </m:r>
+                      <m:r>
+                        <a:rPr lang="en-US" b="0" i="1" smtClean="0">
+                          <a:latin typeface="Cambria Math" panose="02040503050406030204" pitchFamily="18" charset="0"/>
+                          <a:ea typeface="Cambria Math" panose="02040503050406030204" pitchFamily="18" charset="0"/>
+                        </a:rPr>
+                        <m:t>𝑟</m:t>
+                      </m:r>
+                      <m:r>
+                        <a:rPr lang="en-US" b="0" i="1" smtClean="0">
+                          <a:latin typeface="Cambria Math" panose="02040503050406030204" pitchFamily="18" charset="0"/>
+                          <a:ea typeface="Cambria Math" panose="02040503050406030204" pitchFamily="18" charset="0"/>
+                        </a:rPr>
+                        <m:t>+</m:t>
+                      </m:r>
+                      <m:r>
+                        <a:rPr lang="en-US" b="0" i="1" smtClean="0">
+                          <a:latin typeface="Cambria Math" panose="02040503050406030204" pitchFamily="18" charset="0"/>
+                          <a:ea typeface="Cambria Math" panose="02040503050406030204" pitchFamily="18" charset="0"/>
+                        </a:rPr>
+                        <m:t>𝑝𝑛</m:t>
+                      </m:r>
+                      <m:r>
+                        <a:rPr lang="en-US" b="0" i="1" smtClean="0">
+                          <a:latin typeface="Cambria Math" panose="02040503050406030204" pitchFamily="18" charset="0"/>
+                          <a:ea typeface="Cambria Math" panose="02040503050406030204" pitchFamily="18" charset="0"/>
+                        </a:rPr>
+                        <m:t> </m:t>
+                      </m:r>
+                      <m:d>
+                        <m:dPr>
+                          <m:ctrlPr>
+                            <a:rPr lang="en-US" b="0" i="1" smtClean="0">
+                              <a:latin typeface="Cambria Math" panose="02040503050406030204" pitchFamily="18" charset="0"/>
+                              <a:ea typeface="Cambria Math" panose="02040503050406030204" pitchFamily="18" charset="0"/>
+                            </a:rPr>
+                          </m:ctrlPr>
+                        </m:dPr>
+                        <m:e>
+                          <m:r>
+                            <a:rPr lang="en-US" b="0" i="1" smtClean="0">
+                              <a:latin typeface="Cambria Math" panose="02040503050406030204" pitchFamily="18" charset="0"/>
+                              <a:ea typeface="Cambria Math" panose="02040503050406030204" pitchFamily="18" charset="0"/>
+                            </a:rPr>
+                            <m:t>1</m:t>
+                          </m:r>
+                        </m:e>
+                      </m:d>
+                      <m:r>
+                        <a:rPr lang="en-US" b="0" i="1" smtClean="0">
+                          <a:latin typeface="Cambria Math" panose="02040503050406030204" pitchFamily="18" charset="0"/>
+                          <a:ea typeface="Cambria Math" panose="02040503050406030204" pitchFamily="18" charset="0"/>
+                        </a:rPr>
+                        <m:t>; </m:t>
+                      </m:r>
+                    </m:oMath>
+                  </m:oMathPara>
+                </a14:m>
+                <a:endParaRPr lang="ru-RU" b="0" i="1" dirty="0" smtClean="0">
+                  <a:latin typeface="Cambria Math" panose="02040503050406030204" pitchFamily="18" charset="0"/>
+                  <a:ea typeface="Cambria Math" panose="02040503050406030204" pitchFamily="18" charset="0"/>
+                </a:endParaRPr>
+              </a:p>
+              <a:p>
+                <a:pPr marL="0" indent="0">
+                  <a:buNone/>
+                </a:pPr>
+                <a14:m>
+                  <m:oMathPara xmlns:m="http://schemas.openxmlformats.org/officeDocument/2006/math">
+                    <m:oMathParaPr>
+                      <m:jc m:val="centerGroup"/>
+                    </m:oMathParaPr>
+                    <m:oMath xmlns:m="http://schemas.openxmlformats.org/officeDocument/2006/math">
+                      <m:r>
+                        <a:rPr lang="en-US" b="0" i="1" smtClean="0">
+                          <a:latin typeface="Cambria Math" panose="02040503050406030204" pitchFamily="18" charset="0"/>
+                          <a:ea typeface="Cambria Math" panose="02040503050406030204" pitchFamily="18" charset="0"/>
+                        </a:rPr>
+                        <m:t>𝑠</m:t>
+                      </m:r>
+                      <m:r>
+                        <a:rPr lang="en-US" b="0" i="1" smtClean="0">
+                          <a:latin typeface="Cambria Math" panose="02040503050406030204" pitchFamily="18" charset="0"/>
+                          <a:ea typeface="Cambria Math" panose="02040503050406030204" pitchFamily="18" charset="0"/>
+                        </a:rPr>
+                        <m:t>=</m:t>
+                      </m:r>
+                      <m:d>
+                        <m:dPr>
+                          <m:ctrlPr>
+                            <a:rPr lang="en-US" i="1">
+                              <a:latin typeface="Cambria Math" panose="02040503050406030204" pitchFamily="18" charset="0"/>
+                              <a:ea typeface="Cambria Math" panose="02040503050406030204" pitchFamily="18" charset="0"/>
+                            </a:rPr>
+                          </m:ctrlPr>
+                        </m:dPr>
+                        <m:e>
+                          <m:r>
+                            <a:rPr lang="en-US" i="1">
+                              <a:latin typeface="Cambria Math" panose="02040503050406030204" pitchFamily="18" charset="0"/>
+                              <a:ea typeface="Cambria Math" panose="02040503050406030204" pitchFamily="18" charset="0"/>
+                            </a:rPr>
+                            <m:t>𝑎𝑥</m:t>
+                          </m:r>
+                          <m:r>
+                            <a:rPr lang="en-US" i="1">
+                              <a:latin typeface="Cambria Math" panose="02040503050406030204" pitchFamily="18" charset="0"/>
+                              <a:ea typeface="Cambria Math" panose="02040503050406030204" pitchFamily="18" charset="0"/>
+                            </a:rPr>
+                            <m:t>+</m:t>
+                          </m:r>
+                          <m:r>
+                            <a:rPr lang="en-US" i="1">
+                              <a:latin typeface="Cambria Math" panose="02040503050406030204" pitchFamily="18" charset="0"/>
+                              <a:ea typeface="Cambria Math" panose="02040503050406030204" pitchFamily="18" charset="0"/>
+                            </a:rPr>
+                            <m:t>𝑏</m:t>
+                          </m:r>
+                        </m:e>
+                      </m:d>
+                      <m:r>
+                        <a:rPr lang="ru-RU" i="1">
+                          <a:latin typeface="Cambria Math" panose="02040503050406030204" pitchFamily="18" charset="0"/>
+                          <a:ea typeface="Cambria Math" panose="02040503050406030204" pitchFamily="18" charset="0"/>
+                        </a:rPr>
+                        <m:t>=</m:t>
+                      </m:r>
+                      <m:r>
+                        <a:rPr lang="en-US" i="1">
+                          <a:latin typeface="Cambria Math" panose="02040503050406030204" pitchFamily="18" charset="0"/>
+                          <a:ea typeface="Cambria Math" panose="02040503050406030204" pitchFamily="18" charset="0"/>
+                        </a:rPr>
+                        <m:t>𝑟</m:t>
+                      </m:r>
+                      <m:r>
+                        <a:rPr lang="en-US" i="1">
+                          <a:latin typeface="Cambria Math" panose="02040503050406030204" pitchFamily="18" charset="0"/>
+                          <a:ea typeface="Cambria Math" panose="02040503050406030204" pitchFamily="18" charset="0"/>
+                        </a:rPr>
+                        <m:t>+</m:t>
+                      </m:r>
+                      <m:r>
+                        <a:rPr lang="en-US" i="1">
+                          <a:latin typeface="Cambria Math" panose="02040503050406030204" pitchFamily="18" charset="0"/>
+                          <a:ea typeface="Cambria Math" panose="02040503050406030204" pitchFamily="18" charset="0"/>
+                        </a:rPr>
+                        <m:t>𝑝𝑙</m:t>
+                      </m:r>
+                      <m:r>
+                        <a:rPr lang="en-US" b="0" i="1" smtClean="0">
+                          <a:latin typeface="Cambria Math" panose="02040503050406030204" pitchFamily="18" charset="0"/>
+                          <a:ea typeface="Cambria Math" panose="02040503050406030204" pitchFamily="18" charset="0"/>
+                        </a:rPr>
+                        <m:t> </m:t>
+                      </m:r>
+                      <m:d>
+                        <m:dPr>
+                          <m:ctrlPr>
+                            <a:rPr lang="en-US" b="0" i="1" smtClean="0">
+                              <a:latin typeface="Cambria Math" panose="02040503050406030204" pitchFamily="18" charset="0"/>
+                              <a:ea typeface="Cambria Math" panose="02040503050406030204" pitchFamily="18" charset="0"/>
+                            </a:rPr>
+                          </m:ctrlPr>
+                        </m:dPr>
+                        <m:e>
+                          <m:r>
+                            <a:rPr lang="en-US" b="0" i="1" smtClean="0">
+                              <a:latin typeface="Cambria Math" panose="02040503050406030204" pitchFamily="18" charset="0"/>
+                              <a:ea typeface="Cambria Math" panose="02040503050406030204" pitchFamily="18" charset="0"/>
+                            </a:rPr>
+                            <m:t>2</m:t>
+                          </m:r>
+                        </m:e>
+                      </m:d>
+                      <m:r>
+                        <a:rPr lang="en-US" b="0" i="1" smtClean="0">
+                          <a:latin typeface="Cambria Math" panose="02040503050406030204" pitchFamily="18" charset="0"/>
+                          <a:ea typeface="Cambria Math" panose="02040503050406030204" pitchFamily="18" charset="0"/>
+                        </a:rPr>
+                        <m:t>, </m:t>
+                      </m:r>
+                      <m:r>
+                        <a:rPr lang="en-US" b="0" i="1" smtClean="0">
+                          <a:latin typeface="Cambria Math" panose="02040503050406030204" pitchFamily="18" charset="0"/>
+                          <a:ea typeface="Cambria Math" panose="02040503050406030204" pitchFamily="18" charset="0"/>
+                        </a:rPr>
+                        <m:t>𝑛</m:t>
+                      </m:r>
+                      <m:r>
+                        <a:rPr lang="en-US" b="0" i="1" smtClean="0">
+                          <a:latin typeface="Cambria Math" panose="02040503050406030204" pitchFamily="18" charset="0"/>
+                          <a:ea typeface="Cambria Math" panose="02040503050406030204" pitchFamily="18" charset="0"/>
+                        </a:rPr>
+                        <m:t>,</m:t>
+                      </m:r>
+                      <m:r>
+                        <a:rPr lang="en-US" b="0" i="1" smtClean="0">
+                          <a:latin typeface="Cambria Math" panose="02040503050406030204" pitchFamily="18" charset="0"/>
+                          <a:ea typeface="Cambria Math" panose="02040503050406030204" pitchFamily="18" charset="0"/>
+                        </a:rPr>
+                        <m:t>𝑙</m:t>
+                      </m:r>
+                      <m:r>
+                        <a:rPr lang="en-US" b="0" i="1" smtClean="0">
+                          <a:latin typeface="Cambria Math" panose="02040503050406030204" pitchFamily="18" charset="0"/>
+                          <a:ea typeface="Cambria Math" panose="02040503050406030204" pitchFamily="18" charset="0"/>
+                        </a:rPr>
+                        <m:t>∈</m:t>
+                      </m:r>
+                      <m:r>
+                        <a:rPr lang="en-US" b="0" i="1" smtClean="0">
+                          <a:latin typeface="Cambria Math" panose="02040503050406030204" pitchFamily="18" charset="0"/>
+                          <a:ea typeface="Cambria Math" panose="02040503050406030204" pitchFamily="18" charset="0"/>
+                        </a:rPr>
+                        <m:t>𝑍</m:t>
+                      </m:r>
+                      <m:r>
+                        <a:rPr lang="ru-RU" i="1">
+                          <a:latin typeface="Cambria Math" panose="02040503050406030204" pitchFamily="18" charset="0"/>
+                          <a:ea typeface="Cambria Math" panose="02040503050406030204" pitchFamily="18" charset="0"/>
+                        </a:rPr>
+                        <m:t> </m:t>
+                      </m:r>
+                    </m:oMath>
+                  </m:oMathPara>
                 </a14:m>
                 <a:endParaRPr lang="en-US" dirty="0" smtClean="0">
                   <a:ea typeface="Cambria Math" panose="02040503050406030204" pitchFamily="18" charset="0"/>
@@ -7579,186 +7604,196 @@
               <a:p>
                 <a:r>
                   <a:rPr lang="ru-RU" dirty="0" smtClean="0"/>
-                  <a:t>Вычтем из (1) (2): </a:t>
-                </a:r>
+                  <a:t>Вычтем из (1) (2):</a:t>
+                </a:r>
+              </a:p>
+              <a:p>
+                <a:pPr marL="0" indent="0" algn="ctr">
+                  <a:buNone/>
+                </a:pPr>
                 <a14:m>
-                  <m:oMath xmlns:m="http://schemas.openxmlformats.org/officeDocument/2006/math">
-                    <m:r>
-                      <a:rPr lang="en-US" i="1" dirty="0" smtClean="0">
-                        <a:latin typeface="Cambria Math" panose="02040503050406030204" pitchFamily="18" charset="0"/>
-                      </a:rPr>
-                      <m:t>𝑞</m:t>
-                    </m:r>
-                    <m:r>
-                      <a:rPr lang="en-US" b="0" i="1" smtClean="0">
-                        <a:latin typeface="Cambria Math" panose="02040503050406030204" pitchFamily="18" charset="0"/>
-                      </a:rPr>
-                      <m:t>−</m:t>
-                    </m:r>
-                    <m:r>
-                      <a:rPr lang="en-US" b="0" i="1" smtClean="0">
-                        <a:latin typeface="Cambria Math" panose="02040503050406030204" pitchFamily="18" charset="0"/>
-                      </a:rPr>
-                      <m:t>𝑠</m:t>
-                    </m:r>
-                    <m:r>
-                      <a:rPr lang="en-US" b="0" i="1" smtClean="0">
-                        <a:latin typeface="Cambria Math" panose="02040503050406030204" pitchFamily="18" charset="0"/>
-                      </a:rPr>
-                      <m:t>=</m:t>
-                    </m:r>
-                    <m:r>
-                      <a:rPr lang="en-US" b="0" i="1" smtClean="0">
-                        <a:latin typeface="Cambria Math" panose="02040503050406030204" pitchFamily="18" charset="0"/>
-                      </a:rPr>
-                      <m:t>𝑎</m:t>
-                    </m:r>
-                    <m:d>
-                      <m:dPr>
-                        <m:ctrlPr>
-                          <a:rPr lang="en-US" b="0" i="1" smtClean="0">
-                            <a:latin typeface="Cambria Math" panose="02040503050406030204" pitchFamily="18" charset="0"/>
-                          </a:rPr>
-                        </m:ctrlPr>
-                      </m:dPr>
-                      <m:e>
-                        <m:r>
-                          <a:rPr lang="en-US" b="0" i="1" smtClean="0">
-                            <a:latin typeface="Cambria Math" panose="02040503050406030204" pitchFamily="18" charset="0"/>
-                          </a:rPr>
-                          <m:t>𝑥</m:t>
-                        </m:r>
-                        <m:r>
-                          <a:rPr lang="en-US" b="0" i="1" smtClean="0">
-                            <a:latin typeface="Cambria Math" panose="02040503050406030204" pitchFamily="18" charset="0"/>
-                          </a:rPr>
-                          <m:t>−</m:t>
-                        </m:r>
-                        <m:r>
-                          <a:rPr lang="en-US" b="0" i="1" smtClean="0">
-                            <a:latin typeface="Cambria Math" panose="02040503050406030204" pitchFamily="18" charset="0"/>
-                          </a:rPr>
-                          <m:t>𝑦</m:t>
-                        </m:r>
-                      </m:e>
-                    </m:d>
-                    <m:r>
-                      <a:rPr lang="en-US" b="0" i="1" smtClean="0">
-                        <a:latin typeface="Cambria Math" panose="02040503050406030204" pitchFamily="18" charset="0"/>
-                      </a:rPr>
-                      <m:t>=</m:t>
-                    </m:r>
-                    <m:r>
-                      <a:rPr lang="en-US" b="0" i="1" smtClean="0">
-                        <a:latin typeface="Cambria Math" panose="02040503050406030204" pitchFamily="18" charset="0"/>
-                      </a:rPr>
-                      <m:t>𝑝</m:t>
-                    </m:r>
-                    <m:d>
-                      <m:dPr>
-                        <m:ctrlPr>
-                          <a:rPr lang="en-US" b="0" i="1" smtClean="0">
-                            <a:latin typeface="Cambria Math" panose="02040503050406030204" pitchFamily="18" charset="0"/>
-                          </a:rPr>
-                        </m:ctrlPr>
-                      </m:dPr>
-                      <m:e>
-                        <m:r>
-                          <a:rPr lang="en-US" b="0" i="1" smtClean="0">
-                            <a:latin typeface="Cambria Math" panose="02040503050406030204" pitchFamily="18" charset="0"/>
-                          </a:rPr>
-                          <m:t>𝑛</m:t>
-                        </m:r>
-                        <m:r>
-                          <a:rPr lang="en-US" b="0" i="1" smtClean="0">
-                            <a:latin typeface="Cambria Math" panose="02040503050406030204" pitchFamily="18" charset="0"/>
-                          </a:rPr>
-                          <m:t> −</m:t>
-                        </m:r>
-                        <m:r>
-                          <a:rPr lang="en-US" b="0" i="1" smtClean="0">
-                            <a:latin typeface="Cambria Math" panose="02040503050406030204" pitchFamily="18" charset="0"/>
-                          </a:rPr>
-                          <m:t>𝑙</m:t>
-                        </m:r>
-                      </m:e>
-                    </m:d>
-                    <m:r>
-                      <a:rPr lang="en-US" b="0" i="1" smtClean="0">
-                        <a:latin typeface="Cambria Math" panose="02040503050406030204" pitchFamily="18" charset="0"/>
-                        <a:ea typeface="Cambria Math" panose="02040503050406030204" pitchFamily="18" charset="0"/>
-                      </a:rPr>
-                      <m:t>⇒</m:t>
-                    </m:r>
-                    <m:r>
-                      <a:rPr lang="en-US" b="0" i="1" smtClean="0">
-                        <a:latin typeface="Cambria Math" panose="02040503050406030204" pitchFamily="18" charset="0"/>
-                        <a:ea typeface="Cambria Math" panose="02040503050406030204" pitchFamily="18" charset="0"/>
-                      </a:rPr>
-                      <m:t>𝑎</m:t>
-                    </m:r>
-                    <m:d>
-                      <m:dPr>
-                        <m:ctrlPr>
-                          <a:rPr lang="en-US" b="0" i="1" smtClean="0">
-                            <a:latin typeface="Cambria Math" panose="02040503050406030204" pitchFamily="18" charset="0"/>
-                            <a:ea typeface="Cambria Math" panose="02040503050406030204" pitchFamily="18" charset="0"/>
-                          </a:rPr>
-                        </m:ctrlPr>
-                      </m:dPr>
-                      <m:e>
-                        <m:r>
-                          <a:rPr lang="en-US" b="0" i="1" smtClean="0">
-                            <a:latin typeface="Cambria Math" panose="02040503050406030204" pitchFamily="18" charset="0"/>
-                            <a:ea typeface="Cambria Math" panose="02040503050406030204" pitchFamily="18" charset="0"/>
-                          </a:rPr>
-                          <m:t>𝑥</m:t>
-                        </m:r>
-                        <m:r>
-                          <a:rPr lang="en-US" b="0" i="1" smtClean="0">
-                            <a:latin typeface="Cambria Math" panose="02040503050406030204" pitchFamily="18" charset="0"/>
-                            <a:ea typeface="Cambria Math" panose="02040503050406030204" pitchFamily="18" charset="0"/>
-                          </a:rPr>
-                          <m:t>−</m:t>
-                        </m:r>
-                        <m:r>
-                          <a:rPr lang="en-US" b="0" i="1" smtClean="0">
-                            <a:latin typeface="Cambria Math" panose="02040503050406030204" pitchFamily="18" charset="0"/>
-                            <a:ea typeface="Cambria Math" panose="02040503050406030204" pitchFamily="18" charset="0"/>
-                          </a:rPr>
-                          <m:t>𝑦</m:t>
-                        </m:r>
-                      </m:e>
-                    </m:d>
-                    <m:r>
-                      <a:rPr lang="en-US" b="0" i="1" smtClean="0">
-                        <a:latin typeface="Cambria Math" panose="02040503050406030204" pitchFamily="18" charset="0"/>
-                        <a:ea typeface="Cambria Math" panose="02040503050406030204" pitchFamily="18" charset="0"/>
-                      </a:rPr>
-                      <m:t>𝑚𝑜𝑑</m:t>
-                    </m:r>
-                    <m:r>
-                      <a:rPr lang="en-US" b="0" i="1" smtClean="0">
-                        <a:latin typeface="Cambria Math" panose="02040503050406030204" pitchFamily="18" charset="0"/>
-                        <a:ea typeface="Cambria Math" panose="02040503050406030204" pitchFamily="18" charset="0"/>
-                      </a:rPr>
-                      <m:t> </m:t>
-                    </m:r>
-                    <m:r>
-                      <a:rPr lang="en-US" b="0" i="1" smtClean="0">
-                        <a:latin typeface="Cambria Math" panose="02040503050406030204" pitchFamily="18" charset="0"/>
-                        <a:ea typeface="Cambria Math" panose="02040503050406030204" pitchFamily="18" charset="0"/>
-                      </a:rPr>
-                      <m:t>𝑝</m:t>
-                    </m:r>
-                    <m:r>
-                      <a:rPr lang="en-US" b="0" i="1" smtClean="0">
-                        <a:latin typeface="Cambria Math" panose="02040503050406030204" pitchFamily="18" charset="0"/>
-                        <a:ea typeface="Cambria Math" panose="02040503050406030204" pitchFamily="18" charset="0"/>
-                      </a:rPr>
-                      <m:t>=0</m:t>
-                    </m:r>
-                  </m:oMath>
+                  <m:oMathPara xmlns:m="http://schemas.openxmlformats.org/officeDocument/2006/math">
+                    <m:oMathParaPr>
+                      <m:jc m:val="centerGroup"/>
+                    </m:oMathParaPr>
+                    <m:oMath xmlns:m="http://schemas.openxmlformats.org/officeDocument/2006/math">
+                      <m:r>
+                        <a:rPr lang="en-US" i="1" dirty="0" smtClean="0">
+                          <a:latin typeface="Cambria Math" panose="02040503050406030204" pitchFamily="18" charset="0"/>
+                        </a:rPr>
+                        <m:t>𝑞</m:t>
+                      </m:r>
+                      <m:r>
+                        <a:rPr lang="en-US" b="0" i="1" smtClean="0">
+                          <a:latin typeface="Cambria Math" panose="02040503050406030204" pitchFamily="18" charset="0"/>
+                        </a:rPr>
+                        <m:t>−</m:t>
+                      </m:r>
+                      <m:r>
+                        <a:rPr lang="en-US" b="0" i="1" smtClean="0">
+                          <a:latin typeface="Cambria Math" panose="02040503050406030204" pitchFamily="18" charset="0"/>
+                        </a:rPr>
+                        <m:t>𝑠</m:t>
+                      </m:r>
+                      <m:r>
+                        <a:rPr lang="en-US" b="0" i="1" smtClean="0">
+                          <a:latin typeface="Cambria Math" panose="02040503050406030204" pitchFamily="18" charset="0"/>
+                        </a:rPr>
+                        <m:t>=</m:t>
+                      </m:r>
+                      <m:r>
+                        <a:rPr lang="en-US" b="0" i="1" smtClean="0">
+                          <a:latin typeface="Cambria Math" panose="02040503050406030204" pitchFamily="18" charset="0"/>
+                        </a:rPr>
+                        <m:t>𝑎</m:t>
+                      </m:r>
+                      <m:d>
+                        <m:dPr>
+                          <m:ctrlPr>
+                            <a:rPr lang="en-US" b="0" i="1" smtClean="0">
+                              <a:latin typeface="Cambria Math" panose="02040503050406030204" pitchFamily="18" charset="0"/>
+                            </a:rPr>
+                          </m:ctrlPr>
+                        </m:dPr>
+                        <m:e>
+                          <m:r>
+                            <a:rPr lang="en-US" b="0" i="1" smtClean="0">
+                              <a:latin typeface="Cambria Math" panose="02040503050406030204" pitchFamily="18" charset="0"/>
+                            </a:rPr>
+                            <m:t>𝑥</m:t>
+                          </m:r>
+                          <m:r>
+                            <a:rPr lang="en-US" b="0" i="1" smtClean="0">
+                              <a:latin typeface="Cambria Math" panose="02040503050406030204" pitchFamily="18" charset="0"/>
+                            </a:rPr>
+                            <m:t>−</m:t>
+                          </m:r>
+                          <m:r>
+                            <a:rPr lang="en-US" b="0" i="1" smtClean="0">
+                              <a:latin typeface="Cambria Math" panose="02040503050406030204" pitchFamily="18" charset="0"/>
+                            </a:rPr>
+                            <m:t>𝑦</m:t>
+                          </m:r>
+                        </m:e>
+                      </m:d>
+                      <m:r>
+                        <a:rPr lang="en-US" b="0" i="1" smtClean="0">
+                          <a:latin typeface="Cambria Math" panose="02040503050406030204" pitchFamily="18" charset="0"/>
+                        </a:rPr>
+                        <m:t>=</m:t>
+                      </m:r>
+                      <m:r>
+                        <a:rPr lang="en-US" b="0" i="1" smtClean="0">
+                          <a:latin typeface="Cambria Math" panose="02040503050406030204" pitchFamily="18" charset="0"/>
+                        </a:rPr>
+                        <m:t>𝑝</m:t>
+                      </m:r>
+                      <m:d>
+                        <m:dPr>
+                          <m:ctrlPr>
+                            <a:rPr lang="en-US" b="0" i="1" smtClean="0">
+                              <a:latin typeface="Cambria Math" panose="02040503050406030204" pitchFamily="18" charset="0"/>
+                            </a:rPr>
+                          </m:ctrlPr>
+                        </m:dPr>
+                        <m:e>
+                          <m:r>
+                            <a:rPr lang="en-US" b="0" i="1" smtClean="0">
+                              <a:latin typeface="Cambria Math" panose="02040503050406030204" pitchFamily="18" charset="0"/>
+                            </a:rPr>
+                            <m:t>𝑛</m:t>
+                          </m:r>
+                          <m:r>
+                            <a:rPr lang="en-US" b="0" i="1" smtClean="0">
+                              <a:latin typeface="Cambria Math" panose="02040503050406030204" pitchFamily="18" charset="0"/>
+                            </a:rPr>
+                            <m:t> −</m:t>
+                          </m:r>
+                          <m:r>
+                            <a:rPr lang="en-US" b="0" i="1" smtClean="0">
+                              <a:latin typeface="Cambria Math" panose="02040503050406030204" pitchFamily="18" charset="0"/>
+                            </a:rPr>
+                            <m:t>𝑙</m:t>
+                          </m:r>
+                        </m:e>
+                      </m:d>
+                      <m:r>
+                        <a:rPr lang="en-US" b="0" i="1" smtClean="0">
+                          <a:latin typeface="Cambria Math" panose="02040503050406030204" pitchFamily="18" charset="0"/>
+                          <a:ea typeface="Cambria Math" panose="02040503050406030204" pitchFamily="18" charset="0"/>
+                        </a:rPr>
+                        <m:t>⇒</m:t>
+                      </m:r>
+                      <m:r>
+                        <a:rPr lang="en-US" b="0" i="1" smtClean="0">
+                          <a:latin typeface="Cambria Math" panose="02040503050406030204" pitchFamily="18" charset="0"/>
+                          <a:ea typeface="Cambria Math" panose="02040503050406030204" pitchFamily="18" charset="0"/>
+                        </a:rPr>
+                        <m:t>𝑎</m:t>
+                      </m:r>
+                      <m:d>
+                        <m:dPr>
+                          <m:ctrlPr>
+                            <a:rPr lang="en-US" b="0" i="1" smtClean="0">
+                              <a:latin typeface="Cambria Math" panose="02040503050406030204" pitchFamily="18" charset="0"/>
+                              <a:ea typeface="Cambria Math" panose="02040503050406030204" pitchFamily="18" charset="0"/>
+                            </a:rPr>
+                          </m:ctrlPr>
+                        </m:dPr>
+                        <m:e>
+                          <m:r>
+                            <a:rPr lang="en-US" b="0" i="1" smtClean="0">
+                              <a:latin typeface="Cambria Math" panose="02040503050406030204" pitchFamily="18" charset="0"/>
+                              <a:ea typeface="Cambria Math" panose="02040503050406030204" pitchFamily="18" charset="0"/>
+                            </a:rPr>
+                            <m:t>𝑥</m:t>
+                          </m:r>
+                          <m:r>
+                            <a:rPr lang="en-US" b="0" i="1" smtClean="0">
+                              <a:latin typeface="Cambria Math" panose="02040503050406030204" pitchFamily="18" charset="0"/>
+                              <a:ea typeface="Cambria Math" panose="02040503050406030204" pitchFamily="18" charset="0"/>
+                            </a:rPr>
+                            <m:t>−</m:t>
+                          </m:r>
+                          <m:r>
+                            <a:rPr lang="en-US" b="0" i="1" smtClean="0">
+                              <a:latin typeface="Cambria Math" panose="02040503050406030204" pitchFamily="18" charset="0"/>
+                              <a:ea typeface="Cambria Math" panose="02040503050406030204" pitchFamily="18" charset="0"/>
+                            </a:rPr>
+                            <m:t>𝑦</m:t>
+                          </m:r>
+                        </m:e>
+                      </m:d>
+                      <m:r>
+                        <a:rPr lang="en-US" b="0" i="1" smtClean="0">
+                          <a:latin typeface="Cambria Math" panose="02040503050406030204" pitchFamily="18" charset="0"/>
+                          <a:ea typeface="Cambria Math" panose="02040503050406030204" pitchFamily="18" charset="0"/>
+                        </a:rPr>
+                        <m:t>𝑚𝑜𝑑</m:t>
+                      </m:r>
+                      <m:r>
+                        <a:rPr lang="en-US" b="0" i="1" smtClean="0">
+                          <a:latin typeface="Cambria Math" panose="02040503050406030204" pitchFamily="18" charset="0"/>
+                          <a:ea typeface="Cambria Math" panose="02040503050406030204" pitchFamily="18" charset="0"/>
+                        </a:rPr>
+                        <m:t> </m:t>
+                      </m:r>
+                      <m:r>
+                        <a:rPr lang="en-US" b="0" i="1" smtClean="0">
+                          <a:latin typeface="Cambria Math" panose="02040503050406030204" pitchFamily="18" charset="0"/>
+                          <a:ea typeface="Cambria Math" panose="02040503050406030204" pitchFamily="18" charset="0"/>
+                        </a:rPr>
+                        <m:t>𝑝</m:t>
+                      </m:r>
+                      <m:r>
+                        <a:rPr lang="en-US" b="0" i="1" smtClean="0">
+                          <a:latin typeface="Cambria Math" panose="02040503050406030204" pitchFamily="18" charset="0"/>
+                          <a:ea typeface="Cambria Math" panose="02040503050406030204" pitchFamily="18" charset="0"/>
+                        </a:rPr>
+                        <m:t>=0</m:t>
+                      </m:r>
+                    </m:oMath>
+                  </m:oMathPara>
                 </a14:m>
                 <a:endParaRPr lang="en-US" b="0" dirty="0" smtClean="0"/>
               </a:p>
@@ -8492,11 +8527,6 @@
                   <a:rPr lang="en-US" i="1" dirty="0" smtClean="0"/>
                   <a:t>m</a:t>
                 </a:r>
-              </a:p>
-              <a:p>
-                <a:pPr marL="0" indent="0">
-                  <a:buNone/>
-                </a:pPr>
                 <a:endParaRPr lang="en-US" dirty="0"/>
               </a:p>
             </p:txBody>
@@ -8519,7 +8549,7 @@
                 <a:ext cx="11764652" cy="5682512"/>
               </a:xfrm>
               <a:blipFill rotWithShape="0">
-                <a:blip r:embed="rId3"/>
+                <a:blip r:embed="rId2"/>
                 <a:stretch>
                   <a:fillRect l="-104" t="-215" r="-518"/>
                 </a:stretch>
@@ -10960,14 +10990,16 @@
             <p:spPr>
               <a:xfrm>
                 <a:off x="213456" y="878545"/>
-                <a:ext cx="11764652" cy="1836376"/>
+                <a:ext cx="11764652" cy="3879240"/>
               </a:xfrm>
               <a:solidFill>
                 <a:schemeClr val="bg1"/>
               </a:solidFill>
             </p:spPr>
             <p:txBody>
-              <a:bodyPr/>
+              <a:bodyPr>
+                <a:normAutofit/>
+              </a:bodyPr>
               <a:lstStyle/>
               <a:p>
                 <a:r>
@@ -11310,9 +11342,282 @@
                   <a:rPr lang="ru-RU" dirty="0" smtClean="0"/>
                   <a:t>?</a:t>
                 </a:r>
-                <a:endParaRPr lang="en-US" dirty="0"/>
+                <a:endParaRPr lang="en-US" dirty="0" smtClean="0"/>
               </a:p>
               <a:p>
+                <a:r>
+                  <a:rPr lang="en-US" i="1" dirty="0"/>
+                  <a:t>q</a:t>
+                </a:r>
+                <a:r>
+                  <a:rPr lang="en-US" dirty="0"/>
+                  <a:t> – </a:t>
+                </a:r>
+                <a:r>
+                  <a:rPr lang="ru-RU" dirty="0"/>
+                  <a:t>это остаток от деления на </a:t>
+                </a:r>
+                <a:r>
+                  <a:rPr lang="en-US" i="1" dirty="0"/>
+                  <a:t>p</a:t>
+                </a:r>
+                <a:r>
+                  <a:rPr lang="en-US" dirty="0"/>
+                  <a:t>,</a:t>
+                </a:r>
+                <a:r>
+                  <a:rPr lang="ru-RU" dirty="0"/>
+                  <a:t> он не может быть больше, чем </a:t>
+                </a:r>
+                <a:r>
+                  <a:rPr lang="en-US" i="1" dirty="0"/>
+                  <a:t>p</a:t>
+                </a:r>
+                <a:r>
+                  <a:rPr lang="ru-RU" i="1" dirty="0"/>
+                  <a:t> </a:t>
+                </a:r>
+                <a:r>
+                  <a:rPr lang="en-US" i="1" dirty="0"/>
+                  <a:t>-1</a:t>
+                </a:r>
+                <a:endParaRPr lang="ru-RU" i="1" dirty="0"/>
+              </a:p>
+              <a:p>
+                <a:r>
+                  <a:rPr lang="ru-RU" dirty="0"/>
+                  <a:t>Можно предположить для наглядности, что остатки равны 0. Шкалу можно сдвинуть вправо или влево в пределах </a:t>
+                </a:r>
+                <a:r>
+                  <a:rPr lang="en-US" i="1" dirty="0"/>
+                  <a:t>m</a:t>
+                </a:r>
+                <a:r>
+                  <a:rPr lang="en-US" dirty="0"/>
+                  <a:t>, </a:t>
+                </a:r>
+                <a:r>
+                  <a:rPr lang="ru-RU" dirty="0"/>
+                  <a:t>чтобы получить другой остаток</a:t>
+                </a:r>
+              </a:p>
+              <a:p>
+                <a:r>
+                  <a:rPr lang="ru-RU" dirty="0"/>
+                  <a:t>Всего на отрезке </a:t>
+                </a:r>
+                <a:r>
+                  <a:rPr lang="en-US" dirty="0"/>
+                  <a:t>[</a:t>
+                </a:r>
+                <a:r>
+                  <a:rPr lang="en-US" i="1" dirty="0"/>
+                  <a:t>0, p – 1</a:t>
+                </a:r>
+                <a:r>
+                  <a:rPr lang="en-US" dirty="0"/>
+                  <a:t>] </a:t>
+                </a:r>
+                <a:r>
+                  <a:rPr lang="ru-RU" dirty="0"/>
+                  <a:t>таких чисел</a:t>
+                </a:r>
+                <a:r>
+                  <a:rPr lang="en-US" dirty="0"/>
+                  <a:t> :</a:t>
+                </a:r>
+                <a:r>
+                  <a:rPr lang="en-US" dirty="0" smtClean="0"/>
+                  <a:t> </a:t>
+                </a:r>
+                <a14:m>
+                  <m:oMath xmlns:m="http://schemas.openxmlformats.org/officeDocument/2006/math">
+                    <m:r>
+                      <a:rPr lang="en-US" i="1">
+                        <a:latin typeface="Cambria Math" panose="02040503050406030204" pitchFamily="18" charset="0"/>
+                      </a:rPr>
+                      <m:t>𝑠</m:t>
+                    </m:r>
+                    <m:r>
+                      <a:rPr lang="en-US" i="1">
+                        <a:latin typeface="Cambria Math" panose="02040503050406030204" pitchFamily="18" charset="0"/>
+                      </a:rPr>
+                      <m:t>,</m:t>
+                    </m:r>
+                    <m:r>
+                      <a:rPr lang="en-US" i="1">
+                        <a:latin typeface="Cambria Math" panose="02040503050406030204" pitchFamily="18" charset="0"/>
+                      </a:rPr>
+                      <m:t>𝑞</m:t>
+                    </m:r>
+                    <m:r>
+                      <a:rPr lang="en-US" i="1">
+                        <a:latin typeface="Cambria Math" panose="02040503050406030204" pitchFamily="18" charset="0"/>
+                      </a:rPr>
+                      <m:t>:</m:t>
+                    </m:r>
+                    <m:r>
+                      <a:rPr lang="en-US" i="1">
+                        <a:latin typeface="Cambria Math" panose="02040503050406030204" pitchFamily="18" charset="0"/>
+                      </a:rPr>
+                      <m:t>𝑠</m:t>
+                    </m:r>
+                    <m:r>
+                      <a:rPr lang="en-US" i="1">
+                        <a:latin typeface="Cambria Math" panose="02040503050406030204" pitchFamily="18" charset="0"/>
+                        <a:ea typeface="Cambria Math" panose="02040503050406030204" pitchFamily="18" charset="0"/>
+                      </a:rPr>
+                      <m:t>≠</m:t>
+                    </m:r>
+                    <m:r>
+                      <a:rPr lang="en-US" i="1">
+                        <a:latin typeface="Cambria Math" panose="02040503050406030204" pitchFamily="18" charset="0"/>
+                        <a:ea typeface="Cambria Math" panose="02040503050406030204" pitchFamily="18" charset="0"/>
+                      </a:rPr>
+                      <m:t>𝑞</m:t>
+                    </m:r>
+                    <m:r>
+                      <a:rPr lang="en-US" i="1">
+                        <a:latin typeface="Cambria Math" panose="02040503050406030204" pitchFamily="18" charset="0"/>
+                        <a:ea typeface="Cambria Math" panose="02040503050406030204" pitchFamily="18" charset="0"/>
+                      </a:rPr>
+                      <m:t>, </m:t>
+                    </m:r>
+                    <m:r>
+                      <a:rPr lang="en-US" i="1">
+                        <a:latin typeface="Cambria Math" panose="02040503050406030204" pitchFamily="18" charset="0"/>
+                        <a:ea typeface="Cambria Math" panose="02040503050406030204" pitchFamily="18" charset="0"/>
+                      </a:rPr>
+                      <m:t>𝑠</m:t>
+                    </m:r>
+                    <m:r>
+                      <a:rPr lang="en-US" i="1">
+                        <a:latin typeface="Cambria Math" panose="02040503050406030204" pitchFamily="18" charset="0"/>
+                        <a:ea typeface="Cambria Math" panose="02040503050406030204" pitchFamily="18" charset="0"/>
+                      </a:rPr>
+                      <m:t> </m:t>
+                    </m:r>
+                    <m:r>
+                      <a:rPr lang="en-US" i="1">
+                        <a:latin typeface="Cambria Math" panose="02040503050406030204" pitchFamily="18" charset="0"/>
+                        <a:ea typeface="Cambria Math" panose="02040503050406030204" pitchFamily="18" charset="0"/>
+                      </a:rPr>
+                      <m:t>𝑚𝑜𝑑</m:t>
+                    </m:r>
+                    <m:r>
+                      <a:rPr lang="en-US" i="1">
+                        <a:latin typeface="Cambria Math" panose="02040503050406030204" pitchFamily="18" charset="0"/>
+                        <a:ea typeface="Cambria Math" panose="02040503050406030204" pitchFamily="18" charset="0"/>
+                      </a:rPr>
+                      <m:t> </m:t>
+                    </m:r>
+                    <m:r>
+                      <a:rPr lang="en-US" i="1">
+                        <a:latin typeface="Cambria Math" panose="02040503050406030204" pitchFamily="18" charset="0"/>
+                        <a:ea typeface="Cambria Math" panose="02040503050406030204" pitchFamily="18" charset="0"/>
+                      </a:rPr>
+                      <m:t>𝑚</m:t>
+                    </m:r>
+                    <m:r>
+                      <a:rPr lang="en-US" i="1">
+                        <a:latin typeface="Cambria Math" panose="02040503050406030204" pitchFamily="18" charset="0"/>
+                        <a:ea typeface="Cambria Math" panose="02040503050406030204" pitchFamily="18" charset="0"/>
+                      </a:rPr>
+                      <m:t>=</m:t>
+                    </m:r>
+                    <m:r>
+                      <a:rPr lang="en-US" i="1">
+                        <a:latin typeface="Cambria Math" panose="02040503050406030204" pitchFamily="18" charset="0"/>
+                        <a:ea typeface="Cambria Math" panose="02040503050406030204" pitchFamily="18" charset="0"/>
+                      </a:rPr>
+                      <m:t>𝑞</m:t>
+                    </m:r>
+                    <m:r>
+                      <a:rPr lang="en-US" i="1">
+                        <a:latin typeface="Cambria Math" panose="02040503050406030204" pitchFamily="18" charset="0"/>
+                        <a:ea typeface="Cambria Math" panose="02040503050406030204" pitchFamily="18" charset="0"/>
+                      </a:rPr>
+                      <m:t> </m:t>
+                    </m:r>
+                    <m:r>
+                      <a:rPr lang="en-US" i="1">
+                        <a:latin typeface="Cambria Math" panose="02040503050406030204" pitchFamily="18" charset="0"/>
+                        <a:ea typeface="Cambria Math" panose="02040503050406030204" pitchFamily="18" charset="0"/>
+                      </a:rPr>
+                      <m:t>𝑚𝑜𝑑</m:t>
+                    </m:r>
+                    <m:r>
+                      <a:rPr lang="en-US" i="1">
+                        <a:latin typeface="Cambria Math" panose="02040503050406030204" pitchFamily="18" charset="0"/>
+                        <a:ea typeface="Cambria Math" panose="02040503050406030204" pitchFamily="18" charset="0"/>
+                      </a:rPr>
+                      <m:t> </m:t>
+                    </m:r>
+                    <m:r>
+                      <a:rPr lang="en-US" i="1">
+                        <a:latin typeface="Cambria Math" panose="02040503050406030204" pitchFamily="18" charset="0"/>
+                        <a:ea typeface="Cambria Math" panose="02040503050406030204" pitchFamily="18" charset="0"/>
+                      </a:rPr>
+                      <m:t>𝑚</m:t>
+                    </m:r>
+                  </m:oMath>
+                </a14:m>
+                <a:r>
+                  <a:rPr lang="en-US" dirty="0"/>
+                  <a:t> </a:t>
+                </a:r>
+                <a:r>
+                  <a:rPr lang="ru-RU" dirty="0"/>
+                  <a:t>не более </a:t>
+                </a:r>
+                <a14:m>
+                  <m:oMath xmlns:m="http://schemas.openxmlformats.org/officeDocument/2006/math">
+                    <m:d>
+                      <m:dPr>
+                        <m:begChr m:val="⌈"/>
+                        <m:endChr m:val="⌉"/>
+                        <m:ctrlPr>
+                          <a:rPr lang="en-US" i="1">
+                            <a:latin typeface="Cambria Math" panose="02040503050406030204" pitchFamily="18" charset="0"/>
+                          </a:rPr>
+                        </m:ctrlPr>
+                      </m:dPr>
+                      <m:e>
+                        <m:f>
+                          <m:fPr>
+                            <m:ctrlPr>
+                              <a:rPr lang="en-US" i="1">
+                                <a:latin typeface="Cambria Math" panose="02040503050406030204" pitchFamily="18" charset="0"/>
+                              </a:rPr>
+                            </m:ctrlPr>
+                          </m:fPr>
+                          <m:num>
+                            <m:r>
+                              <a:rPr lang="en-US" i="1">
+                                <a:latin typeface="Cambria Math" panose="02040503050406030204" pitchFamily="18" charset="0"/>
+                              </a:rPr>
+                              <m:t>𝑝</m:t>
+                            </m:r>
+                          </m:num>
+                          <m:den>
+                            <m:r>
+                              <a:rPr lang="en-US" i="1">
+                                <a:latin typeface="Cambria Math" panose="02040503050406030204" pitchFamily="18" charset="0"/>
+                              </a:rPr>
+                              <m:t>𝑚</m:t>
+                            </m:r>
+                          </m:den>
+                        </m:f>
+                      </m:e>
+                    </m:d>
+                    <m:r>
+                      <a:rPr lang="en-US" i="1">
+                        <a:latin typeface="Cambria Math" panose="02040503050406030204" pitchFamily="18" charset="0"/>
+                      </a:rPr>
+                      <m:t>−1</m:t>
+                    </m:r>
+                  </m:oMath>
+                </a14:m>
                 <a:endParaRPr lang="en-US" dirty="0"/>
               </a:p>
             </p:txBody>
@@ -11332,12 +11637,12 @@
             <p:spPr>
               <a:xfrm>
                 <a:off x="213456" y="878545"/>
-                <a:ext cx="11764652" cy="1836376"/>
+                <a:ext cx="11764652" cy="3879240"/>
               </a:xfrm>
               <a:blipFill rotWithShape="0">
                 <a:blip r:embed="rId2"/>
                 <a:stretch>
-                  <a:fillRect l="-104" t="-1993" r="-622"/>
+                  <a:fillRect l="-104" t="-943" r="-622"/>
                 </a:stretch>
               </a:blipFill>
             </p:spPr>
@@ -11479,13 +11784,13 @@
       </p:sp>
       <p:cxnSp>
         <p:nvCxnSpPr>
-          <p:cNvPr id="6" name="Прямая со стрелкой 5"/>
+          <p:cNvPr id="43" name="Прямая со стрелкой 42"/>
           <p:cNvCxnSpPr/>
           <p:nvPr/>
         </p:nvCxnSpPr>
         <p:spPr>
           <a:xfrm>
-            <a:off x="523329" y="3282071"/>
+            <a:off x="505913" y="5697588"/>
             <a:ext cx="5391777" cy="44613"/>
           </a:xfrm>
           <a:prstGeom prst="straightConnector1">
@@ -11512,13 +11817,13 @@
       </p:cxnSp>
       <p:cxnSp>
         <p:nvCxnSpPr>
-          <p:cNvPr id="9" name="Прямая соединительная линия 8"/>
+          <p:cNvPr id="44" name="Прямая соединительная линия 43"/>
           <p:cNvCxnSpPr/>
           <p:nvPr/>
         </p:nvCxnSpPr>
         <p:spPr>
           <a:xfrm flipH="1">
-            <a:off x="797649" y="3164723"/>
+            <a:off x="780233" y="5580240"/>
             <a:ext cx="1524" cy="227076"/>
           </a:xfrm>
           <a:prstGeom prst="line">
@@ -11542,13 +11847,13 @@
       </p:cxnSp>
       <p:cxnSp>
         <p:nvCxnSpPr>
-          <p:cNvPr id="11" name="Прямая соединительная линия 10"/>
+          <p:cNvPr id="45" name="Прямая соединительная линия 44"/>
           <p:cNvCxnSpPr/>
           <p:nvPr/>
         </p:nvCxnSpPr>
         <p:spPr>
           <a:xfrm flipH="1">
-            <a:off x="1727289" y="3164723"/>
+            <a:off x="1709873" y="5580240"/>
             <a:ext cx="1524" cy="227076"/>
           </a:xfrm>
           <a:prstGeom prst="line">
@@ -11572,13 +11877,13 @@
       </p:cxnSp>
       <p:cxnSp>
         <p:nvCxnSpPr>
-          <p:cNvPr id="12" name="Прямая соединительная линия 11"/>
+          <p:cNvPr id="46" name="Прямая соединительная линия 45"/>
           <p:cNvCxnSpPr/>
           <p:nvPr/>
         </p:nvCxnSpPr>
         <p:spPr>
           <a:xfrm flipH="1">
-            <a:off x="2656929" y="3192351"/>
+            <a:off x="2639513" y="5607868"/>
             <a:ext cx="1524" cy="227076"/>
           </a:xfrm>
           <a:prstGeom prst="line">
@@ -11602,13 +11907,13 @@
       </p:cxnSp>
       <p:cxnSp>
         <p:nvCxnSpPr>
-          <p:cNvPr id="13" name="Прямая соединительная линия 12"/>
+          <p:cNvPr id="47" name="Прямая соединительная линия 46"/>
           <p:cNvCxnSpPr/>
           <p:nvPr/>
         </p:nvCxnSpPr>
         <p:spPr>
           <a:xfrm flipH="1">
-            <a:off x="3586569" y="3192351"/>
+            <a:off x="3569153" y="5607868"/>
             <a:ext cx="1524" cy="227076"/>
           </a:xfrm>
           <a:prstGeom prst="line">
@@ -11632,13 +11937,13 @@
       </p:cxnSp>
       <p:cxnSp>
         <p:nvCxnSpPr>
-          <p:cNvPr id="16" name="Прямая соединительная линия 15"/>
+          <p:cNvPr id="48" name="Прямая соединительная линия 47"/>
           <p:cNvCxnSpPr/>
           <p:nvPr/>
         </p:nvCxnSpPr>
         <p:spPr>
           <a:xfrm flipH="1">
-            <a:off x="4516209" y="3192351"/>
+            <a:off x="4498793" y="5607868"/>
             <a:ext cx="1524" cy="227076"/>
           </a:xfrm>
           <a:prstGeom prst="line">
@@ -11662,13 +11967,13 @@
       </p:cxnSp>
       <p:sp>
         <p:nvSpPr>
-          <p:cNvPr id="17" name="TextBox 16"/>
+          <p:cNvPr id="49" name="TextBox 48"/>
           <p:cNvSpPr txBox="1"/>
           <p:nvPr/>
         </p:nvSpPr>
         <p:spPr>
           <a:xfrm>
-            <a:off x="644402" y="3481519"/>
+            <a:off x="626986" y="5897036"/>
             <a:ext cx="306494" cy="369332"/>
           </a:xfrm>
           <a:prstGeom prst="rect">
@@ -11692,13 +11997,13 @@
       </p:sp>
       <p:sp>
         <p:nvSpPr>
-          <p:cNvPr id="18" name="TextBox 17"/>
+          <p:cNvPr id="50" name="TextBox 49"/>
           <p:cNvSpPr txBox="1"/>
           <p:nvPr/>
         </p:nvSpPr>
         <p:spPr>
           <a:xfrm>
-            <a:off x="1574042" y="3481519"/>
+            <a:off x="1556626" y="5897036"/>
             <a:ext cx="377026" cy="369332"/>
           </a:xfrm>
           <a:prstGeom prst="rect">
@@ -11721,13 +12026,13 @@
       </p:sp>
       <p:sp>
         <p:nvSpPr>
-          <p:cNvPr id="19" name="TextBox 18"/>
+          <p:cNvPr id="51" name="TextBox 50"/>
           <p:cNvSpPr txBox="1"/>
           <p:nvPr/>
         </p:nvSpPr>
         <p:spPr>
           <a:xfrm>
-            <a:off x="2468416" y="3509147"/>
+            <a:off x="2451000" y="5924664"/>
             <a:ext cx="498855" cy="369332"/>
           </a:xfrm>
           <a:prstGeom prst="rect">
@@ -11751,13 +12056,13 @@
       </p:sp>
       <p:sp>
         <p:nvSpPr>
-          <p:cNvPr id="20" name="TextBox 19"/>
+          <p:cNvPr id="52" name="TextBox 51"/>
           <p:cNvSpPr txBox="1"/>
           <p:nvPr/>
         </p:nvSpPr>
         <p:spPr>
           <a:xfrm>
-            <a:off x="3398056" y="3489597"/>
+            <a:off x="3380640" y="5905114"/>
             <a:ext cx="354584" cy="369332"/>
           </a:xfrm>
           <a:prstGeom prst="rect">
@@ -11783,14 +12088,14 @@
         <mc:Choice Requires="a14">
           <p:sp>
             <p:nvSpPr>
-              <p:cNvPr id="21" name="TextBox 20"/>
+              <p:cNvPr id="53" name="TextBox 52"/>
               <p:cNvSpPr txBox="1"/>
               <p:nvPr/>
             </p:nvSpPr>
             <p:spPr>
               <a:xfrm>
-                <a:off x="4067689" y="3481519"/>
-                <a:ext cx="897040" cy="492955"/>
+                <a:off x="4050273" y="5897036"/>
+                <a:ext cx="1353512" cy="474361"/>
               </a:xfrm>
               <a:prstGeom prst="rect">
                 <a:avLst/>
@@ -11812,47 +12117,64 @@
                     <m:oMath xmlns:m="http://schemas.openxmlformats.org/officeDocument/2006/math">
                       <m:d>
                         <m:dPr>
-                          <m:begChr m:val="⌈"/>
-                          <m:endChr m:val="⌉"/>
                           <m:ctrlPr>
-                            <a:rPr lang="en-US" i="1" smtClean="0">
+                            <a:rPr lang="ru-RU" i="1" smtClean="0">
                               <a:latin typeface="Cambria Math" panose="02040503050406030204" pitchFamily="18" charset="0"/>
                             </a:rPr>
                           </m:ctrlPr>
                         </m:dPr>
                         <m:e>
-                          <m:f>
-                            <m:fPr>
+                          <m:d>
+                            <m:dPr>
+                              <m:begChr m:val="⌈"/>
+                              <m:endChr m:val="⌉"/>
                               <m:ctrlPr>
                                 <a:rPr lang="en-US" i="1" smtClean="0">
                                   <a:latin typeface="Cambria Math" panose="02040503050406030204" pitchFamily="18" charset="0"/>
                                 </a:rPr>
                               </m:ctrlPr>
-                            </m:fPr>
-                            <m:num>
-                              <m:r>
-                                <a:rPr lang="en-US" b="0" i="1" smtClean="0">
-                                  <a:latin typeface="Cambria Math" panose="02040503050406030204" pitchFamily="18" charset="0"/>
-                                </a:rPr>
-                                <m:t>𝑝</m:t>
-                              </m:r>
-                            </m:num>
-                            <m:den>
-                              <m:r>
-                                <a:rPr lang="en-US" b="0" i="1" smtClean="0">
-                                  <a:latin typeface="Cambria Math" panose="02040503050406030204" pitchFamily="18" charset="0"/>
-                                </a:rPr>
-                                <m:t>𝑚</m:t>
-                              </m:r>
-                            </m:den>
-                          </m:f>
+                            </m:dPr>
+                            <m:e>
+                              <m:f>
+                                <m:fPr>
+                                  <m:ctrlPr>
+                                    <a:rPr lang="en-US" i="1" smtClean="0">
+                                      <a:latin typeface="Cambria Math" panose="02040503050406030204" pitchFamily="18" charset="0"/>
+                                    </a:rPr>
+                                  </m:ctrlPr>
+                                </m:fPr>
+                                <m:num>
+                                  <m:r>
+                                    <a:rPr lang="en-US" b="0" i="1" smtClean="0">
+                                      <a:latin typeface="Cambria Math" panose="02040503050406030204" pitchFamily="18" charset="0"/>
+                                    </a:rPr>
+                                    <m:t>𝑝</m:t>
+                                  </m:r>
+                                </m:num>
+                                <m:den>
+                                  <m:r>
+                                    <a:rPr lang="en-US" b="0" i="1" smtClean="0">
+                                      <a:latin typeface="Cambria Math" panose="02040503050406030204" pitchFamily="18" charset="0"/>
+                                    </a:rPr>
+                                    <m:t>𝑚</m:t>
+                                  </m:r>
+                                </m:den>
+                              </m:f>
+                            </m:e>
+                          </m:d>
+                          <m:r>
+                            <a:rPr lang="en-US" b="0" i="1" smtClean="0">
+                              <a:latin typeface="Cambria Math" panose="02040503050406030204" pitchFamily="18" charset="0"/>
+                            </a:rPr>
+                            <m:t> −1</m:t>
+                          </m:r>
                         </m:e>
                       </m:d>
                       <m:r>
                         <a:rPr lang="en-US" b="0" i="1" smtClean="0">
                           <a:latin typeface="Cambria Math" panose="02040503050406030204" pitchFamily="18" charset="0"/>
                         </a:rPr>
-                        <m:t> −1</m:t>
+                        <m:t>𝑚</m:t>
                       </m:r>
                     </m:oMath>
                   </m:oMathPara>
@@ -11865,7 +12187,7 @@
         <mc:Fallback xmlns="">
           <p:sp>
             <p:nvSpPr>
-              <p:cNvPr id="21" name="TextBox 20"/>
+              <p:cNvPr id="53" name="TextBox 52"/>
               <p:cNvSpPr txBox="1">
                 <a:spLocks noRot="1" noChangeAspect="1" noMove="1" noResize="1" noEditPoints="1" noAdjustHandles="1" noChangeArrowheads="1" noChangeShapeType="1" noTextEdit="1"/>
               </p:cNvSpPr>
@@ -11873,8 +12195,8 @@
             </p:nvSpPr>
             <p:spPr>
               <a:xfrm>
-                <a:off x="4067689" y="3481519"/>
-                <a:ext cx="897040" cy="492955"/>
+                <a:off x="4050273" y="5897036"/>
+                <a:ext cx="1353512" cy="474361"/>
               </a:xfrm>
               <a:prstGeom prst="rect">
                 <a:avLst/>
@@ -11903,13 +12225,13 @@
       </mc:AlternateContent>
       <p:sp>
         <p:nvSpPr>
-          <p:cNvPr id="22" name="TextBox 21"/>
+          <p:cNvPr id="54" name="TextBox 53"/>
           <p:cNvSpPr txBox="1"/>
           <p:nvPr/>
         </p:nvSpPr>
         <p:spPr>
           <a:xfrm>
-            <a:off x="5661139" y="3330399"/>
+            <a:off x="5696246" y="5325514"/>
             <a:ext cx="312906" cy="369332"/>
           </a:xfrm>
           <a:prstGeom prst="rect">
@@ -11932,13 +12254,13 @@
       </p:sp>
       <p:cxnSp>
         <p:nvCxnSpPr>
-          <p:cNvPr id="26" name="Прямая соединительная линия 25"/>
+          <p:cNvPr id="55" name="Прямая соединительная линия 54"/>
           <p:cNvCxnSpPr/>
           <p:nvPr/>
         </p:nvCxnSpPr>
         <p:spPr>
           <a:xfrm flipH="1">
-            <a:off x="4982559" y="3189289"/>
+            <a:off x="4965143" y="5604806"/>
             <a:ext cx="1524" cy="227076"/>
           </a:xfrm>
           <a:prstGeom prst="line">
@@ -11962,13 +12284,13 @@
       </p:cxnSp>
       <p:sp>
         <p:nvSpPr>
-          <p:cNvPr id="27" name="TextBox 26"/>
+          <p:cNvPr id="56" name="TextBox 55"/>
           <p:cNvSpPr txBox="1"/>
           <p:nvPr/>
         </p:nvSpPr>
         <p:spPr>
           <a:xfrm>
-            <a:off x="4733225" y="2775097"/>
+            <a:off x="4715809" y="5190614"/>
             <a:ext cx="588623" cy="369332"/>
           </a:xfrm>
           <a:prstGeom prst="rect">
@@ -11992,13 +12314,13 @@
       </p:sp>
       <p:sp>
         <p:nvSpPr>
-          <p:cNvPr id="28" name="Прямоугольник 27"/>
+          <p:cNvPr id="57" name="Прямоугольник 56"/>
           <p:cNvSpPr/>
           <p:nvPr/>
         </p:nvSpPr>
         <p:spPr>
           <a:xfrm>
-            <a:off x="443052" y="2677393"/>
+            <a:off x="425636" y="5092910"/>
             <a:ext cx="4549581" cy="1215569"/>
           </a:xfrm>
           <a:prstGeom prst="rect">
@@ -12038,336 +12360,522 @@
           </a:p>
         </p:txBody>
       </p:sp>
+      <p:cxnSp>
+        <p:nvCxnSpPr>
+          <p:cNvPr id="58" name="Прямая со стрелкой 57"/>
+          <p:cNvCxnSpPr/>
+          <p:nvPr/>
+        </p:nvCxnSpPr>
+        <p:spPr>
+          <a:xfrm>
+            <a:off x="7011964" y="5684379"/>
+            <a:ext cx="4804065" cy="23148"/>
+          </a:xfrm>
+          <a:prstGeom prst="straightConnector1">
+            <a:avLst/>
+          </a:prstGeom>
+          <a:ln>
+            <a:tailEnd type="triangle"/>
+          </a:ln>
+        </p:spPr>
+        <p:style>
+          <a:lnRef idx="1">
+            <a:schemeClr val="dk1"/>
+          </a:lnRef>
+          <a:fillRef idx="0">
+            <a:schemeClr val="dk1"/>
+          </a:fillRef>
+          <a:effectRef idx="0">
+            <a:schemeClr val="dk1"/>
+          </a:effectRef>
+          <a:fontRef idx="minor">
+            <a:schemeClr val="tx1"/>
+          </a:fontRef>
+        </p:style>
+      </p:cxnSp>
+      <p:cxnSp>
+        <p:nvCxnSpPr>
+          <p:cNvPr id="66" name="Прямая соединительная линия 65"/>
+          <p:cNvCxnSpPr/>
+          <p:nvPr/>
+        </p:nvCxnSpPr>
+        <p:spPr>
+          <a:xfrm flipH="1">
+            <a:off x="7286284" y="5567031"/>
+            <a:ext cx="1524" cy="227076"/>
+          </a:xfrm>
+          <a:prstGeom prst="line">
+            <a:avLst/>
+          </a:prstGeom>
+        </p:spPr>
+        <p:style>
+          <a:lnRef idx="1">
+            <a:schemeClr val="dk1"/>
+          </a:lnRef>
+          <a:fillRef idx="0">
+            <a:schemeClr val="dk1"/>
+          </a:fillRef>
+          <a:effectRef idx="0">
+            <a:schemeClr val="dk1"/>
+          </a:effectRef>
+          <a:fontRef idx="minor">
+            <a:schemeClr val="tx1"/>
+          </a:fontRef>
+        </p:style>
+      </p:cxnSp>
+      <p:cxnSp>
+        <p:nvCxnSpPr>
+          <p:cNvPr id="67" name="Прямая соединительная линия 66"/>
+          <p:cNvCxnSpPr/>
+          <p:nvPr/>
+        </p:nvCxnSpPr>
+        <p:spPr>
+          <a:xfrm flipH="1">
+            <a:off x="7854372" y="5573821"/>
+            <a:ext cx="1524" cy="227076"/>
+          </a:xfrm>
+          <a:prstGeom prst="line">
+            <a:avLst/>
+          </a:prstGeom>
+        </p:spPr>
+        <p:style>
+          <a:lnRef idx="1">
+            <a:schemeClr val="dk1"/>
+          </a:lnRef>
+          <a:fillRef idx="0">
+            <a:schemeClr val="dk1"/>
+          </a:fillRef>
+          <a:effectRef idx="0">
+            <a:schemeClr val="dk1"/>
+          </a:effectRef>
+          <a:fontRef idx="minor">
+            <a:schemeClr val="tx1"/>
+          </a:fontRef>
+        </p:style>
+      </p:cxnSp>
+      <p:cxnSp>
+        <p:nvCxnSpPr>
+          <p:cNvPr id="68" name="Прямая соединительная линия 67"/>
+          <p:cNvCxnSpPr/>
+          <p:nvPr/>
+        </p:nvCxnSpPr>
+        <p:spPr>
+          <a:xfrm flipH="1">
+            <a:off x="8520445" y="5561989"/>
+            <a:ext cx="1524" cy="227076"/>
+          </a:xfrm>
+          <a:prstGeom prst="line">
+            <a:avLst/>
+          </a:prstGeom>
+        </p:spPr>
+        <p:style>
+          <a:lnRef idx="1">
+            <a:schemeClr val="dk1"/>
+          </a:lnRef>
+          <a:fillRef idx="0">
+            <a:schemeClr val="dk1"/>
+          </a:fillRef>
+          <a:effectRef idx="0">
+            <a:schemeClr val="dk1"/>
+          </a:effectRef>
+          <a:fontRef idx="minor">
+            <a:schemeClr val="tx1"/>
+          </a:fontRef>
+        </p:style>
+      </p:cxnSp>
+      <p:cxnSp>
+        <p:nvCxnSpPr>
+          <p:cNvPr id="69" name="Прямая соединительная линия 68"/>
+          <p:cNvCxnSpPr/>
+          <p:nvPr/>
+        </p:nvCxnSpPr>
+        <p:spPr>
+          <a:xfrm flipH="1">
+            <a:off x="10168237" y="5570138"/>
+            <a:ext cx="1524" cy="227076"/>
+          </a:xfrm>
+          <a:prstGeom prst="line">
+            <a:avLst/>
+          </a:prstGeom>
+        </p:spPr>
+        <p:style>
+          <a:lnRef idx="1">
+            <a:schemeClr val="dk1"/>
+          </a:lnRef>
+          <a:fillRef idx="0">
+            <a:schemeClr val="dk1"/>
+          </a:fillRef>
+          <a:effectRef idx="0">
+            <a:schemeClr val="dk1"/>
+          </a:effectRef>
+          <a:fontRef idx="minor">
+            <a:schemeClr val="tx1"/>
+          </a:fontRef>
+        </p:style>
+      </p:cxnSp>
+      <p:sp>
+        <p:nvSpPr>
+          <p:cNvPr id="70" name="TextBox 69"/>
+          <p:cNvSpPr txBox="1"/>
+          <p:nvPr/>
+        </p:nvSpPr>
+        <p:spPr>
+          <a:xfrm>
+            <a:off x="7133037" y="5883827"/>
+            <a:ext cx="306494" cy="369332"/>
+          </a:xfrm>
+          <a:prstGeom prst="rect">
+            <a:avLst/>
+          </a:prstGeom>
+          <a:noFill/>
+        </p:spPr>
+        <p:txBody>
+          <a:bodyPr wrap="none" rtlCol="0">
+            <a:spAutoFit/>
+          </a:bodyPr>
+          <a:lstStyle/>
+          <a:p>
+            <a:r>
+              <a:rPr lang="ru-RU" i="1" dirty="0" smtClean="0"/>
+              <a:t>0</a:t>
+            </a:r>
+            <a:endParaRPr lang="en-US" i="1" dirty="0"/>
+          </a:p>
+        </p:txBody>
+      </p:sp>
+      <p:sp>
+        <p:nvSpPr>
+          <p:cNvPr id="71" name="TextBox 70"/>
+          <p:cNvSpPr txBox="1"/>
+          <p:nvPr/>
+        </p:nvSpPr>
+        <p:spPr>
+          <a:xfrm>
+            <a:off x="7697602" y="5846998"/>
+            <a:ext cx="377026" cy="369332"/>
+          </a:xfrm>
+          <a:prstGeom prst="rect">
+            <a:avLst/>
+          </a:prstGeom>
+          <a:noFill/>
+        </p:spPr>
+        <p:txBody>
+          <a:bodyPr wrap="none" rtlCol="0">
+            <a:spAutoFit/>
+          </a:bodyPr>
+          <a:lstStyle/>
+          <a:p>
+            <a:r>
+              <a:rPr lang="en-US" i="1" dirty="0"/>
+              <a:t>m</a:t>
+            </a:r>
+          </a:p>
+        </p:txBody>
+      </p:sp>
+      <p:sp>
+        <p:nvSpPr>
+          <p:cNvPr id="72" name="TextBox 71"/>
+          <p:cNvSpPr txBox="1"/>
+          <p:nvPr/>
+        </p:nvSpPr>
+        <p:spPr>
+          <a:xfrm>
+            <a:off x="8317500" y="5855645"/>
+            <a:ext cx="498855" cy="369332"/>
+          </a:xfrm>
+          <a:prstGeom prst="rect">
+            <a:avLst/>
+          </a:prstGeom>
+          <a:noFill/>
+        </p:spPr>
+        <p:txBody>
+          <a:bodyPr wrap="none" rtlCol="0">
+            <a:spAutoFit/>
+          </a:bodyPr>
+          <a:lstStyle/>
+          <a:p>
+            <a:r>
+              <a:rPr lang="en-US" i="1" dirty="0" smtClean="0"/>
+              <a:t>2m</a:t>
+            </a:r>
+            <a:endParaRPr lang="en-US" i="1" dirty="0"/>
+          </a:p>
+        </p:txBody>
+      </p:sp>
+      <p:sp>
+        <p:nvSpPr>
+          <p:cNvPr id="73" name="TextBox 72"/>
+          <p:cNvSpPr txBox="1"/>
+          <p:nvPr/>
+        </p:nvSpPr>
+        <p:spPr>
+          <a:xfrm>
+            <a:off x="11503123" y="5331362"/>
+            <a:ext cx="312906" cy="369332"/>
+          </a:xfrm>
+          <a:prstGeom prst="rect">
+            <a:avLst/>
+          </a:prstGeom>
+          <a:noFill/>
+        </p:spPr>
+        <p:txBody>
+          <a:bodyPr wrap="none" rtlCol="0">
+            <a:spAutoFit/>
+          </a:bodyPr>
+          <a:lstStyle/>
+          <a:p>
+            <a:r>
+              <a:rPr lang="en-US" i="1" dirty="0"/>
+              <a:t>q</a:t>
+            </a:r>
+          </a:p>
+        </p:txBody>
+      </p:sp>
+      <p:sp>
+        <p:nvSpPr>
+          <p:cNvPr id="74" name="TextBox 73"/>
+          <p:cNvSpPr txBox="1"/>
+          <p:nvPr/>
+        </p:nvSpPr>
+        <p:spPr>
+          <a:xfrm>
+            <a:off x="9928540" y="5112138"/>
+            <a:ext cx="1160895" cy="369332"/>
+          </a:xfrm>
+          <a:prstGeom prst="rect">
+            <a:avLst/>
+          </a:prstGeom>
+          <a:noFill/>
+        </p:spPr>
+        <p:txBody>
+          <a:bodyPr wrap="none" rtlCol="0">
+            <a:spAutoFit/>
+          </a:bodyPr>
+          <a:lstStyle/>
+          <a:p>
+            <a:r>
+              <a:rPr lang="en-US" i="1" dirty="0" smtClean="0"/>
+              <a:t>p -1 = 22 </a:t>
+            </a:r>
+            <a:endParaRPr lang="en-US" i="1" dirty="0"/>
+          </a:p>
+        </p:txBody>
+      </p:sp>
+      <p:sp>
+        <p:nvSpPr>
+          <p:cNvPr id="75" name="TextBox 74"/>
+          <p:cNvSpPr txBox="1"/>
+          <p:nvPr/>
+        </p:nvSpPr>
+        <p:spPr>
+          <a:xfrm>
+            <a:off x="7734495" y="6185982"/>
+            <a:ext cx="306494" cy="369332"/>
+          </a:xfrm>
+          <a:prstGeom prst="rect">
+            <a:avLst/>
+          </a:prstGeom>
+          <a:noFill/>
+        </p:spPr>
+        <p:txBody>
+          <a:bodyPr wrap="none" rtlCol="0">
+            <a:spAutoFit/>
+          </a:bodyPr>
+          <a:lstStyle/>
+          <a:p>
+            <a:r>
+              <a:rPr lang="en-US" dirty="0" smtClean="0"/>
+              <a:t>5</a:t>
+            </a:r>
+            <a:endParaRPr lang="en-US" dirty="0"/>
+          </a:p>
+        </p:txBody>
+      </p:sp>
+      <p:sp>
+        <p:nvSpPr>
+          <p:cNvPr id="76" name="TextBox 75"/>
+          <p:cNvSpPr txBox="1"/>
+          <p:nvPr/>
+        </p:nvSpPr>
+        <p:spPr>
+          <a:xfrm>
+            <a:off x="8331397" y="6177051"/>
+            <a:ext cx="428322" cy="369332"/>
+          </a:xfrm>
+          <a:prstGeom prst="rect">
+            <a:avLst/>
+          </a:prstGeom>
+          <a:noFill/>
+        </p:spPr>
+        <p:txBody>
+          <a:bodyPr wrap="none" rtlCol="0">
+            <a:spAutoFit/>
+          </a:bodyPr>
+          <a:lstStyle/>
+          <a:p>
+            <a:r>
+              <a:rPr lang="en-US" dirty="0" smtClean="0"/>
+              <a:t>10</a:t>
+            </a:r>
+            <a:endParaRPr lang="en-US" dirty="0"/>
+          </a:p>
+        </p:txBody>
+      </p:sp>
+      <p:cxnSp>
+        <p:nvCxnSpPr>
+          <p:cNvPr id="77" name="Прямая соединительная линия 76"/>
+          <p:cNvCxnSpPr/>
+          <p:nvPr/>
+        </p:nvCxnSpPr>
+        <p:spPr>
+          <a:xfrm flipH="1">
+            <a:off x="9209048" y="5571523"/>
+            <a:ext cx="1524" cy="227076"/>
+          </a:xfrm>
+          <a:prstGeom prst="line">
+            <a:avLst/>
+          </a:prstGeom>
+        </p:spPr>
+        <p:style>
+          <a:lnRef idx="1">
+            <a:schemeClr val="dk1"/>
+          </a:lnRef>
+          <a:fillRef idx="0">
+            <a:schemeClr val="dk1"/>
+          </a:fillRef>
+          <a:effectRef idx="0">
+            <a:schemeClr val="dk1"/>
+          </a:effectRef>
+          <a:fontRef idx="minor">
+            <a:schemeClr val="tx1"/>
+          </a:fontRef>
+        </p:style>
+      </p:cxnSp>
+      <p:sp>
+        <p:nvSpPr>
+          <p:cNvPr id="78" name="TextBox 77"/>
+          <p:cNvSpPr txBox="1"/>
+          <p:nvPr/>
+        </p:nvSpPr>
+        <p:spPr>
+          <a:xfrm>
+            <a:off x="9006103" y="5865179"/>
+            <a:ext cx="498855" cy="369332"/>
+          </a:xfrm>
+          <a:prstGeom prst="rect">
+            <a:avLst/>
+          </a:prstGeom>
+          <a:noFill/>
+        </p:spPr>
+        <p:txBody>
+          <a:bodyPr wrap="none" rtlCol="0">
+            <a:spAutoFit/>
+          </a:bodyPr>
+          <a:lstStyle/>
+          <a:p>
+            <a:r>
+              <a:rPr lang="en-US" i="1" dirty="0"/>
+              <a:t>3</a:t>
+            </a:r>
+            <a:r>
+              <a:rPr lang="en-US" i="1" dirty="0" smtClean="0"/>
+              <a:t>m</a:t>
+            </a:r>
+            <a:endParaRPr lang="en-US" i="1" dirty="0"/>
+          </a:p>
+        </p:txBody>
+      </p:sp>
+      <p:sp>
+        <p:nvSpPr>
+          <p:cNvPr id="79" name="TextBox 78"/>
+          <p:cNvSpPr txBox="1"/>
+          <p:nvPr/>
+        </p:nvSpPr>
+        <p:spPr>
+          <a:xfrm>
+            <a:off x="9020000" y="6186585"/>
+            <a:ext cx="428322" cy="369332"/>
+          </a:xfrm>
+          <a:prstGeom prst="rect">
+            <a:avLst/>
+          </a:prstGeom>
+          <a:noFill/>
+        </p:spPr>
+        <p:txBody>
+          <a:bodyPr wrap="none" rtlCol="0">
+            <a:spAutoFit/>
+          </a:bodyPr>
+          <a:lstStyle/>
+          <a:p>
+            <a:r>
+              <a:rPr lang="en-US" dirty="0" smtClean="0"/>
+              <a:t>15</a:t>
+            </a:r>
+            <a:endParaRPr lang="en-US" dirty="0"/>
+          </a:p>
+        </p:txBody>
+      </p:sp>
+      <p:cxnSp>
+        <p:nvCxnSpPr>
+          <p:cNvPr id="80" name="Прямая соединительная линия 79"/>
+          <p:cNvCxnSpPr/>
+          <p:nvPr/>
+        </p:nvCxnSpPr>
+        <p:spPr>
+          <a:xfrm flipH="1">
+            <a:off x="9892488" y="5571523"/>
+            <a:ext cx="1524" cy="227076"/>
+          </a:xfrm>
+          <a:prstGeom prst="line">
+            <a:avLst/>
+          </a:prstGeom>
+        </p:spPr>
+        <p:style>
+          <a:lnRef idx="1">
+            <a:schemeClr val="dk1"/>
+          </a:lnRef>
+          <a:fillRef idx="0">
+            <a:schemeClr val="dk1"/>
+          </a:fillRef>
+          <a:effectRef idx="0">
+            <a:schemeClr val="dk1"/>
+          </a:effectRef>
+          <a:fontRef idx="minor">
+            <a:schemeClr val="tx1"/>
+          </a:fontRef>
+        </p:style>
+      </p:cxnSp>
       <mc:AlternateContent xmlns:mc="http://schemas.openxmlformats.org/markup-compatibility/2006" xmlns:a14="http://schemas.microsoft.com/office/drawing/2010/main">
         <mc:Choice Requires="a14">
           <p:sp>
             <p:nvSpPr>
-              <p:cNvPr id="32" name="Объект 2"/>
-              <p:cNvSpPr txBox="1">
-                <a:spLocks/>
-              </p:cNvSpPr>
+              <p:cNvPr id="81" name="TextBox 80"/>
+              <p:cNvSpPr txBox="1"/>
               <p:nvPr/>
             </p:nvSpPr>
             <p:spPr>
               <a:xfrm>
-                <a:off x="225655" y="4064194"/>
-                <a:ext cx="11764652" cy="2677288"/>
+                <a:off x="9612717" y="5834068"/>
+                <a:ext cx="1921488" cy="781817"/>
               </a:xfrm>
               <a:prstGeom prst="rect">
                 <a:avLst/>
               </a:prstGeom>
-              <a:solidFill>
-                <a:schemeClr val="bg1"/>
-              </a:solidFill>
+              <a:noFill/>
             </p:spPr>
             <p:txBody>
-              <a:bodyPr vert="horz" lIns="91440" tIns="45720" rIns="91440" bIns="45720" rtlCol="0">
-                <a:normAutofit/>
+              <a:bodyPr wrap="none" rtlCol="0">
+                <a:spAutoFit/>
               </a:bodyPr>
-              <a:lstStyle>
-                <a:lvl1pPr marL="342900" indent="-342900" algn="l" defTabSz="457200" rtl="0" eaLnBrk="1" latinLnBrk="0" hangingPunct="1">
-                  <a:spcBef>
-                    <a:spcPts val="1000"/>
-                  </a:spcBef>
-                  <a:spcAft>
-                    <a:spcPts val="0"/>
-                  </a:spcAft>
-                  <a:buClr>
-                    <a:schemeClr val="accent1"/>
-                  </a:buClr>
-                  <a:buSzPct val="80000"/>
-                  <a:buFont typeface="Wingdings 3" charset="2"/>
-                  <a:buChar char=""/>
-                  <a:defRPr sz="1800" kern="1200">
-                    <a:solidFill>
-                      <a:schemeClr val="tx1">
-                        <a:lumMod val="75000"/>
-                        <a:lumOff val="25000"/>
-                      </a:schemeClr>
-                    </a:solidFill>
-                    <a:latin typeface="+mn-lt"/>
-                    <a:ea typeface="+mn-ea"/>
-                    <a:cs typeface="+mn-cs"/>
-                  </a:defRPr>
-                </a:lvl1pPr>
-                <a:lvl2pPr marL="742950" indent="-285750" algn="l" defTabSz="457200" rtl="0" eaLnBrk="1" latinLnBrk="0" hangingPunct="1">
-                  <a:spcBef>
-                    <a:spcPts val="1000"/>
-                  </a:spcBef>
-                  <a:spcAft>
-                    <a:spcPts val="0"/>
-                  </a:spcAft>
-                  <a:buClr>
-                    <a:schemeClr val="accent1"/>
-                  </a:buClr>
-                  <a:buSzPct val="80000"/>
-                  <a:buFont typeface="Wingdings 3" charset="2"/>
-                  <a:buChar char=""/>
-                  <a:defRPr sz="1600" kern="1200">
-                    <a:solidFill>
-                      <a:schemeClr val="tx1">
-                        <a:lumMod val="75000"/>
-                        <a:lumOff val="25000"/>
-                      </a:schemeClr>
-                    </a:solidFill>
-                    <a:latin typeface="+mn-lt"/>
-                    <a:ea typeface="+mn-ea"/>
-                    <a:cs typeface="+mn-cs"/>
-                  </a:defRPr>
-                </a:lvl2pPr>
-                <a:lvl3pPr marL="1143000" indent="-228600" algn="l" defTabSz="457200" rtl="0" eaLnBrk="1" latinLnBrk="0" hangingPunct="1">
-                  <a:spcBef>
-                    <a:spcPts val="1000"/>
-                  </a:spcBef>
-                  <a:spcAft>
-                    <a:spcPts val="0"/>
-                  </a:spcAft>
-                  <a:buClr>
-                    <a:schemeClr val="accent1"/>
-                  </a:buClr>
-                  <a:buSzPct val="80000"/>
-                  <a:buFont typeface="Wingdings 3" charset="2"/>
-                  <a:buChar char=""/>
-                  <a:defRPr sz="1400" kern="1200">
-                    <a:solidFill>
-                      <a:schemeClr val="tx1">
-                        <a:lumMod val="75000"/>
-                        <a:lumOff val="25000"/>
-                      </a:schemeClr>
-                    </a:solidFill>
-                    <a:latin typeface="+mn-lt"/>
-                    <a:ea typeface="+mn-ea"/>
-                    <a:cs typeface="+mn-cs"/>
-                  </a:defRPr>
-                </a:lvl3pPr>
-                <a:lvl4pPr marL="1600200" indent="-228600" algn="l" defTabSz="457200" rtl="0" eaLnBrk="1" latinLnBrk="0" hangingPunct="1">
-                  <a:spcBef>
-                    <a:spcPts val="1000"/>
-                  </a:spcBef>
-                  <a:spcAft>
-                    <a:spcPts val="0"/>
-                  </a:spcAft>
-                  <a:buClr>
-                    <a:schemeClr val="accent1"/>
-                  </a:buClr>
-                  <a:buSzPct val="80000"/>
-                  <a:buFont typeface="Wingdings 3" charset="2"/>
-                  <a:buChar char=""/>
-                  <a:defRPr sz="1200" kern="1200">
-                    <a:solidFill>
-                      <a:schemeClr val="tx1">
-                        <a:lumMod val="75000"/>
-                        <a:lumOff val="25000"/>
-                      </a:schemeClr>
-                    </a:solidFill>
-                    <a:latin typeface="+mn-lt"/>
-                    <a:ea typeface="+mn-ea"/>
-                    <a:cs typeface="+mn-cs"/>
-                  </a:defRPr>
-                </a:lvl4pPr>
-                <a:lvl5pPr marL="2057400" indent="-228600" algn="l" defTabSz="457200" rtl="0" eaLnBrk="1" latinLnBrk="0" hangingPunct="1">
-                  <a:spcBef>
-                    <a:spcPts val="1000"/>
-                  </a:spcBef>
-                  <a:spcAft>
-                    <a:spcPts val="0"/>
-                  </a:spcAft>
-                  <a:buClr>
-                    <a:schemeClr val="accent1"/>
-                  </a:buClr>
-                  <a:buSzPct val="80000"/>
-                  <a:buFont typeface="Wingdings 3" charset="2"/>
-                  <a:buChar char=""/>
-                  <a:defRPr sz="1200" kern="1200">
-                    <a:solidFill>
-                      <a:schemeClr val="tx1">
-                        <a:lumMod val="75000"/>
-                        <a:lumOff val="25000"/>
-                      </a:schemeClr>
-                    </a:solidFill>
-                    <a:latin typeface="+mn-lt"/>
-                    <a:ea typeface="+mn-ea"/>
-                    <a:cs typeface="+mn-cs"/>
-                  </a:defRPr>
-                </a:lvl5pPr>
-                <a:lvl6pPr marL="2514600" indent="-228600" algn="l" defTabSz="457200" rtl="0" eaLnBrk="1" latinLnBrk="0" hangingPunct="1">
-                  <a:spcBef>
-                    <a:spcPts val="1000"/>
-                  </a:spcBef>
-                  <a:spcAft>
-                    <a:spcPts val="0"/>
-                  </a:spcAft>
-                  <a:buClr>
-                    <a:schemeClr val="accent1"/>
-                  </a:buClr>
-                  <a:buSzPct val="80000"/>
-                  <a:buFont typeface="Wingdings 3" charset="2"/>
-                  <a:buChar char=""/>
-                  <a:defRPr sz="1200" kern="1200">
-                    <a:solidFill>
-                      <a:schemeClr val="tx1">
-                        <a:lumMod val="75000"/>
-                        <a:lumOff val="25000"/>
-                      </a:schemeClr>
-                    </a:solidFill>
-                    <a:latin typeface="+mn-lt"/>
-                    <a:ea typeface="+mn-ea"/>
-                    <a:cs typeface="+mn-cs"/>
-                  </a:defRPr>
-                </a:lvl6pPr>
-                <a:lvl7pPr marL="2971800" indent="-228600" algn="l" defTabSz="457200" rtl="0" eaLnBrk="1" latinLnBrk="0" hangingPunct="1">
-                  <a:spcBef>
-                    <a:spcPts val="1000"/>
-                  </a:spcBef>
-                  <a:spcAft>
-                    <a:spcPts val="0"/>
-                  </a:spcAft>
-                  <a:buClr>
-                    <a:schemeClr val="accent1"/>
-                  </a:buClr>
-                  <a:buSzPct val="80000"/>
-                  <a:buFont typeface="Wingdings 3" charset="2"/>
-                  <a:buChar char=""/>
-                  <a:defRPr sz="1200" kern="1200">
-                    <a:solidFill>
-                      <a:schemeClr val="tx1">
-                        <a:lumMod val="75000"/>
-                        <a:lumOff val="25000"/>
-                      </a:schemeClr>
-                    </a:solidFill>
-                    <a:latin typeface="+mn-lt"/>
-                    <a:ea typeface="+mn-ea"/>
-                    <a:cs typeface="+mn-cs"/>
-                  </a:defRPr>
-                </a:lvl7pPr>
-                <a:lvl8pPr marL="3429000" indent="-228600" algn="l" defTabSz="457200" rtl="0" eaLnBrk="1" latinLnBrk="0" hangingPunct="1">
-                  <a:spcBef>
-                    <a:spcPts val="1000"/>
-                  </a:spcBef>
-                  <a:spcAft>
-                    <a:spcPts val="0"/>
-                  </a:spcAft>
-                  <a:buClr>
-                    <a:schemeClr val="accent1"/>
-                  </a:buClr>
-                  <a:buSzPct val="80000"/>
-                  <a:buFont typeface="Wingdings 3" charset="2"/>
-                  <a:buChar char=""/>
-                  <a:defRPr sz="1200" kern="1200">
-                    <a:solidFill>
-                      <a:schemeClr val="tx1">
-                        <a:lumMod val="75000"/>
-                        <a:lumOff val="25000"/>
-                      </a:schemeClr>
-                    </a:solidFill>
-                    <a:latin typeface="+mn-lt"/>
-                    <a:ea typeface="+mn-ea"/>
-                    <a:cs typeface="+mn-cs"/>
-                  </a:defRPr>
-                </a:lvl8pPr>
-                <a:lvl9pPr marL="3886200" indent="-228600" algn="l" defTabSz="457200" rtl="0" eaLnBrk="1" latinLnBrk="0" hangingPunct="1">
-                  <a:spcBef>
-                    <a:spcPts val="1000"/>
-                  </a:spcBef>
-                  <a:spcAft>
-                    <a:spcPts val="0"/>
-                  </a:spcAft>
-                  <a:buClr>
-                    <a:schemeClr val="accent1"/>
-                  </a:buClr>
-                  <a:buSzPct val="80000"/>
-                  <a:buFont typeface="Wingdings 3" charset="2"/>
-                  <a:buChar char=""/>
-                  <a:defRPr sz="1200" kern="1200">
-                    <a:solidFill>
-                      <a:schemeClr val="tx1">
-                        <a:lumMod val="75000"/>
-                        <a:lumOff val="25000"/>
-                      </a:schemeClr>
-                    </a:solidFill>
-                    <a:latin typeface="+mn-lt"/>
-                    <a:ea typeface="+mn-ea"/>
-                    <a:cs typeface="+mn-cs"/>
-                  </a:defRPr>
-                </a:lvl9pPr>
-              </a:lstStyle>
+              <a:lstStyle/>
               <a:p>
                 <a:r>
                   <a:rPr lang="en-US" i="1" dirty="0" smtClean="0"/>
-                  <a:t>q</a:t>
+                  <a:t>4m = </a:t>
                 </a:r>
                 <a:r>
                   <a:rPr lang="en-US" dirty="0" smtClean="0"/>
-                  <a:t> – </a:t>
-                </a:r>
-                <a:r>
-                  <a:rPr lang="ru-RU" dirty="0" smtClean="0"/>
-                  <a:t>это остаток от деления на </a:t>
-                </a:r>
-                <a:r>
-                  <a:rPr lang="en-US" i="1" dirty="0" smtClean="0"/>
-                  <a:t>p</a:t>
-                </a:r>
-                <a:r>
-                  <a:rPr lang="en-US" dirty="0" smtClean="0"/>
-                  <a:t>,</a:t>
-                </a:r>
-                <a:r>
-                  <a:rPr lang="ru-RU" dirty="0" smtClean="0"/>
-                  <a:t> оно не может быть больше, чем </a:t>
-                </a:r>
-                <a:r>
-                  <a:rPr lang="en-US" i="1" dirty="0" smtClean="0"/>
-                  <a:t>p-1</a:t>
-                </a:r>
-                <a:endParaRPr lang="ru-RU" i="1" dirty="0" smtClean="0"/>
-              </a:p>
-              <a:p>
-                <a:r>
-                  <a:rPr lang="ru-RU" dirty="0" smtClean="0"/>
-                  <a:t>Можно предположить для наглядности, что остатки равны 0. Шкалу можно сдвинуть вправо или влево в пределах </a:t>
-                </a:r>
-                <a:r>
-                  <a:rPr lang="en-US" i="1" dirty="0" smtClean="0"/>
-                  <a:t>m</a:t>
-                </a:r>
-                <a:r>
-                  <a:rPr lang="en-US" dirty="0" smtClean="0"/>
-                  <a:t>, </a:t>
-                </a:r>
-                <a:r>
-                  <a:rPr lang="ru-RU" dirty="0" smtClean="0"/>
-                  <a:t>чтобы получить другой остаток</a:t>
-                </a:r>
-              </a:p>
-              <a:p>
-                <a:r>
-                  <a:rPr lang="ru-RU" dirty="0" smtClean="0"/>
-                  <a:t>Всего на отрезке </a:t>
-                </a:r>
-                <a:r>
-                  <a:rPr lang="en-US" dirty="0" smtClean="0"/>
-                  <a:t>[</a:t>
-                </a:r>
-                <a:r>
-                  <a:rPr lang="en-US" i="1" dirty="0" smtClean="0"/>
-                  <a:t>0, p – 1</a:t>
-                </a:r>
-                <a:r>
-                  <a:rPr lang="en-US" dirty="0" smtClean="0"/>
-                  <a:t>] </a:t>
-                </a:r>
-                <a:r>
-                  <a:rPr lang="ru-RU" dirty="0" smtClean="0"/>
-                  <a:t>таких чисел</a:t>
-                </a:r>
-                <a:r>
-                  <a:rPr lang="en-US" dirty="0" smtClean="0"/>
-                  <a:t> </a:t>
-                </a:r>
-                <a:r>
-                  <a:rPr lang="ru-RU" dirty="0" smtClean="0"/>
-                  <a:t>не более </a:t>
+                  <a:t>(</a:t>
                 </a:r>
                 <a14:m>
                   <m:oMath xmlns:m="http://schemas.openxmlformats.org/officeDocument/2006/math">
@@ -12410,812 +12918,28 @@
                       </m:e>
                     </m:d>
                     <m:r>
-                      <a:rPr lang="ru-RU" b="0" i="1" smtClean="0">
-                        <a:latin typeface="Cambria Math" panose="02040503050406030204" pitchFamily="18" charset="0"/>
-                      </a:rPr>
-                      <m:t>.</m:t>
-                    </m:r>
-                  </m:oMath>
-                </a14:m>
-                <a:r>
-                  <a:rPr lang="ru-RU" dirty="0" smtClean="0"/>
-                  <a:t> Но нам нужны пары </a:t>
-                </a:r>
-                <a:r>
-                  <a:rPr lang="ru-RU" i="1" dirty="0"/>
-                  <a:t>(</a:t>
-                </a:r>
-                <a:r>
-                  <a:rPr lang="en-US" i="1" dirty="0"/>
-                  <a:t>s, q</a:t>
-                </a:r>
-                <a:r>
-                  <a:rPr lang="ru-RU" i="1" dirty="0" smtClean="0"/>
-                  <a:t>)</a:t>
-                </a:r>
-                <a:r>
-                  <a:rPr lang="ru-RU" dirty="0" smtClean="0"/>
-                  <a:t>, в которых </a:t>
-                </a:r>
-                <a14:m>
-                  <m:oMath xmlns:m="http://schemas.openxmlformats.org/officeDocument/2006/math">
-                    <m:r>
                       <a:rPr lang="en-US" i="1">
                         <a:latin typeface="Cambria Math" panose="02040503050406030204" pitchFamily="18" charset="0"/>
                       </a:rPr>
-                      <m:t>𝑠</m:t>
-                    </m:r>
-                    <m:r>
-                      <a:rPr lang="en-US" i="1">
-                        <a:latin typeface="Cambria Math" panose="02040503050406030204" pitchFamily="18" charset="0"/>
-                      </a:rPr>
-                      <m:t> ≠</m:t>
-                    </m:r>
-                    <m:r>
-                      <a:rPr lang="en-US" i="1">
-                        <a:latin typeface="Cambria Math" panose="02040503050406030204" pitchFamily="18" charset="0"/>
-                        <a:ea typeface="Cambria Math" panose="02040503050406030204" pitchFamily="18" charset="0"/>
-                      </a:rPr>
-                      <m:t>𝑞</m:t>
-                    </m:r>
-                    <m:r>
-                      <a:rPr lang="en-US" b="0" i="0" smtClean="0">
-                        <a:latin typeface="Cambria Math" panose="02040503050406030204" pitchFamily="18" charset="0"/>
-                        <a:ea typeface="Cambria Math" panose="02040503050406030204" pitchFamily="18" charset="0"/>
-                      </a:rPr>
-                      <m:t>.</m:t>
-                    </m:r>
-                  </m:oMath>
-                </a14:m>
-                <a:r>
-                  <a:rPr lang="en-US" dirty="0" smtClean="0"/>
-                  <a:t> </a:t>
-                </a:r>
-                <a:r>
-                  <a:rPr lang="ru-RU" dirty="0" smtClean="0"/>
-                  <a:t>Таких пар не более </a:t>
-                </a:r>
-                <a14:m>
-                  <m:oMath xmlns:m="http://schemas.openxmlformats.org/officeDocument/2006/math">
-                    <m:d>
-                      <m:dPr>
-                        <m:begChr m:val="⌈"/>
-                        <m:endChr m:val="⌉"/>
-                        <m:ctrlPr>
-                          <a:rPr lang="en-US" i="1">
-                            <a:latin typeface="Cambria Math" panose="02040503050406030204" pitchFamily="18" charset="0"/>
-                          </a:rPr>
-                        </m:ctrlPr>
-                      </m:dPr>
-                      <m:e>
-                        <m:f>
-                          <m:fPr>
-                            <m:ctrlPr>
-                              <a:rPr lang="en-US" i="1">
-                                <a:latin typeface="Cambria Math" panose="02040503050406030204" pitchFamily="18" charset="0"/>
-                              </a:rPr>
-                            </m:ctrlPr>
-                          </m:fPr>
-                          <m:num>
-                            <m:r>
-                              <a:rPr lang="en-US" i="1">
-                                <a:latin typeface="Cambria Math" panose="02040503050406030204" pitchFamily="18" charset="0"/>
-                              </a:rPr>
-                              <m:t>𝑝</m:t>
-                            </m:r>
-                          </m:num>
-                          <m:den>
-                            <m:r>
-                              <a:rPr lang="en-US" i="1">
-                                <a:latin typeface="Cambria Math" panose="02040503050406030204" pitchFamily="18" charset="0"/>
-                              </a:rPr>
-                              <m:t>𝑚</m:t>
-                            </m:r>
-                          </m:den>
-                        </m:f>
-                      </m:e>
-                    </m:d>
-                    <m:r>
-                      <a:rPr lang="en-US" i="1">
-                        <a:latin typeface="Cambria Math" panose="02040503050406030204" pitchFamily="18" charset="0"/>
-                      </a:rPr>
-                      <m:t> −</m:t>
-                    </m:r>
-                    <m:r>
-                      <a:rPr lang="ru-RU" b="0" i="1" smtClean="0">
-                        <a:latin typeface="Cambria Math" panose="02040503050406030204" pitchFamily="18" charset="0"/>
-                      </a:rPr>
-                      <m:t>1</m:t>
-                    </m:r>
-                  </m:oMath>
-                </a14:m>
-                <a:r>
-                  <a:rPr lang="ru-RU" dirty="0" smtClean="0"/>
-                  <a:t> для фиксированного </a:t>
-                </a:r>
-                <a:r>
-                  <a:rPr lang="en-US" i="1" dirty="0" smtClean="0"/>
-                  <a:t>q</a:t>
-                </a:r>
-                <a:r>
-                  <a:rPr lang="en-US" dirty="0" smtClean="0"/>
-                  <a:t>, </a:t>
-                </a:r>
-                <a:r>
-                  <a:rPr lang="ru-RU" dirty="0" smtClean="0"/>
-                  <a:t>так одно </a:t>
-                </a:r>
-                <a:r>
-                  <a:rPr lang="en-US" i="1" dirty="0" smtClean="0"/>
-                  <a:t>q</a:t>
-                </a:r>
-                <a:r>
-                  <a:rPr lang="en-US" dirty="0" smtClean="0"/>
-                  <a:t> </a:t>
-                </a:r>
-                <a:r>
-                  <a:rPr lang="ru-RU" dirty="0" smtClean="0"/>
-                  <a:t>уже занято</a:t>
-                </a:r>
-              </a:p>
-              <a:p>
-                <a:r>
-                  <a:rPr lang="ru-RU" dirty="0" smtClean="0"/>
-                  <a:t>Здесь мы рассматривали значения </a:t>
-                </a:r>
-                <a:r>
-                  <a:rPr lang="en-US" i="1" dirty="0" smtClean="0"/>
-                  <a:t>q</a:t>
-                </a:r>
-                <a:r>
-                  <a:rPr lang="en-US" dirty="0" smtClean="0"/>
-                  <a:t>. </a:t>
-                </a:r>
-                <a:r>
-                  <a:rPr lang="ru-RU" dirty="0" smtClean="0"/>
-                  <a:t>Можно с тем же успехом рассматривать значения </a:t>
-                </a:r>
-                <a:r>
-                  <a:rPr lang="en-US" i="1" dirty="0" smtClean="0"/>
-                  <a:t>s</a:t>
-                </a:r>
-                <a:r>
-                  <a:rPr lang="en-US" dirty="0" smtClean="0"/>
-                  <a:t>, </a:t>
-                </a:r>
-                <a:r>
-                  <a:rPr lang="ru-RU" dirty="0" smtClean="0"/>
-                  <a:t>число </a:t>
-                </a:r>
-                <a:r>
-                  <a:rPr lang="ru-RU" dirty="0"/>
-                  <a:t>и</a:t>
-                </a:r>
-                <a:r>
-                  <a:rPr lang="ru-RU" dirty="0" smtClean="0"/>
-                  <a:t>скомых пар (</a:t>
-                </a:r>
-                <a:r>
-                  <a:rPr lang="en-US" i="1" dirty="0" smtClean="0"/>
-                  <a:t>s, q</a:t>
-                </a:r>
-                <a:r>
-                  <a:rPr lang="ru-RU" dirty="0" smtClean="0"/>
-                  <a:t>)</a:t>
-                </a:r>
-                <a:r>
-                  <a:rPr lang="en-US" dirty="0" smtClean="0"/>
-                  <a:t> </a:t>
-                </a:r>
-                <a:r>
-                  <a:rPr lang="ru-RU" dirty="0" smtClean="0"/>
-                  <a:t>будет тем же самым</a:t>
-                </a:r>
-                <a:endParaRPr lang="en-US" dirty="0"/>
-              </a:p>
-              <a:p>
-                <a:endParaRPr lang="en-US" dirty="0"/>
-              </a:p>
-            </p:txBody>
-          </p:sp>
-        </mc:Choice>
-        <mc:Fallback xmlns="">
-          <p:sp>
-            <p:nvSpPr>
-              <p:cNvPr id="32" name="Объект 2"/>
-              <p:cNvSpPr txBox="1">
-                <a:spLocks noRot="1" noChangeAspect="1" noMove="1" noResize="1" noEditPoints="1" noAdjustHandles="1" noChangeArrowheads="1" noChangeShapeType="1" noTextEdit="1"/>
-              </p:cNvSpPr>
-              <p:nvPr/>
-            </p:nvSpPr>
-            <p:spPr>
-              <a:xfrm>
-                <a:off x="225655" y="4064194"/>
-                <a:ext cx="11764652" cy="2677288"/>
-              </a:xfrm>
-              <a:prstGeom prst="rect">
-                <a:avLst/>
-              </a:prstGeom>
-              <a:blipFill rotWithShape="0">
-                <a:blip r:embed="rId6"/>
-                <a:stretch>
-                  <a:fillRect l="-104" t="-1595" r="-415" b="-2961"/>
-                </a:stretch>
-              </a:blipFill>
-            </p:spPr>
-            <p:txBody>
-              <a:bodyPr/>
-              <a:lstStyle/>
-              <a:p>
-                <a:r>
-                  <a:rPr lang="en-US">
-                    <a:noFill/>
-                  </a:rPr>
-                  <a:t> </a:t>
-                </a:r>
-              </a:p>
-            </p:txBody>
-          </p:sp>
-        </mc:Fallback>
-      </mc:AlternateContent>
-      <p:cxnSp>
-        <p:nvCxnSpPr>
-          <p:cNvPr id="23" name="Прямая со стрелкой 22"/>
-          <p:cNvCxnSpPr/>
-          <p:nvPr/>
-        </p:nvCxnSpPr>
-        <p:spPr>
-          <a:xfrm>
-            <a:off x="7029380" y="3268862"/>
-            <a:ext cx="4266472" cy="23863"/>
-          </a:xfrm>
-          <a:prstGeom prst="straightConnector1">
-            <a:avLst/>
-          </a:prstGeom>
-          <a:ln>
-            <a:tailEnd type="triangle"/>
-          </a:ln>
-        </p:spPr>
-        <p:style>
-          <a:lnRef idx="1">
-            <a:schemeClr val="dk1"/>
-          </a:lnRef>
-          <a:fillRef idx="0">
-            <a:schemeClr val="dk1"/>
-          </a:fillRef>
-          <a:effectRef idx="0">
-            <a:schemeClr val="dk1"/>
-          </a:effectRef>
-          <a:fontRef idx="minor">
-            <a:schemeClr val="tx1"/>
-          </a:fontRef>
-        </p:style>
-      </p:cxnSp>
-      <p:cxnSp>
-        <p:nvCxnSpPr>
-          <p:cNvPr id="25" name="Прямая соединительная линия 24"/>
-          <p:cNvCxnSpPr/>
-          <p:nvPr/>
-        </p:nvCxnSpPr>
-        <p:spPr>
-          <a:xfrm flipH="1">
-            <a:off x="7303700" y="3151514"/>
-            <a:ext cx="1524" cy="227076"/>
-          </a:xfrm>
-          <a:prstGeom prst="line">
-            <a:avLst/>
-          </a:prstGeom>
-        </p:spPr>
-        <p:style>
-          <a:lnRef idx="1">
-            <a:schemeClr val="dk1"/>
-          </a:lnRef>
-          <a:fillRef idx="0">
-            <a:schemeClr val="dk1"/>
-          </a:fillRef>
-          <a:effectRef idx="0">
-            <a:schemeClr val="dk1"/>
-          </a:effectRef>
-          <a:fontRef idx="minor">
-            <a:schemeClr val="tx1"/>
-          </a:fontRef>
-        </p:style>
-      </p:cxnSp>
-      <p:cxnSp>
-        <p:nvCxnSpPr>
-          <p:cNvPr id="29" name="Прямая соединительная линия 28"/>
-          <p:cNvCxnSpPr/>
-          <p:nvPr/>
-        </p:nvCxnSpPr>
-        <p:spPr>
-          <a:xfrm flipH="1">
-            <a:off x="7871788" y="3158304"/>
-            <a:ext cx="1524" cy="227076"/>
-          </a:xfrm>
-          <a:prstGeom prst="line">
-            <a:avLst/>
-          </a:prstGeom>
-        </p:spPr>
-        <p:style>
-          <a:lnRef idx="1">
-            <a:schemeClr val="dk1"/>
-          </a:lnRef>
-          <a:fillRef idx="0">
-            <a:schemeClr val="dk1"/>
-          </a:fillRef>
-          <a:effectRef idx="0">
-            <a:schemeClr val="dk1"/>
-          </a:effectRef>
-          <a:fontRef idx="minor">
-            <a:schemeClr val="tx1"/>
-          </a:fontRef>
-        </p:style>
-      </p:cxnSp>
-      <p:cxnSp>
-        <p:nvCxnSpPr>
-          <p:cNvPr id="30" name="Прямая соединительная линия 29"/>
-          <p:cNvCxnSpPr/>
-          <p:nvPr/>
-        </p:nvCxnSpPr>
-        <p:spPr>
-          <a:xfrm flipH="1">
-            <a:off x="8537861" y="3146472"/>
-            <a:ext cx="1524" cy="227076"/>
-          </a:xfrm>
-          <a:prstGeom prst="line">
-            <a:avLst/>
-          </a:prstGeom>
-        </p:spPr>
-        <p:style>
-          <a:lnRef idx="1">
-            <a:schemeClr val="dk1"/>
-          </a:lnRef>
-          <a:fillRef idx="0">
-            <a:schemeClr val="dk1"/>
-          </a:fillRef>
-          <a:effectRef idx="0">
-            <a:schemeClr val="dk1"/>
-          </a:effectRef>
-          <a:fontRef idx="minor">
-            <a:schemeClr val="tx1"/>
-          </a:fontRef>
-        </p:style>
-      </p:cxnSp>
-      <p:cxnSp>
-        <p:nvCxnSpPr>
-          <p:cNvPr id="34" name="Прямая соединительная линия 33"/>
-          <p:cNvCxnSpPr/>
-          <p:nvPr/>
-        </p:nvCxnSpPr>
-        <p:spPr>
-          <a:xfrm flipH="1">
-            <a:off x="10185653" y="3154621"/>
-            <a:ext cx="1524" cy="227076"/>
-          </a:xfrm>
-          <a:prstGeom prst="line">
-            <a:avLst/>
-          </a:prstGeom>
-        </p:spPr>
-        <p:style>
-          <a:lnRef idx="1">
-            <a:schemeClr val="dk1"/>
-          </a:lnRef>
-          <a:fillRef idx="0">
-            <a:schemeClr val="dk1"/>
-          </a:fillRef>
-          <a:effectRef idx="0">
-            <a:schemeClr val="dk1"/>
-          </a:effectRef>
-          <a:fontRef idx="minor">
-            <a:schemeClr val="tx1"/>
-          </a:fontRef>
-        </p:style>
-      </p:cxnSp>
-      <p:sp>
-        <p:nvSpPr>
-          <p:cNvPr id="35" name="TextBox 34"/>
-          <p:cNvSpPr txBox="1"/>
-          <p:nvPr/>
-        </p:nvSpPr>
-        <p:spPr>
-          <a:xfrm>
-            <a:off x="7150453" y="3468310"/>
-            <a:ext cx="306494" cy="369332"/>
-          </a:xfrm>
-          <a:prstGeom prst="rect">
-            <a:avLst/>
-          </a:prstGeom>
-          <a:noFill/>
-        </p:spPr>
-        <p:txBody>
-          <a:bodyPr wrap="none" rtlCol="0">
-            <a:spAutoFit/>
-          </a:bodyPr>
-          <a:lstStyle/>
-          <a:p>
-            <a:r>
-              <a:rPr lang="ru-RU" i="1" dirty="0" smtClean="0"/>
-              <a:t>0</a:t>
-            </a:r>
-            <a:endParaRPr lang="en-US" i="1" dirty="0"/>
-          </a:p>
-        </p:txBody>
-      </p:sp>
-      <p:sp>
-        <p:nvSpPr>
-          <p:cNvPr id="36" name="TextBox 35"/>
-          <p:cNvSpPr txBox="1"/>
-          <p:nvPr/>
-        </p:nvSpPr>
-        <p:spPr>
-          <a:xfrm>
-            <a:off x="7715018" y="3431481"/>
-            <a:ext cx="377026" cy="369332"/>
-          </a:xfrm>
-          <a:prstGeom prst="rect">
-            <a:avLst/>
-          </a:prstGeom>
-          <a:noFill/>
-        </p:spPr>
-        <p:txBody>
-          <a:bodyPr wrap="none" rtlCol="0">
-            <a:spAutoFit/>
-          </a:bodyPr>
-          <a:lstStyle/>
-          <a:p>
-            <a:r>
-              <a:rPr lang="en-US" i="1" dirty="0"/>
-              <a:t>m</a:t>
-            </a:r>
-          </a:p>
-        </p:txBody>
-      </p:sp>
-      <p:sp>
-        <p:nvSpPr>
-          <p:cNvPr id="37" name="TextBox 36"/>
-          <p:cNvSpPr txBox="1"/>
-          <p:nvPr/>
-        </p:nvSpPr>
-        <p:spPr>
-          <a:xfrm>
-            <a:off x="8334916" y="3440128"/>
-            <a:ext cx="498855" cy="369332"/>
-          </a:xfrm>
-          <a:prstGeom prst="rect">
-            <a:avLst/>
-          </a:prstGeom>
-          <a:noFill/>
-        </p:spPr>
-        <p:txBody>
-          <a:bodyPr wrap="none" rtlCol="0">
-            <a:spAutoFit/>
-          </a:bodyPr>
-          <a:lstStyle/>
-          <a:p>
-            <a:r>
-              <a:rPr lang="en-US" i="1" dirty="0" smtClean="0"/>
-              <a:t>2m</a:t>
-            </a:r>
-            <a:endParaRPr lang="en-US" i="1" dirty="0"/>
-          </a:p>
-        </p:txBody>
-      </p:sp>
-      <p:sp>
-        <p:nvSpPr>
-          <p:cNvPr id="40" name="TextBox 39"/>
-          <p:cNvSpPr txBox="1"/>
-          <p:nvPr/>
-        </p:nvSpPr>
-        <p:spPr>
-          <a:xfrm>
-            <a:off x="11290315" y="3090409"/>
-            <a:ext cx="312906" cy="369332"/>
-          </a:xfrm>
-          <a:prstGeom prst="rect">
-            <a:avLst/>
-          </a:prstGeom>
-          <a:noFill/>
-        </p:spPr>
-        <p:txBody>
-          <a:bodyPr wrap="none" rtlCol="0">
-            <a:spAutoFit/>
-          </a:bodyPr>
-          <a:lstStyle/>
-          <a:p>
-            <a:r>
-              <a:rPr lang="en-US" i="1" dirty="0"/>
-              <a:t>q</a:t>
-            </a:r>
-          </a:p>
-        </p:txBody>
-      </p:sp>
-      <p:sp>
-        <p:nvSpPr>
-          <p:cNvPr id="42" name="TextBox 41"/>
-          <p:cNvSpPr txBox="1"/>
-          <p:nvPr/>
-        </p:nvSpPr>
-        <p:spPr>
-          <a:xfrm>
-            <a:off x="9945956" y="2696621"/>
-            <a:ext cx="1160895" cy="369332"/>
-          </a:xfrm>
-          <a:prstGeom prst="rect">
-            <a:avLst/>
-          </a:prstGeom>
-          <a:noFill/>
-        </p:spPr>
-        <p:txBody>
-          <a:bodyPr wrap="none" rtlCol="0">
-            <a:spAutoFit/>
-          </a:bodyPr>
-          <a:lstStyle/>
-          <a:p>
-            <a:r>
-              <a:rPr lang="en-US" i="1" dirty="0" smtClean="0"/>
-              <a:t>p -1 = 22 </a:t>
-            </a:r>
-            <a:endParaRPr lang="en-US" i="1" dirty="0"/>
-          </a:p>
-        </p:txBody>
-      </p:sp>
-      <p:sp>
-        <p:nvSpPr>
-          <p:cNvPr id="2" name="TextBox 1"/>
-          <p:cNvSpPr txBox="1"/>
-          <p:nvPr/>
-        </p:nvSpPr>
-        <p:spPr>
-          <a:xfrm>
-            <a:off x="7751911" y="3770465"/>
-            <a:ext cx="306494" cy="369332"/>
-          </a:xfrm>
-          <a:prstGeom prst="rect">
-            <a:avLst/>
-          </a:prstGeom>
-          <a:noFill/>
-        </p:spPr>
-        <p:txBody>
-          <a:bodyPr wrap="none" rtlCol="0">
-            <a:spAutoFit/>
-          </a:bodyPr>
-          <a:lstStyle/>
-          <a:p>
-            <a:r>
-              <a:rPr lang="en-US" dirty="0" smtClean="0"/>
-              <a:t>5</a:t>
-            </a:r>
-            <a:endParaRPr lang="en-US" dirty="0"/>
-          </a:p>
-        </p:txBody>
-      </p:sp>
-      <p:sp>
-        <p:nvSpPr>
-          <p:cNvPr id="59" name="TextBox 58"/>
-          <p:cNvSpPr txBox="1"/>
-          <p:nvPr/>
-        </p:nvSpPr>
-        <p:spPr>
-          <a:xfrm>
-            <a:off x="8348813" y="3761534"/>
-            <a:ext cx="428322" cy="369332"/>
-          </a:xfrm>
-          <a:prstGeom prst="rect">
-            <a:avLst/>
-          </a:prstGeom>
-          <a:noFill/>
-        </p:spPr>
-        <p:txBody>
-          <a:bodyPr wrap="none" rtlCol="0">
-            <a:spAutoFit/>
-          </a:bodyPr>
-          <a:lstStyle/>
-          <a:p>
-            <a:r>
-              <a:rPr lang="en-US" dirty="0" smtClean="0"/>
-              <a:t>10</a:t>
-            </a:r>
-            <a:endParaRPr lang="en-US" dirty="0"/>
-          </a:p>
-        </p:txBody>
-      </p:sp>
-      <p:cxnSp>
-        <p:nvCxnSpPr>
-          <p:cNvPr id="60" name="Прямая соединительная линия 59"/>
-          <p:cNvCxnSpPr/>
-          <p:nvPr/>
-        </p:nvCxnSpPr>
-        <p:spPr>
-          <a:xfrm flipH="1">
-            <a:off x="9226464" y="3156006"/>
-            <a:ext cx="1524" cy="227076"/>
-          </a:xfrm>
-          <a:prstGeom prst="line">
-            <a:avLst/>
-          </a:prstGeom>
-        </p:spPr>
-        <p:style>
-          <a:lnRef idx="1">
-            <a:schemeClr val="dk1"/>
-          </a:lnRef>
-          <a:fillRef idx="0">
-            <a:schemeClr val="dk1"/>
-          </a:fillRef>
-          <a:effectRef idx="0">
-            <a:schemeClr val="dk1"/>
-          </a:effectRef>
-          <a:fontRef idx="minor">
-            <a:schemeClr val="tx1"/>
-          </a:fontRef>
-        </p:style>
-      </p:cxnSp>
-      <p:sp>
-        <p:nvSpPr>
-          <p:cNvPr id="61" name="TextBox 60"/>
-          <p:cNvSpPr txBox="1"/>
-          <p:nvPr/>
-        </p:nvSpPr>
-        <p:spPr>
-          <a:xfrm>
-            <a:off x="9023519" y="3449662"/>
-            <a:ext cx="498855" cy="369332"/>
-          </a:xfrm>
-          <a:prstGeom prst="rect">
-            <a:avLst/>
-          </a:prstGeom>
-          <a:noFill/>
-        </p:spPr>
-        <p:txBody>
-          <a:bodyPr wrap="none" rtlCol="0">
-            <a:spAutoFit/>
-          </a:bodyPr>
-          <a:lstStyle/>
-          <a:p>
-            <a:r>
-              <a:rPr lang="en-US" i="1" dirty="0"/>
-              <a:t>3</a:t>
-            </a:r>
-            <a:r>
-              <a:rPr lang="en-US" i="1" dirty="0" smtClean="0"/>
-              <a:t>m</a:t>
-            </a:r>
-            <a:endParaRPr lang="en-US" i="1" dirty="0"/>
-          </a:p>
-        </p:txBody>
-      </p:sp>
-      <p:sp>
-        <p:nvSpPr>
-          <p:cNvPr id="62" name="TextBox 61"/>
-          <p:cNvSpPr txBox="1"/>
-          <p:nvPr/>
-        </p:nvSpPr>
-        <p:spPr>
-          <a:xfrm>
-            <a:off x="9037416" y="3771068"/>
-            <a:ext cx="428322" cy="369332"/>
-          </a:xfrm>
-          <a:prstGeom prst="rect">
-            <a:avLst/>
-          </a:prstGeom>
-          <a:noFill/>
-        </p:spPr>
-        <p:txBody>
-          <a:bodyPr wrap="none" rtlCol="0">
-            <a:spAutoFit/>
-          </a:bodyPr>
-          <a:lstStyle/>
-          <a:p>
-            <a:r>
-              <a:rPr lang="en-US" dirty="0" smtClean="0"/>
-              <a:t>15</a:t>
-            </a:r>
-            <a:endParaRPr lang="en-US" dirty="0"/>
-          </a:p>
-        </p:txBody>
-      </p:sp>
-      <p:cxnSp>
-        <p:nvCxnSpPr>
-          <p:cNvPr id="63" name="Прямая соединительная линия 62"/>
-          <p:cNvCxnSpPr/>
-          <p:nvPr/>
-        </p:nvCxnSpPr>
-        <p:spPr>
-          <a:xfrm flipH="1">
-            <a:off x="9909904" y="3156006"/>
-            <a:ext cx="1524" cy="227076"/>
-          </a:xfrm>
-          <a:prstGeom prst="line">
-            <a:avLst/>
-          </a:prstGeom>
-        </p:spPr>
-        <p:style>
-          <a:lnRef idx="1">
-            <a:schemeClr val="dk1"/>
-          </a:lnRef>
-          <a:fillRef idx="0">
-            <a:schemeClr val="dk1"/>
-          </a:fillRef>
-          <a:effectRef idx="0">
-            <a:schemeClr val="dk1"/>
-          </a:effectRef>
-          <a:fontRef idx="minor">
-            <a:schemeClr val="tx1"/>
-          </a:fontRef>
-        </p:style>
-      </p:cxnSp>
-      <mc:AlternateContent xmlns:mc="http://schemas.openxmlformats.org/markup-compatibility/2006" xmlns:a14="http://schemas.microsoft.com/office/drawing/2010/main">
-        <mc:Choice Requires="a14">
-          <p:sp>
-            <p:nvSpPr>
-              <p:cNvPr id="64" name="TextBox 63"/>
-              <p:cNvSpPr txBox="1"/>
-              <p:nvPr/>
-            </p:nvSpPr>
-            <p:spPr>
-              <a:xfrm>
-                <a:off x="9630133" y="3418551"/>
-                <a:ext cx="1542410" cy="781817"/>
-              </a:xfrm>
-              <a:prstGeom prst="rect">
-                <a:avLst/>
-              </a:prstGeom>
-              <a:noFill/>
-            </p:spPr>
-            <p:txBody>
-              <a:bodyPr wrap="none" rtlCol="0">
-                <a:spAutoFit/>
-              </a:bodyPr>
-              <a:lstStyle/>
-              <a:p>
-                <a:r>
-                  <a:rPr lang="en-US" i="1" dirty="0" smtClean="0"/>
-                  <a:t>4m = </a:t>
-                </a:r>
-                <a14:m>
-                  <m:oMath xmlns:m="http://schemas.openxmlformats.org/officeDocument/2006/math">
-                    <m:d>
-                      <m:dPr>
-                        <m:begChr m:val="⌈"/>
-                        <m:endChr m:val="⌉"/>
-                        <m:ctrlPr>
-                          <a:rPr lang="en-US" i="1">
-                            <a:latin typeface="Cambria Math" panose="02040503050406030204" pitchFamily="18" charset="0"/>
-                          </a:rPr>
-                        </m:ctrlPr>
-                      </m:dPr>
-                      <m:e>
-                        <m:f>
-                          <m:fPr>
-                            <m:ctrlPr>
-                              <a:rPr lang="en-US" i="1">
-                                <a:latin typeface="Cambria Math" panose="02040503050406030204" pitchFamily="18" charset="0"/>
-                              </a:rPr>
-                            </m:ctrlPr>
-                          </m:fPr>
-                          <m:num>
-                            <m:r>
-                              <a:rPr lang="en-US" i="1">
-                                <a:latin typeface="Cambria Math" panose="02040503050406030204" pitchFamily="18" charset="0"/>
-                              </a:rPr>
-                              <m:t>𝑝</m:t>
-                            </m:r>
-                          </m:num>
-                          <m:den>
-                            <m:r>
-                              <a:rPr lang="en-US" i="1">
-                                <a:latin typeface="Cambria Math" panose="02040503050406030204" pitchFamily="18" charset="0"/>
-                              </a:rPr>
-                              <m:t>𝑚</m:t>
-                            </m:r>
-                          </m:den>
-                        </m:f>
-                      </m:e>
-                    </m:d>
-                    <m:r>
-                      <a:rPr lang="en-US" i="1">
-                        <a:latin typeface="Cambria Math" panose="02040503050406030204" pitchFamily="18" charset="0"/>
-                      </a:rPr>
-                      <m:t> −1</m:t>
+                      <m:t> </m:t>
+                    </m:r>
+                    <m:r>
+                      <a:rPr lang="en-US" i="1" smtClean="0">
+                        <a:latin typeface="Cambria Math" panose="02040503050406030204" pitchFamily="18" charset="0"/>
+                      </a:rPr>
+                      <m:t>−1</m:t>
+                    </m:r>
+                    <m:r>
+                      <a:rPr lang="en-US" b="0" i="1" smtClean="0">
+                        <a:latin typeface="Cambria Math" panose="02040503050406030204" pitchFamily="18" charset="0"/>
+                      </a:rPr>
+                      <m:t>)</m:t>
+                    </m:r>
+                    <m:r>
+                      <a:rPr lang="en-US" b="0" i="1" smtClean="0">
+                        <a:latin typeface="Cambria Math" panose="02040503050406030204" pitchFamily="18" charset="0"/>
+                      </a:rPr>
+                      <m:t>𝑚</m:t>
                     </m:r>
                   </m:oMath>
                 </a14:m>
@@ -13230,7 +12954,7 @@
         <mc:Fallback xmlns="">
           <p:sp>
             <p:nvSpPr>
-              <p:cNvPr id="64" name="TextBox 63"/>
+              <p:cNvPr id="81" name="TextBox 80"/>
               <p:cNvSpPr txBox="1">
                 <a:spLocks noRot="1" noChangeAspect="1" noMove="1" noResize="1" noEditPoints="1" noAdjustHandles="1" noChangeArrowheads="1" noChangeShapeType="1" noTextEdit="1"/>
               </p:cNvSpPr>
@@ -13238,16 +12962,16 @@
             </p:nvSpPr>
             <p:spPr>
               <a:xfrm>
-                <a:off x="9630133" y="3418551"/>
-                <a:ext cx="1542410" cy="781817"/>
+                <a:off x="9612717" y="5834068"/>
+                <a:ext cx="1921488" cy="781817"/>
               </a:xfrm>
               <a:prstGeom prst="rect">
                 <a:avLst/>
               </a:prstGeom>
               <a:blipFill rotWithShape="0">
-                <a:blip r:embed="rId7"/>
+                <a:blip r:embed="rId4"/>
                 <a:stretch>
-                  <a:fillRect l="-3557"/>
+                  <a:fillRect l="-2857"/>
                 </a:stretch>
               </a:blipFill>
             </p:spPr>
@@ -13268,13 +12992,13 @@
       </mc:AlternateContent>
       <p:sp>
         <p:nvSpPr>
-          <p:cNvPr id="65" name="TextBox 64"/>
+          <p:cNvPr id="82" name="TextBox 81"/>
           <p:cNvSpPr txBox="1"/>
           <p:nvPr/>
         </p:nvSpPr>
         <p:spPr>
           <a:xfrm>
-            <a:off x="9731795" y="3809459"/>
+            <a:off x="9714379" y="6224976"/>
             <a:ext cx="428322" cy="369332"/>
           </a:xfrm>
           <a:prstGeom prst="rect">
@@ -13298,13 +13022,13 @@
       </p:sp>
       <p:sp>
         <p:nvSpPr>
-          <p:cNvPr id="7" name="TextBox 6"/>
+          <p:cNvPr id="83" name="TextBox 82"/>
           <p:cNvSpPr txBox="1"/>
           <p:nvPr/>
         </p:nvSpPr>
         <p:spPr>
           <a:xfrm>
-            <a:off x="7148033" y="2407515"/>
+            <a:off x="7130617" y="4823032"/>
             <a:ext cx="1007986" cy="646331"/>
           </a:xfrm>
           <a:prstGeom prst="rect">
@@ -13329,6 +13053,66 @@
               <a:t>m = 5</a:t>
             </a:r>
             <a:endParaRPr lang="en-US" dirty="0"/>
+          </a:p>
+        </p:txBody>
+      </p:sp>
+      <p:sp>
+        <p:nvSpPr>
+          <p:cNvPr id="84" name="TextBox 83"/>
+          <p:cNvSpPr txBox="1"/>
+          <p:nvPr/>
+        </p:nvSpPr>
+        <p:spPr>
+          <a:xfrm>
+            <a:off x="5621125" y="5793319"/>
+            <a:ext cx="447558" cy="369332"/>
+          </a:xfrm>
+          <a:prstGeom prst="rect">
+            <a:avLst/>
+          </a:prstGeom>
+          <a:noFill/>
+        </p:spPr>
+        <p:txBody>
+          <a:bodyPr wrap="none" rtlCol="0">
+            <a:spAutoFit/>
+          </a:bodyPr>
+          <a:lstStyle/>
+          <a:p>
+            <a:r>
+              <a:rPr lang="en-US" i="1" dirty="0" smtClean="0"/>
+              <a:t>(s)</a:t>
+            </a:r>
+            <a:endParaRPr lang="en-US" i="1" dirty="0"/>
+          </a:p>
+        </p:txBody>
+      </p:sp>
+      <p:sp>
+        <p:nvSpPr>
+          <p:cNvPr id="85" name="TextBox 84"/>
+          <p:cNvSpPr txBox="1"/>
+          <p:nvPr/>
+        </p:nvSpPr>
+        <p:spPr>
+          <a:xfrm>
+            <a:off x="11447539" y="5716434"/>
+            <a:ext cx="447558" cy="369332"/>
+          </a:xfrm>
+          <a:prstGeom prst="rect">
+            <a:avLst/>
+          </a:prstGeom>
+          <a:noFill/>
+        </p:spPr>
+        <p:txBody>
+          <a:bodyPr wrap="none" rtlCol="0">
+            <a:spAutoFit/>
+          </a:bodyPr>
+          <a:lstStyle/>
+          <a:p>
+            <a:r>
+              <a:rPr lang="en-US" i="1" dirty="0" smtClean="0"/>
+              <a:t>(s)</a:t>
+            </a:r>
+            <a:endParaRPr lang="en-US" i="1" dirty="0"/>
           </a:p>
         </p:txBody>
       </p:sp>
@@ -15606,18 +15390,14 @@
             </a:r>
             <a:r>
               <a:rPr lang="ru-RU" sz="2800" dirty="0" smtClean="0"/>
-              <a:t>семейство хэш-функций для </a:t>
-            </a:r>
-            <a:r>
-              <a:rPr lang="ru-RU" sz="2800" dirty="0" smtClean="0"/>
-              <a:t>строк</a:t>
+              <a:t>семейство хэш-функций для строк</a:t>
             </a:r>
             <a:endParaRPr lang="en-US" sz="2800" dirty="0"/>
           </a:p>
         </p:txBody>
       </p:sp>
-      <mc:AlternateContent xmlns:mc="http://schemas.openxmlformats.org/markup-compatibility/2006">
-        <mc:Choice xmlns:a14="http://schemas.microsoft.com/office/drawing/2010/main" Requires="a14">
+      <mc:AlternateContent xmlns:mc="http://schemas.openxmlformats.org/markup-compatibility/2006" xmlns:a14="http://schemas.microsoft.com/office/drawing/2010/main">
+        <mc:Choice Requires="a14">
           <p:sp>
             <p:nvSpPr>
               <p:cNvPr id="5" name="TextBox 4"/>
@@ -15640,6 +15420,7 @@
               </a:bodyPr>
               <a:lstStyle/>
               <a:p>
+                <a:pPr/>
                 <a14:m>
                   <m:oMathPara xmlns:m="http://schemas.openxmlformats.org/officeDocument/2006/math">
                     <m:oMathParaPr>
@@ -15924,7 +15705,7 @@
             </p:txBody>
           </p:sp>
         </mc:Choice>
-        <mc:Fallback>
+        <mc:Fallback xmlns="">
           <p:sp>
             <p:nvSpPr>
               <p:cNvPr id="5" name="TextBox 4"/>
@@ -15963,8 +15744,8 @@
           </p:sp>
         </mc:Fallback>
       </mc:AlternateContent>
-      <mc:AlternateContent xmlns:mc="http://schemas.openxmlformats.org/markup-compatibility/2006">
-        <mc:Choice xmlns:a14="http://schemas.microsoft.com/office/drawing/2010/main" Requires="a14">
+      <mc:AlternateContent xmlns:mc="http://schemas.openxmlformats.org/markup-compatibility/2006" xmlns:a14="http://schemas.microsoft.com/office/drawing/2010/main">
+        <mc:Choice Requires="a14">
           <p:sp>
             <p:nvSpPr>
               <p:cNvPr id="6" name="Объект 2"/>
@@ -16432,7 +16213,7 @@
             </p:txBody>
           </p:sp>
         </mc:Choice>
-        <mc:Fallback>
+        <mc:Fallback xmlns="">
           <p:sp>
             <p:nvSpPr>
               <p:cNvPr id="6" name="Объект 2"/>
@@ -16471,8 +16252,8 @@
           </p:sp>
         </mc:Fallback>
       </mc:AlternateContent>
-      <mc:AlternateContent xmlns:mc="http://schemas.openxmlformats.org/markup-compatibility/2006">
-        <mc:Choice xmlns:a14="http://schemas.microsoft.com/office/drawing/2010/main" Requires="a14">
+      <mc:AlternateContent xmlns:mc="http://schemas.openxmlformats.org/markup-compatibility/2006" xmlns:a14="http://schemas.microsoft.com/office/drawing/2010/main">
+        <mc:Choice Requires="a14">
           <p:sp>
             <p:nvSpPr>
               <p:cNvPr id="7" name="TextBox 6"/>
@@ -16495,6 +16276,7 @@
               </a:bodyPr>
               <a:lstStyle/>
               <a:p>
+                <a:pPr/>
                 <a14:m>
                   <m:oMathPara xmlns:m="http://schemas.openxmlformats.org/officeDocument/2006/math">
                     <m:oMathParaPr>
@@ -16863,7 +16645,7 @@
             </p:txBody>
           </p:sp>
         </mc:Choice>
-        <mc:Fallback>
+        <mc:Fallback xmlns="">
           <p:sp>
             <p:nvSpPr>
               <p:cNvPr id="7" name="TextBox 6"/>
@@ -16902,8 +16684,8 @@
           </p:sp>
         </mc:Fallback>
       </mc:AlternateContent>
-      <mc:AlternateContent xmlns:mc="http://schemas.openxmlformats.org/markup-compatibility/2006">
-        <mc:Choice xmlns:a14="http://schemas.microsoft.com/office/drawing/2010/main" Requires="a14">
+      <mc:AlternateContent xmlns:mc="http://schemas.openxmlformats.org/markup-compatibility/2006" xmlns:a14="http://schemas.microsoft.com/office/drawing/2010/main">
+        <mc:Choice Requires="a14">
           <p:sp>
             <p:nvSpPr>
               <p:cNvPr id="8" name="Объект 2"/>
@@ -16926,7 +16708,7 @@
             </p:spPr>
             <p:txBody>
               <a:bodyPr vert="horz" lIns="91440" tIns="45720" rIns="91440" bIns="45720" rtlCol="0">
-                <a:normAutofit lnSpcReduction="10000"/>
+                <a:normAutofit/>
               </a:bodyPr>
               <a:lstStyle>
                 <a:lvl1pPr marL="342900" indent="-342900" algn="l" defTabSz="457200" rtl="0" eaLnBrk="1" latinLnBrk="0" hangingPunct="1">
@@ -17541,20 +17323,9 @@
                 </a:r>
                 <a:r>
                   <a:rPr lang="ru-RU" dirty="0" smtClean="0"/>
-                  <a:t> приводит к коллизии, т.е., если бы остатка от деления на </a:t>
-                </a:r>
-                <a:r>
-                  <a:rPr lang="en-US" i="1" dirty="0" smtClean="0"/>
-                  <a:t>p </a:t>
-                </a:r>
-                <a:r>
-                  <a:rPr lang="ru-RU" i="1" dirty="0" smtClean="0"/>
-                  <a:t>«</a:t>
-                </a:r>
-                <a:r>
-                  <a:rPr lang="ru-RU" dirty="0" smtClean="0"/>
-                  <a:t>не было», для данных двух строк существовало бы не более 9 хэш-функций в данном семействе, которые давали бы для них одинаковые значения</a:t>
-                </a:r>
+                  <a:t> приводит к коллизии</a:t>
+                </a:r>
+                <a:endParaRPr lang="en-US" dirty="0" smtClean="0"/>
               </a:p>
               <a:p>
                 <a:r>
@@ -17574,30 +17345,9 @@
                   <a:t>p</a:t>
                 </a:r>
                 <a:r>
-                  <a:rPr lang="en-US" dirty="0" smtClean="0"/>
-                  <a:t>, </a:t>
-                </a:r>
-                <a:r>
-                  <a:rPr lang="en-US" i="1" dirty="0" smtClean="0"/>
-                  <a:t>L</a:t>
-                </a:r>
-                <a:r>
-                  <a:rPr lang="en-US" dirty="0" smtClean="0"/>
-                  <a:t> </a:t>
-                </a:r>
-                <a:r>
-                  <a:rPr lang="ru-RU" dirty="0" smtClean="0"/>
-                  <a:t>корней приходится на каждое </a:t>
-                </a:r>
-                <a:r>
-                  <a:rPr lang="en-US" i="1" dirty="0" smtClean="0"/>
-                  <a:t>p</a:t>
-                </a:r>
-                <a:r>
-                  <a:rPr lang="ru-RU" i="1" dirty="0"/>
+                  <a:rPr lang="ru-RU" i="1" dirty="0" smtClean="0"/>
                   <a:t>:</a:t>
                 </a:r>
-                <a:endParaRPr lang="ru-RU" i="1" dirty="0" smtClean="0"/>
               </a:p>
               <a:p>
                 <a:endParaRPr lang="ru-RU" dirty="0" smtClean="0"/>
@@ -17605,7 +17355,7 @@
             </p:txBody>
           </p:sp>
         </mc:Choice>
-        <mc:Fallback>
+        <mc:Fallback xmlns="">
           <p:sp>
             <p:nvSpPr>
               <p:cNvPr id="8" name="Объект 2"/>
@@ -17625,7 +17375,7 @@
               <a:blipFill rotWithShape="0">
                 <a:blip r:embed="rId5"/>
                 <a:stretch>
-                  <a:fillRect l="-104" t="-3846" r="-52"/>
+                  <a:fillRect l="-104" t="-2308" r="-52"/>
                 </a:stretch>
               </a:blipFill>
             </p:spPr>
@@ -17644,8 +17394,8 @@
           </p:sp>
         </mc:Fallback>
       </mc:AlternateContent>
-      <mc:AlternateContent xmlns:mc="http://schemas.openxmlformats.org/markup-compatibility/2006">
-        <mc:Choice xmlns:a14="http://schemas.microsoft.com/office/drawing/2010/main" Requires="a14">
+      <mc:AlternateContent xmlns:mc="http://schemas.openxmlformats.org/markup-compatibility/2006" xmlns:a14="http://schemas.microsoft.com/office/drawing/2010/main">
+        <mc:Choice Requires="a14">
           <p:sp>
             <p:nvSpPr>
               <p:cNvPr id="9" name="TextBox 8"/>
@@ -17654,7 +17404,7 @@
             </p:nvSpPr>
             <p:spPr>
               <a:xfrm>
-                <a:off x="4477731" y="6130989"/>
+                <a:off x="4691037" y="6030320"/>
                 <a:ext cx="2350515" cy="516745"/>
               </a:xfrm>
               <a:prstGeom prst="rect">
@@ -17668,6 +17418,7 @@
               </a:bodyPr>
               <a:lstStyle/>
               <a:p>
+                <a:pPr/>
                 <a14:m>
                   <m:oMathPara xmlns:m="http://schemas.openxmlformats.org/officeDocument/2006/math">
                     <m:oMathParaPr>
@@ -17842,7 +17593,7 @@
             </p:txBody>
           </p:sp>
         </mc:Choice>
-        <mc:Fallback>
+        <mc:Fallback xmlns="">
           <p:sp>
             <p:nvSpPr>
               <p:cNvPr id="9" name="TextBox 8"/>
@@ -17853,7 +17604,7 @@
             </p:nvSpPr>
             <p:spPr>
               <a:xfrm>
-                <a:off x="4477731" y="6130989"/>
+                <a:off x="4691037" y="6030320"/>
                 <a:ext cx="2350515" cy="516745"/>
               </a:xfrm>
               <a:prstGeom prst="rect">
@@ -17911,8 +17662,8 @@
           <a:chExt cx="0" cy="0"/>
         </a:xfrm>
       </p:grpSpPr>
-      <mc:AlternateContent xmlns:mc="http://schemas.openxmlformats.org/markup-compatibility/2006">
-        <mc:Choice xmlns:a14="http://schemas.microsoft.com/office/drawing/2010/main" Requires="a14">
+      <mc:AlternateContent xmlns:mc="http://schemas.openxmlformats.org/markup-compatibility/2006" xmlns:a14="http://schemas.microsoft.com/office/drawing/2010/main">
+        <mc:Choice Requires="a14">
           <p:sp>
             <p:nvSpPr>
               <p:cNvPr id="3" name="Объект 2"/>
@@ -18391,7 +18142,7 @@
             </p:txBody>
           </p:sp>
         </mc:Choice>
-        <mc:Fallback>
+        <mc:Fallback xmlns="">
           <p:sp>
             <p:nvSpPr>
               <p:cNvPr id="3" name="Объект 2"/>
@@ -18544,18 +18295,14 @@
             </a:r>
             <a:r>
               <a:rPr lang="ru-RU" sz="2800" dirty="0" smtClean="0"/>
-              <a:t>семейство хэш-функций для </a:t>
-            </a:r>
-            <a:r>
-              <a:rPr lang="ru-RU" sz="2800" dirty="0" smtClean="0"/>
-              <a:t>строк</a:t>
+              <a:t>семейство хэш-функций для строк</a:t>
             </a:r>
             <a:endParaRPr lang="en-US" sz="2800" dirty="0"/>
           </a:p>
         </p:txBody>
       </p:sp>
-      <mc:AlternateContent xmlns:mc="http://schemas.openxmlformats.org/markup-compatibility/2006">
-        <mc:Choice xmlns:a14="http://schemas.microsoft.com/office/drawing/2010/main" Requires="a14">
+      <mc:AlternateContent xmlns:mc="http://schemas.openxmlformats.org/markup-compatibility/2006" xmlns:a14="http://schemas.microsoft.com/office/drawing/2010/main">
+        <mc:Choice Requires="a14">
           <p:sp>
             <p:nvSpPr>
               <p:cNvPr id="5" name="TextBox 4"/>
@@ -18578,6 +18325,7 @@
               </a:bodyPr>
               <a:lstStyle/>
               <a:p>
+                <a:pPr/>
                 <a14:m>
                   <m:oMathPara xmlns:m="http://schemas.openxmlformats.org/officeDocument/2006/math">
                     <m:oMathParaPr>
@@ -18862,7 +18610,7 @@
             </p:txBody>
           </p:sp>
         </mc:Choice>
-        <mc:Fallback>
+        <mc:Fallback xmlns="">
           <p:sp>
             <p:nvSpPr>
               <p:cNvPr id="5" name="TextBox 4"/>
@@ -18901,8 +18649,8 @@
           </p:sp>
         </mc:Fallback>
       </mc:AlternateContent>
-      <mc:AlternateContent xmlns:mc="http://schemas.openxmlformats.org/markup-compatibility/2006">
-        <mc:Choice xmlns:a14="http://schemas.microsoft.com/office/drawing/2010/main" Requires="a14">
+      <mc:AlternateContent xmlns:mc="http://schemas.openxmlformats.org/markup-compatibility/2006" xmlns:a14="http://schemas.microsoft.com/office/drawing/2010/main">
+        <mc:Choice Requires="a14">
           <p:sp>
             <p:nvSpPr>
               <p:cNvPr id="7" name="TextBox 6"/>
@@ -18925,6 +18673,7 @@
               </a:bodyPr>
               <a:lstStyle/>
               <a:p>
+                <a:pPr/>
                 <a14:m>
                   <m:oMathPara xmlns:m="http://schemas.openxmlformats.org/officeDocument/2006/math">
                     <m:oMathParaPr>
@@ -19218,7 +18967,7 @@
             </p:txBody>
           </p:sp>
         </mc:Choice>
-        <mc:Fallback>
+        <mc:Fallback xmlns="">
           <p:sp>
             <p:nvSpPr>
               <p:cNvPr id="7" name="TextBox 6"/>
@@ -19257,8 +19006,8 @@
           </p:sp>
         </mc:Fallback>
       </mc:AlternateContent>
-      <mc:AlternateContent xmlns:mc="http://schemas.openxmlformats.org/markup-compatibility/2006">
-        <mc:Choice xmlns:a14="http://schemas.microsoft.com/office/drawing/2010/main" Requires="a14">
+      <mc:AlternateContent xmlns:mc="http://schemas.openxmlformats.org/markup-compatibility/2006" xmlns:a14="http://schemas.microsoft.com/office/drawing/2010/main">
+        <mc:Choice Requires="a14">
           <p:sp>
             <p:nvSpPr>
               <p:cNvPr id="8" name="Объект 2"/>
@@ -19570,7 +19319,7 @@
             </p:txBody>
           </p:sp>
         </mc:Choice>
-        <mc:Fallback>
+        <mc:Fallback xmlns="">
           <p:sp>
             <p:nvSpPr>
               <p:cNvPr id="8" name="Объект 2"/>
@@ -23906,7 +23655,7 @@
               <p:cNvPr id="7" name="TextBox 6">
                 <a:extLst>
                   <a:ext uri="{FF2B5EF4-FFF2-40B4-BE49-F238E27FC236}">
-                    <a16:creationId xmlns="" xmlns:a16="http://schemas.microsoft.com/office/drawing/2014/main" id="{D3D749A8-FA36-4046-B47E-69B97D4205E7}"/>
+                    <a16:creationId xmlns:a16="http://schemas.microsoft.com/office/drawing/2014/main" xmlns="" xmlns:a14="http://schemas.microsoft.com/office/drawing/2010/main" id="{D3D749A8-FA36-4046-B47E-69B97D4205E7}"/>
                   </a:ext>
                 </a:extLst>
               </p:cNvPr>
@@ -24775,8 +24524,8 @@
           </p:sp>
         </mc:Fallback>
       </mc:AlternateContent>
-      <mc:AlternateContent xmlns:mc="http://schemas.openxmlformats.org/markup-compatibility/2006" xmlns:a14="http://schemas.microsoft.com/office/drawing/2010/main">
-        <mc:Choice Requires="a14">
+      <mc:AlternateContent xmlns:mc="http://schemas.openxmlformats.org/markup-compatibility/2006">
+        <mc:Choice xmlns:a14="http://schemas.microsoft.com/office/drawing/2010/main" Requires="a14">
           <p:sp>
             <p:nvSpPr>
               <p:cNvPr id="7" name="Объект 2"/>
@@ -26326,13 +26075,18 @@
               <a:p>
                 <a:r>
                   <a:rPr lang="ru-RU" dirty="0" smtClean="0"/>
-                  <a:t>Настоящее аксиоматическое определение гораздо сложнее. См., например, учебник В.П. Чистякова «Курс теории вероятностей» - хороший учебник для инженеров нематематических специальностей</a:t>
-                </a:r>
+                  <a:t>Настоящее аксиоматическое определение гораздо </a:t>
+                </a:r>
+                <a:r>
+                  <a:rPr lang="ru-RU" dirty="0" smtClean="0"/>
+                  <a:t>сложнее. См., например, учебник В.П. Чистякова «Курс теории вероятностей»</a:t>
+                </a:r>
+                <a:endParaRPr lang="ru-RU" dirty="0" smtClean="0"/>
               </a:p>
             </p:txBody>
           </p:sp>
         </mc:Choice>
-        <mc:Fallback xmlns="">
+        <mc:Fallback>
           <p:sp>
             <p:nvSpPr>
               <p:cNvPr id="7" name="Объект 2"/>
@@ -26350,7 +26104,7 @@
                 <a:avLst/>
               </a:prstGeom>
               <a:blipFill rotWithShape="0">
-                <a:blip r:embed="rId7"/>
+                <a:blip r:embed="rId6"/>
                 <a:stretch>
                   <a:fillRect l="-104" t="-272"/>
                 </a:stretch>

</xml_diff>

<commit_message>
pt2 lecture4: hashtables. Minor fixes
</commit_message>
<xml_diff>
--- a/pt2/lectures/lecture4/lecture4.pptx
+++ b/pt2/lectures/lecture4/lecture4.pptx
@@ -212,7 +212,7 @@
           <a:p>
             <a:fld id="{7AB54776-5C19-4010-B03E-1D9819AD498B}" type="datetimeFigureOut">
               <a:rPr lang="en-US" smtClean="0"/>
-              <a:t>10/13/2022</a:t>
+              <a:t>10/26/2022</a:t>
             </a:fld>
             <a:endParaRPr lang="en-US"/>
           </a:p>
@@ -1286,7 +1286,7 @@
           <a:p>
             <a:fld id="{78B714E4-0873-4C87-8B25-50C01080B0FC}" type="datetimeFigureOut">
               <a:rPr lang="en-US" smtClean="0"/>
-              <a:t>10/13/2022</a:t>
+              <a:t>10/26/2022</a:t>
             </a:fld>
             <a:endParaRPr lang="en-US"/>
           </a:p>
@@ -1537,7 +1537,7 @@
           <a:p>
             <a:fld id="{78B714E4-0873-4C87-8B25-50C01080B0FC}" type="datetimeFigureOut">
               <a:rPr lang="en-US" smtClean="0"/>
-              <a:t>10/13/2022</a:t>
+              <a:t>10/26/2022</a:t>
             </a:fld>
             <a:endParaRPr lang="en-US"/>
           </a:p>
@@ -1851,7 +1851,7 @@
           <a:p>
             <a:fld id="{78B714E4-0873-4C87-8B25-50C01080B0FC}" type="datetimeFigureOut">
               <a:rPr lang="en-US" smtClean="0"/>
-              <a:t>10/13/2022</a:t>
+              <a:t>10/26/2022</a:t>
             </a:fld>
             <a:endParaRPr lang="en-US"/>
           </a:p>
@@ -2192,7 +2192,7 @@
           <a:p>
             <a:fld id="{78B714E4-0873-4C87-8B25-50C01080B0FC}" type="datetimeFigureOut">
               <a:rPr lang="en-US" smtClean="0"/>
-              <a:t>10/13/2022</a:t>
+              <a:t>10/26/2022</a:t>
             </a:fld>
             <a:endParaRPr lang="en-US"/>
           </a:p>
@@ -2506,7 +2506,7 @@
           <a:p>
             <a:fld id="{78B714E4-0873-4C87-8B25-50C01080B0FC}" type="datetimeFigureOut">
               <a:rPr lang="en-US" smtClean="0"/>
-              <a:t>10/13/2022</a:t>
+              <a:t>10/26/2022</a:t>
             </a:fld>
             <a:endParaRPr lang="en-US"/>
           </a:p>
@@ -2899,7 +2899,7 @@
           <a:p>
             <a:fld id="{78B714E4-0873-4C87-8B25-50C01080B0FC}" type="datetimeFigureOut">
               <a:rPr lang="en-US" smtClean="0"/>
-              <a:t>10/13/2022</a:t>
+              <a:t>10/26/2022</a:t>
             </a:fld>
             <a:endParaRPr lang="en-US"/>
           </a:p>
@@ -3069,7 +3069,7 @@
           <a:p>
             <a:fld id="{78B714E4-0873-4C87-8B25-50C01080B0FC}" type="datetimeFigureOut">
               <a:rPr lang="en-US" smtClean="0"/>
-              <a:t>10/13/2022</a:t>
+              <a:t>10/26/2022</a:t>
             </a:fld>
             <a:endParaRPr lang="en-US"/>
           </a:p>
@@ -3249,7 +3249,7 @@
           <a:p>
             <a:fld id="{78B714E4-0873-4C87-8B25-50C01080B0FC}" type="datetimeFigureOut">
               <a:rPr lang="en-US" smtClean="0"/>
-              <a:t>10/13/2022</a:t>
+              <a:t>10/26/2022</a:t>
             </a:fld>
             <a:endParaRPr lang="en-US"/>
           </a:p>
@@ -3425,7 +3425,7 @@
           <a:p>
             <a:fld id="{78B714E4-0873-4C87-8B25-50C01080B0FC}" type="datetimeFigureOut">
               <a:rPr lang="en-US" smtClean="0"/>
-              <a:t>10/13/2022</a:t>
+              <a:t>10/26/2022</a:t>
             </a:fld>
             <a:endParaRPr lang="en-US"/>
           </a:p>
@@ -3672,7 +3672,7 @@
           <a:p>
             <a:fld id="{78B714E4-0873-4C87-8B25-50C01080B0FC}" type="datetimeFigureOut">
               <a:rPr lang="en-US" smtClean="0"/>
-              <a:t>10/13/2022</a:t>
+              <a:t>10/26/2022</a:t>
             </a:fld>
             <a:endParaRPr lang="en-US"/>
           </a:p>
@@ -3904,7 +3904,7 @@
           <a:p>
             <a:fld id="{78B714E4-0873-4C87-8B25-50C01080B0FC}" type="datetimeFigureOut">
               <a:rPr lang="en-US" smtClean="0"/>
-              <a:t>10/13/2022</a:t>
+              <a:t>10/26/2022</a:t>
             </a:fld>
             <a:endParaRPr lang="en-US"/>
           </a:p>
@@ -4278,7 +4278,7 @@
           <a:p>
             <a:fld id="{78B714E4-0873-4C87-8B25-50C01080B0FC}" type="datetimeFigureOut">
               <a:rPr lang="en-US" smtClean="0"/>
-              <a:t>10/13/2022</a:t>
+              <a:t>10/26/2022</a:t>
             </a:fld>
             <a:endParaRPr lang="en-US"/>
           </a:p>
@@ -4401,7 +4401,7 @@
           <a:p>
             <a:fld id="{78B714E4-0873-4C87-8B25-50C01080B0FC}" type="datetimeFigureOut">
               <a:rPr lang="en-US" smtClean="0"/>
-              <a:t>10/13/2022</a:t>
+              <a:t>10/26/2022</a:t>
             </a:fld>
             <a:endParaRPr lang="en-US"/>
           </a:p>
@@ -4496,7 +4496,7 @@
           <a:p>
             <a:fld id="{78B714E4-0873-4C87-8B25-50C01080B0FC}" type="datetimeFigureOut">
               <a:rPr lang="en-US" smtClean="0"/>
-              <a:t>10/13/2022</a:t>
+              <a:t>10/26/2022</a:t>
             </a:fld>
             <a:endParaRPr lang="en-US"/>
           </a:p>
@@ -4751,7 +4751,7 @@
           <a:p>
             <a:fld id="{78B714E4-0873-4C87-8B25-50C01080B0FC}" type="datetimeFigureOut">
               <a:rPr lang="en-US" smtClean="0"/>
-              <a:t>10/13/2022</a:t>
+              <a:t>10/26/2022</a:t>
             </a:fld>
             <a:endParaRPr lang="en-US"/>
           </a:p>
@@ -5014,7 +5014,7 @@
           <a:p>
             <a:fld id="{78B714E4-0873-4C87-8B25-50C01080B0FC}" type="datetimeFigureOut">
               <a:rPr lang="en-US" smtClean="0"/>
-              <a:t>10/13/2022</a:t>
+              <a:t>10/26/2022</a:t>
             </a:fld>
             <a:endParaRPr lang="en-US"/>
           </a:p>
@@ -5757,7 +5757,7 @@
           <a:p>
             <a:fld id="{78B714E4-0873-4C87-8B25-50C01080B0FC}" type="datetimeFigureOut">
               <a:rPr lang="en-US" smtClean="0"/>
-              <a:t>10/13/2022</a:t>
+              <a:t>10/26/2022</a:t>
             </a:fld>
             <a:endParaRPr lang="en-US"/>
           </a:p>
@@ -6286,7 +6286,7 @@
           <p:cNvPr id="4" name="Title 1">
             <a:extLst>
               <a:ext uri="{FF2B5EF4-FFF2-40B4-BE49-F238E27FC236}">
-                <a16:creationId xmlns="" xmlns:a16="http://schemas.microsoft.com/office/drawing/2014/main" id="{13B2D513-0F9C-4439-A697-A295339863B6}"/>
+                <a16:creationId xmlns:a16="http://schemas.microsoft.com/office/drawing/2014/main" xmlns="" id="{13B2D513-0F9C-4439-A697-A295339863B6}"/>
               </a:ext>
             </a:extLst>
           </p:cNvPr>
@@ -6329,7 +6329,7 @@
           <p:cNvPr id="5" name="Subtitle 2">
             <a:extLst>
               <a:ext uri="{FF2B5EF4-FFF2-40B4-BE49-F238E27FC236}">
-                <a16:creationId xmlns="" xmlns:a16="http://schemas.microsoft.com/office/drawing/2014/main" id="{37C9EE23-73D5-41F8-AFFF-4BA477FCB643}"/>
+                <a16:creationId xmlns:a16="http://schemas.microsoft.com/office/drawing/2014/main" xmlns="" id="{37C9EE23-73D5-41F8-AFFF-4BA477FCB643}"/>
               </a:ext>
             </a:extLst>
           </p:cNvPr>
@@ -8575,7 +8575,7 @@
           <p:cNvPr id="4" name="Title 1">
             <a:extLst>
               <a:ext uri="{FF2B5EF4-FFF2-40B4-BE49-F238E27FC236}">
-                <a16:creationId xmlns="" xmlns:a16="http://schemas.microsoft.com/office/drawing/2014/main" id="{4CA55238-3C9D-4C38-A104-D409C9FA14AF}"/>
+                <a16:creationId xmlns:a16="http://schemas.microsoft.com/office/drawing/2014/main" xmlns="" id="{4CA55238-3C9D-4C38-A104-D409C9FA14AF}"/>
               </a:ext>
             </a:extLst>
           </p:cNvPr>
@@ -9286,7 +9286,7 @@
           <p:cNvPr id="4" name="Title 1">
             <a:extLst>
               <a:ext uri="{FF2B5EF4-FFF2-40B4-BE49-F238E27FC236}">
-                <a16:creationId xmlns="" xmlns:a16="http://schemas.microsoft.com/office/drawing/2014/main" id="{4CA55238-3C9D-4C38-A104-D409C9FA14AF}"/>
+                <a16:creationId xmlns:a16="http://schemas.microsoft.com/office/drawing/2014/main" xmlns="" id="{4CA55238-3C9D-4C38-A104-D409C9FA14AF}"/>
               </a:ext>
             </a:extLst>
           </p:cNvPr>
@@ -11666,7 +11666,7 @@
           <p:cNvPr id="4" name="Title 1">
             <a:extLst>
               <a:ext uri="{FF2B5EF4-FFF2-40B4-BE49-F238E27FC236}">
-                <a16:creationId xmlns="" xmlns:a16="http://schemas.microsoft.com/office/drawing/2014/main" id="{4CA55238-3C9D-4C38-A104-D409C9FA14AF}"/>
+                <a16:creationId xmlns:a16="http://schemas.microsoft.com/office/drawing/2014/main" xmlns="" id="{4CA55238-3C9D-4C38-A104-D409C9FA14AF}"/>
               </a:ext>
             </a:extLst>
           </p:cNvPr>
@@ -13711,7 +13711,7 @@
           <p:cNvPr id="4" name="Title 1">
             <a:extLst>
               <a:ext uri="{FF2B5EF4-FFF2-40B4-BE49-F238E27FC236}">
-                <a16:creationId xmlns="" xmlns:a16="http://schemas.microsoft.com/office/drawing/2014/main" id="{4CA55238-3C9D-4C38-A104-D409C9FA14AF}"/>
+                <a16:creationId xmlns:a16="http://schemas.microsoft.com/office/drawing/2014/main" xmlns="" id="{4CA55238-3C9D-4C38-A104-D409C9FA14AF}"/>
               </a:ext>
             </a:extLst>
           </p:cNvPr>
@@ -15280,7 +15280,7 @@
           <p:cNvPr id="4" name="Title 1">
             <a:extLst>
               <a:ext uri="{FF2B5EF4-FFF2-40B4-BE49-F238E27FC236}">
-                <a16:creationId xmlns="" xmlns:a16="http://schemas.microsoft.com/office/drawing/2014/main" id="{4CA55238-3C9D-4C38-A104-D409C9FA14AF}"/>
+                <a16:creationId xmlns:a16="http://schemas.microsoft.com/office/drawing/2014/main" xmlns="" id="{4CA55238-3C9D-4C38-A104-D409C9FA14AF}"/>
               </a:ext>
             </a:extLst>
           </p:cNvPr>
@@ -18185,7 +18185,7 @@
           <p:cNvPr id="4" name="Title 1">
             <a:extLst>
               <a:ext uri="{FF2B5EF4-FFF2-40B4-BE49-F238E27FC236}">
-                <a16:creationId xmlns="" xmlns:a16="http://schemas.microsoft.com/office/drawing/2014/main" id="{4CA55238-3C9D-4C38-A104-D409C9FA14AF}"/>
+                <a16:creationId xmlns:a16="http://schemas.microsoft.com/office/drawing/2014/main" xmlns="" id="{4CA55238-3C9D-4C38-A104-D409C9FA14AF}"/>
               </a:ext>
             </a:extLst>
           </p:cNvPr>
@@ -19485,7 +19485,7 @@
           <p:cNvPr id="4" name="Title 1">
             <a:extLst>
               <a:ext uri="{FF2B5EF4-FFF2-40B4-BE49-F238E27FC236}">
-                <a16:creationId xmlns="" xmlns:a16="http://schemas.microsoft.com/office/drawing/2014/main" id="{4CA55238-3C9D-4C38-A104-D409C9FA14AF}"/>
+                <a16:creationId xmlns:a16="http://schemas.microsoft.com/office/drawing/2014/main" xmlns="" id="{4CA55238-3C9D-4C38-A104-D409C9FA14AF}"/>
               </a:ext>
             </a:extLst>
           </p:cNvPr>
@@ -19684,7 +19684,7 @@
           <p:cNvPr id="4" name="Title 1">
             <a:extLst>
               <a:ext uri="{FF2B5EF4-FFF2-40B4-BE49-F238E27FC236}">
-                <a16:creationId xmlns="" xmlns:a16="http://schemas.microsoft.com/office/drawing/2014/main" id="{78F05172-2BB6-4969-9FAE-01AFF727CD79}"/>
+                <a16:creationId xmlns:a16="http://schemas.microsoft.com/office/drawing/2014/main" xmlns="" id="{78F05172-2BB6-4969-9FAE-01AFF727CD79}"/>
               </a:ext>
             </a:extLst>
           </p:cNvPr>
@@ -19878,7 +19878,7 @@
           <p:cNvPr id="8" name="Рисунок 4">
             <a:extLst>
               <a:ext uri="{FF2B5EF4-FFF2-40B4-BE49-F238E27FC236}">
-                <a16:creationId xmlns="" xmlns:a16="http://schemas.microsoft.com/office/drawing/2014/main" id="{E4E1491A-E1CF-4A9A-A7F5-D528AEC1429E}"/>
+                <a16:creationId xmlns:a16="http://schemas.microsoft.com/office/drawing/2014/main" xmlns="" id="{E4E1491A-E1CF-4A9A-A7F5-D528AEC1429E}"/>
               </a:ext>
             </a:extLst>
           </p:cNvPr>
@@ -19908,7 +19908,7 @@
           <p:cNvPr id="9" name="Рисунок 5">
             <a:extLst>
               <a:ext uri="{FF2B5EF4-FFF2-40B4-BE49-F238E27FC236}">
-                <a16:creationId xmlns="" xmlns:a16="http://schemas.microsoft.com/office/drawing/2014/main" id="{30E791D8-BFED-4DE1-BBDB-8B5874B8EE25}"/>
+                <a16:creationId xmlns:a16="http://schemas.microsoft.com/office/drawing/2014/main" xmlns="" id="{30E791D8-BFED-4DE1-BBDB-8B5874B8EE25}"/>
               </a:ext>
             </a:extLst>
           </p:cNvPr>
@@ -19938,7 +19938,7 @@
           <p:cNvPr id="10" name="Прямоугольник 6">
             <a:extLst>
               <a:ext uri="{FF2B5EF4-FFF2-40B4-BE49-F238E27FC236}">
-                <a16:creationId xmlns="" xmlns:a16="http://schemas.microsoft.com/office/drawing/2014/main" id="{F15A42DA-A95E-4B48-8F24-DF36106CE0F8}"/>
+                <a16:creationId xmlns:a16="http://schemas.microsoft.com/office/drawing/2014/main" xmlns="" id="{F15A42DA-A95E-4B48-8F24-DF36106CE0F8}"/>
               </a:ext>
             </a:extLst>
           </p:cNvPr>
@@ -20288,7 +20288,7 @@
           <p:cNvPr id="8" name="Title 1">
             <a:extLst>
               <a:ext uri="{FF2B5EF4-FFF2-40B4-BE49-F238E27FC236}">
-                <a16:creationId xmlns="" xmlns:a16="http://schemas.microsoft.com/office/drawing/2014/main" id="{78F05172-2BB6-4969-9FAE-01AFF727CD79}"/>
+                <a16:creationId xmlns:a16="http://schemas.microsoft.com/office/drawing/2014/main" xmlns="" id="{78F05172-2BB6-4969-9FAE-01AFF727CD79}"/>
               </a:ext>
             </a:extLst>
           </p:cNvPr>
@@ -20408,7 +20408,7 @@
           <p:cNvPr id="9" name="Прямоугольник 33">
             <a:extLst>
               <a:ext uri="{FF2B5EF4-FFF2-40B4-BE49-F238E27FC236}">
-                <a16:creationId xmlns="" xmlns:a16="http://schemas.microsoft.com/office/drawing/2014/main" id="{5446426F-E73D-4E73-86F9-B246F5EA9EB1}"/>
+                <a16:creationId xmlns:a16="http://schemas.microsoft.com/office/drawing/2014/main" xmlns="" id="{5446426F-E73D-4E73-86F9-B246F5EA9EB1}"/>
               </a:ext>
             </a:extLst>
           </p:cNvPr>
@@ -20452,7 +20452,7 @@
           <p:cNvPr id="10" name="Прямоугольник 34">
             <a:extLst>
               <a:ext uri="{FF2B5EF4-FFF2-40B4-BE49-F238E27FC236}">
-                <a16:creationId xmlns="" xmlns:a16="http://schemas.microsoft.com/office/drawing/2014/main" id="{BDF6C4E9-A465-4551-96E7-EB06FBF7850B}"/>
+                <a16:creationId xmlns:a16="http://schemas.microsoft.com/office/drawing/2014/main" xmlns="" id="{BDF6C4E9-A465-4551-96E7-EB06FBF7850B}"/>
               </a:ext>
             </a:extLst>
           </p:cNvPr>
@@ -20496,7 +20496,7 @@
           <p:cNvPr id="11" name="Прямоугольник 35">
             <a:extLst>
               <a:ext uri="{FF2B5EF4-FFF2-40B4-BE49-F238E27FC236}">
-                <a16:creationId xmlns="" xmlns:a16="http://schemas.microsoft.com/office/drawing/2014/main" id="{CFE7C1A3-BF70-4740-98ED-C95DF2B1E605}"/>
+                <a16:creationId xmlns:a16="http://schemas.microsoft.com/office/drawing/2014/main" xmlns="" id="{CFE7C1A3-BF70-4740-98ED-C95DF2B1E605}"/>
               </a:ext>
             </a:extLst>
           </p:cNvPr>
@@ -20540,7 +20540,7 @@
           <p:cNvPr id="14" name="Прямоугольник 38">
             <a:extLst>
               <a:ext uri="{FF2B5EF4-FFF2-40B4-BE49-F238E27FC236}">
-                <a16:creationId xmlns="" xmlns:a16="http://schemas.microsoft.com/office/drawing/2014/main" id="{C2367501-0A91-422C-8428-658E03BEF538}"/>
+                <a16:creationId xmlns:a16="http://schemas.microsoft.com/office/drawing/2014/main" xmlns="" id="{C2367501-0A91-422C-8428-658E03BEF538}"/>
               </a:ext>
             </a:extLst>
           </p:cNvPr>
@@ -20584,7 +20584,7 @@
           <p:cNvPr id="15" name="Прямоугольник 39">
             <a:extLst>
               <a:ext uri="{FF2B5EF4-FFF2-40B4-BE49-F238E27FC236}">
-                <a16:creationId xmlns="" xmlns:a16="http://schemas.microsoft.com/office/drawing/2014/main" id="{5E451CC2-05BA-4E21-BB67-3C1C50EBE255}"/>
+                <a16:creationId xmlns:a16="http://schemas.microsoft.com/office/drawing/2014/main" xmlns="" id="{5E451CC2-05BA-4E21-BB67-3C1C50EBE255}"/>
               </a:ext>
             </a:extLst>
           </p:cNvPr>
@@ -20628,7 +20628,7 @@
           <p:cNvPr id="16" name="Прямоугольник 40">
             <a:extLst>
               <a:ext uri="{FF2B5EF4-FFF2-40B4-BE49-F238E27FC236}">
-                <a16:creationId xmlns="" xmlns:a16="http://schemas.microsoft.com/office/drawing/2014/main" id="{33164B30-E0F1-41F6-B66C-7E55D03FA556}"/>
+                <a16:creationId xmlns:a16="http://schemas.microsoft.com/office/drawing/2014/main" xmlns="" id="{33164B30-E0F1-41F6-B66C-7E55D03FA556}"/>
               </a:ext>
             </a:extLst>
           </p:cNvPr>
@@ -20672,7 +20672,7 @@
           <p:cNvPr id="2" name="Oval 1">
             <a:extLst>
               <a:ext uri="{FF2B5EF4-FFF2-40B4-BE49-F238E27FC236}">
-                <a16:creationId xmlns="" xmlns:a16="http://schemas.microsoft.com/office/drawing/2014/main" id="{A3BFB9D4-7788-4A37-B915-DF1EA439DF95}"/>
+                <a16:creationId xmlns:a16="http://schemas.microsoft.com/office/drawing/2014/main" xmlns="" id="{A3BFB9D4-7788-4A37-B915-DF1EA439DF95}"/>
               </a:ext>
             </a:extLst>
           </p:cNvPr>
@@ -20745,7 +20745,7 @@
           <p:cNvPr id="17" name="Straight Arrow Connector 16">
             <a:extLst>
               <a:ext uri="{FF2B5EF4-FFF2-40B4-BE49-F238E27FC236}">
-                <a16:creationId xmlns="" xmlns:a16="http://schemas.microsoft.com/office/drawing/2014/main" id="{46D8D1F3-5D7F-4504-BAAD-4BFB04A4299B}"/>
+                <a16:creationId xmlns:a16="http://schemas.microsoft.com/office/drawing/2014/main" xmlns="" id="{46D8D1F3-5D7F-4504-BAAD-4BFB04A4299B}"/>
               </a:ext>
             </a:extLst>
           </p:cNvPr>
@@ -20788,7 +20788,7 @@
               <p:cNvPr id="20" name="TextBox 19">
                 <a:extLst>
                   <a:ext uri="{FF2B5EF4-FFF2-40B4-BE49-F238E27FC236}">
-                    <a16:creationId xmlns="" xmlns:a16="http://schemas.microsoft.com/office/drawing/2014/main" id="{50B70D3C-975B-46F9-86CA-7EEB0E890F00}"/>
+                    <a16:creationId xmlns:a16="http://schemas.microsoft.com/office/drawing/2014/main" xmlns="" id="{50B70D3C-975B-46F9-86CA-7EEB0E890F00}"/>
                   </a:ext>
                 </a:extLst>
               </p:cNvPr>
@@ -20896,7 +20896,7 @@
           <p:cNvPr id="23" name="TextBox 22">
             <a:extLst>
               <a:ext uri="{FF2B5EF4-FFF2-40B4-BE49-F238E27FC236}">
-                <a16:creationId xmlns="" xmlns:a16="http://schemas.microsoft.com/office/drawing/2014/main" id="{83A8AC32-9E34-4434-BE90-6378C4CE0E26}"/>
+                <a16:creationId xmlns:a16="http://schemas.microsoft.com/office/drawing/2014/main" xmlns="" id="{83A8AC32-9E34-4434-BE90-6378C4CE0E26}"/>
               </a:ext>
             </a:extLst>
           </p:cNvPr>
@@ -20932,7 +20932,7 @@
           <p:cNvPr id="26" name="Прямоугольник 35">
             <a:extLst>
               <a:ext uri="{FF2B5EF4-FFF2-40B4-BE49-F238E27FC236}">
-                <a16:creationId xmlns="" xmlns:a16="http://schemas.microsoft.com/office/drawing/2014/main" id="{0C8A6B3A-7715-4609-A673-75F62AFBBFDC}"/>
+                <a16:creationId xmlns:a16="http://schemas.microsoft.com/office/drawing/2014/main" xmlns="" id="{0C8A6B3A-7715-4609-A673-75F62AFBBFDC}"/>
               </a:ext>
             </a:extLst>
           </p:cNvPr>
@@ -20984,7 +20984,7 @@
           <p:cNvPr id="28" name="TextBox 27">
             <a:extLst>
               <a:ext uri="{FF2B5EF4-FFF2-40B4-BE49-F238E27FC236}">
-                <a16:creationId xmlns="" xmlns:a16="http://schemas.microsoft.com/office/drawing/2014/main" id="{DFD9C5E0-4152-41A1-8AE1-325993AC6747}"/>
+                <a16:creationId xmlns:a16="http://schemas.microsoft.com/office/drawing/2014/main" xmlns="" id="{DFD9C5E0-4152-41A1-8AE1-325993AC6747}"/>
               </a:ext>
             </a:extLst>
           </p:cNvPr>
@@ -21019,7 +21019,7 @@
           <p:cNvPr id="30" name="Straight Connector 29">
             <a:extLst>
               <a:ext uri="{FF2B5EF4-FFF2-40B4-BE49-F238E27FC236}">
-                <a16:creationId xmlns="" xmlns:a16="http://schemas.microsoft.com/office/drawing/2014/main" id="{AC68085A-D9EB-4F31-8740-AFDFDEB3AAB8}"/>
+                <a16:creationId xmlns:a16="http://schemas.microsoft.com/office/drawing/2014/main" xmlns="" id="{AC68085A-D9EB-4F31-8740-AFDFDEB3AAB8}"/>
               </a:ext>
             </a:extLst>
           </p:cNvPr>
@@ -21055,7 +21055,7 @@
           <p:cNvPr id="31" name="Straight Connector 30">
             <a:extLst>
               <a:ext uri="{FF2B5EF4-FFF2-40B4-BE49-F238E27FC236}">
-                <a16:creationId xmlns="" xmlns:a16="http://schemas.microsoft.com/office/drawing/2014/main" id="{B2DF124A-E427-48B9-B1AC-38138D550478}"/>
+                <a16:creationId xmlns:a16="http://schemas.microsoft.com/office/drawing/2014/main" xmlns="" id="{B2DF124A-E427-48B9-B1AC-38138D550478}"/>
               </a:ext>
             </a:extLst>
           </p:cNvPr>
@@ -21091,7 +21091,7 @@
           <p:cNvPr id="33" name="Straight Connector 32">
             <a:extLst>
               <a:ext uri="{FF2B5EF4-FFF2-40B4-BE49-F238E27FC236}">
-                <a16:creationId xmlns="" xmlns:a16="http://schemas.microsoft.com/office/drawing/2014/main" id="{ADFBBF5B-448D-4994-8AF2-8E50FDE19A27}"/>
+                <a16:creationId xmlns:a16="http://schemas.microsoft.com/office/drawing/2014/main" xmlns="" id="{ADFBBF5B-448D-4994-8AF2-8E50FDE19A27}"/>
               </a:ext>
             </a:extLst>
           </p:cNvPr>
@@ -21133,7 +21133,7 @@
           <p:cNvPr id="37" name="TextBox 36">
             <a:extLst>
               <a:ext uri="{FF2B5EF4-FFF2-40B4-BE49-F238E27FC236}">
-                <a16:creationId xmlns="" xmlns:a16="http://schemas.microsoft.com/office/drawing/2014/main" id="{B484A18C-DF07-4EE4-87D2-96A31543A3E7}"/>
+                <a16:creationId xmlns:a16="http://schemas.microsoft.com/office/drawing/2014/main" xmlns="" id="{B484A18C-DF07-4EE4-87D2-96A31543A3E7}"/>
               </a:ext>
             </a:extLst>
           </p:cNvPr>
@@ -21168,7 +21168,7 @@
           <p:cNvPr id="38" name="TextBox 37">
             <a:extLst>
               <a:ext uri="{FF2B5EF4-FFF2-40B4-BE49-F238E27FC236}">
-                <a16:creationId xmlns="" xmlns:a16="http://schemas.microsoft.com/office/drawing/2014/main" id="{5259F8B1-68B6-4C28-A616-06A70A1FD918}"/>
+                <a16:creationId xmlns:a16="http://schemas.microsoft.com/office/drawing/2014/main" xmlns="" id="{5259F8B1-68B6-4C28-A616-06A70A1FD918}"/>
               </a:ext>
             </a:extLst>
           </p:cNvPr>
@@ -21213,7 +21213,7 @@
           <p:cNvPr id="39" name="TextBox 38">
             <a:extLst>
               <a:ext uri="{FF2B5EF4-FFF2-40B4-BE49-F238E27FC236}">
-                <a16:creationId xmlns="" xmlns:a16="http://schemas.microsoft.com/office/drawing/2014/main" id="{6B196240-8C86-436B-83AE-8B74132A342A}"/>
+                <a16:creationId xmlns:a16="http://schemas.microsoft.com/office/drawing/2014/main" xmlns="" id="{6B196240-8C86-436B-83AE-8B74132A342A}"/>
               </a:ext>
             </a:extLst>
           </p:cNvPr>
@@ -21249,7 +21249,7 @@
           <p:cNvPr id="40" name="TextBox 39">
             <a:extLst>
               <a:ext uri="{FF2B5EF4-FFF2-40B4-BE49-F238E27FC236}">
-                <a16:creationId xmlns="" xmlns:a16="http://schemas.microsoft.com/office/drawing/2014/main" id="{3C8582A5-331A-426F-9770-76B2EF03915D}"/>
+                <a16:creationId xmlns:a16="http://schemas.microsoft.com/office/drawing/2014/main" xmlns="" id="{3C8582A5-331A-426F-9770-76B2EF03915D}"/>
               </a:ext>
             </a:extLst>
           </p:cNvPr>
@@ -21285,7 +21285,7 @@
           <p:cNvPr id="41" name="TextBox 40">
             <a:extLst>
               <a:ext uri="{FF2B5EF4-FFF2-40B4-BE49-F238E27FC236}">
-                <a16:creationId xmlns="" xmlns:a16="http://schemas.microsoft.com/office/drawing/2014/main" id="{BFB3E55D-982F-45C5-B69C-F5893D0CF2E4}"/>
+                <a16:creationId xmlns:a16="http://schemas.microsoft.com/office/drawing/2014/main" xmlns="" id="{BFB3E55D-982F-45C5-B69C-F5893D0CF2E4}"/>
               </a:ext>
             </a:extLst>
           </p:cNvPr>
@@ -21353,7 +21353,7 @@
               <p:cNvPr id="3" name="Content Placeholder 2">
                 <a:extLst>
                   <a:ext uri="{FF2B5EF4-FFF2-40B4-BE49-F238E27FC236}">
-                    <a16:creationId xmlns="" xmlns:a16="http://schemas.microsoft.com/office/drawing/2014/main" id="{7EC4056C-1203-4528-9D6E-F436630CE5E9}"/>
+                    <a16:creationId xmlns:a16="http://schemas.microsoft.com/office/drawing/2014/main" xmlns="" id="{7EC4056C-1203-4528-9D6E-F436630CE5E9}"/>
                   </a:ext>
                 </a:extLst>
               </p:cNvPr>
@@ -22111,7 +22111,7 @@
           <p:cNvPr id="5" name="Title 1">
             <a:extLst>
               <a:ext uri="{FF2B5EF4-FFF2-40B4-BE49-F238E27FC236}">
-                <a16:creationId xmlns="" xmlns:a16="http://schemas.microsoft.com/office/drawing/2014/main" id="{561960BF-0922-44FB-A6A4-A68413B7237E}"/>
+                <a16:creationId xmlns:a16="http://schemas.microsoft.com/office/drawing/2014/main" xmlns="" id="{561960BF-0922-44FB-A6A4-A68413B7237E}"/>
               </a:ext>
             </a:extLst>
           </p:cNvPr>
@@ -22228,7 +22228,7 @@
           <p:cNvPr id="19" name="Прямоугольник 33">
             <a:extLst>
               <a:ext uri="{FF2B5EF4-FFF2-40B4-BE49-F238E27FC236}">
-                <a16:creationId xmlns="" xmlns:a16="http://schemas.microsoft.com/office/drawing/2014/main" id="{B4855709-7F6B-4C0F-983E-67F5AFEAF1CC}"/>
+                <a16:creationId xmlns:a16="http://schemas.microsoft.com/office/drawing/2014/main" xmlns="" id="{B4855709-7F6B-4C0F-983E-67F5AFEAF1CC}"/>
               </a:ext>
             </a:extLst>
           </p:cNvPr>
@@ -22272,7 +22272,7 @@
           <p:cNvPr id="20" name="Прямоугольник 33">
             <a:extLst>
               <a:ext uri="{FF2B5EF4-FFF2-40B4-BE49-F238E27FC236}">
-                <a16:creationId xmlns="" xmlns:a16="http://schemas.microsoft.com/office/drawing/2014/main" id="{3E521014-1ED6-4CAF-BD15-D0B16D6A1B97}"/>
+                <a16:creationId xmlns:a16="http://schemas.microsoft.com/office/drawing/2014/main" xmlns="" id="{3E521014-1ED6-4CAF-BD15-D0B16D6A1B97}"/>
               </a:ext>
             </a:extLst>
           </p:cNvPr>
@@ -22316,7 +22316,7 @@
           <p:cNvPr id="22" name="Прямоугольник 33">
             <a:extLst>
               <a:ext uri="{FF2B5EF4-FFF2-40B4-BE49-F238E27FC236}">
-                <a16:creationId xmlns="" xmlns:a16="http://schemas.microsoft.com/office/drawing/2014/main" id="{69F5715A-A337-4DF6-BC87-6A176F67457B}"/>
+                <a16:creationId xmlns:a16="http://schemas.microsoft.com/office/drawing/2014/main" xmlns="" id="{69F5715A-A337-4DF6-BC87-6A176F67457B}"/>
               </a:ext>
             </a:extLst>
           </p:cNvPr>
@@ -22360,7 +22360,7 @@
           <p:cNvPr id="23" name="Прямоугольник 33">
             <a:extLst>
               <a:ext uri="{FF2B5EF4-FFF2-40B4-BE49-F238E27FC236}">
-                <a16:creationId xmlns="" xmlns:a16="http://schemas.microsoft.com/office/drawing/2014/main" id="{05132DA4-144D-4E99-8DE0-7456158E007E}"/>
+                <a16:creationId xmlns:a16="http://schemas.microsoft.com/office/drawing/2014/main" xmlns="" id="{05132DA4-144D-4E99-8DE0-7456158E007E}"/>
               </a:ext>
             </a:extLst>
           </p:cNvPr>
@@ -22404,7 +22404,7 @@
           <p:cNvPr id="24" name="Прямоугольник 33">
             <a:extLst>
               <a:ext uri="{FF2B5EF4-FFF2-40B4-BE49-F238E27FC236}">
-                <a16:creationId xmlns="" xmlns:a16="http://schemas.microsoft.com/office/drawing/2014/main" id="{7BC7DAAD-A197-4744-A85F-229F534C1EC8}"/>
+                <a16:creationId xmlns:a16="http://schemas.microsoft.com/office/drawing/2014/main" xmlns="" id="{7BC7DAAD-A197-4744-A85F-229F534C1EC8}"/>
               </a:ext>
             </a:extLst>
           </p:cNvPr>
@@ -22448,7 +22448,7 @@
           <p:cNvPr id="25" name="Прямоугольник 33">
             <a:extLst>
               <a:ext uri="{FF2B5EF4-FFF2-40B4-BE49-F238E27FC236}">
-                <a16:creationId xmlns="" xmlns:a16="http://schemas.microsoft.com/office/drawing/2014/main" id="{90F0D2BB-41B9-4689-97EF-D3882B83B605}"/>
+                <a16:creationId xmlns:a16="http://schemas.microsoft.com/office/drawing/2014/main" xmlns="" id="{90F0D2BB-41B9-4689-97EF-D3882B83B605}"/>
               </a:ext>
             </a:extLst>
           </p:cNvPr>
@@ -22492,7 +22492,7 @@
           <p:cNvPr id="26" name="Прямоугольник 33">
             <a:extLst>
               <a:ext uri="{FF2B5EF4-FFF2-40B4-BE49-F238E27FC236}">
-                <a16:creationId xmlns="" xmlns:a16="http://schemas.microsoft.com/office/drawing/2014/main" id="{44CF1340-45DF-42F5-A14A-A97F2D1C3F19}"/>
+                <a16:creationId xmlns:a16="http://schemas.microsoft.com/office/drawing/2014/main" xmlns="" id="{44CF1340-45DF-42F5-A14A-A97F2D1C3F19}"/>
               </a:ext>
             </a:extLst>
           </p:cNvPr>
@@ -22536,7 +22536,7 @@
           <p:cNvPr id="27" name="TextBox 26">
             <a:extLst>
               <a:ext uri="{FF2B5EF4-FFF2-40B4-BE49-F238E27FC236}">
-                <a16:creationId xmlns="" xmlns:a16="http://schemas.microsoft.com/office/drawing/2014/main" id="{C0EA4577-E902-4658-BA2B-6968927A9389}"/>
+                <a16:creationId xmlns:a16="http://schemas.microsoft.com/office/drawing/2014/main" xmlns="" id="{C0EA4577-E902-4658-BA2B-6968927A9389}"/>
               </a:ext>
             </a:extLst>
           </p:cNvPr>
@@ -22572,7 +22572,7 @@
           <p:cNvPr id="29" name="Straight Connector 28">
             <a:extLst>
               <a:ext uri="{FF2B5EF4-FFF2-40B4-BE49-F238E27FC236}">
-                <a16:creationId xmlns="" xmlns:a16="http://schemas.microsoft.com/office/drawing/2014/main" id="{C0E80C1B-06AA-49BE-8F45-06D0BA650A3F}"/>
+                <a16:creationId xmlns:a16="http://schemas.microsoft.com/office/drawing/2014/main" xmlns="" id="{C0E80C1B-06AA-49BE-8F45-06D0BA650A3F}"/>
               </a:ext>
             </a:extLst>
           </p:cNvPr>
@@ -22610,7 +22610,7 @@
           <p:cNvPr id="30" name="Straight Connector 29">
             <a:extLst>
               <a:ext uri="{FF2B5EF4-FFF2-40B4-BE49-F238E27FC236}">
-                <a16:creationId xmlns="" xmlns:a16="http://schemas.microsoft.com/office/drawing/2014/main" id="{28E78FBF-B129-43DA-B434-938DA44FFE82}"/>
+                <a16:creationId xmlns:a16="http://schemas.microsoft.com/office/drawing/2014/main" xmlns="" id="{28E78FBF-B129-43DA-B434-938DA44FFE82}"/>
               </a:ext>
             </a:extLst>
           </p:cNvPr>
@@ -22648,7 +22648,7 @@
           <p:cNvPr id="32" name="Straight Connector 31">
             <a:extLst>
               <a:ext uri="{FF2B5EF4-FFF2-40B4-BE49-F238E27FC236}">
-                <a16:creationId xmlns="" xmlns:a16="http://schemas.microsoft.com/office/drawing/2014/main" id="{31C0DF77-7D7F-4007-847A-CA0456925C27}"/>
+                <a16:creationId xmlns:a16="http://schemas.microsoft.com/office/drawing/2014/main" xmlns="" id="{31C0DF77-7D7F-4007-847A-CA0456925C27}"/>
               </a:ext>
             </a:extLst>
           </p:cNvPr>
@@ -22690,7 +22690,7 @@
           <p:cNvPr id="33" name="TextBox 32">
             <a:extLst>
               <a:ext uri="{FF2B5EF4-FFF2-40B4-BE49-F238E27FC236}">
-                <a16:creationId xmlns="" xmlns:a16="http://schemas.microsoft.com/office/drawing/2014/main" id="{10BCB9AD-5E08-4FA3-93BE-A55B71BE9CE2}"/>
+                <a16:creationId xmlns:a16="http://schemas.microsoft.com/office/drawing/2014/main" xmlns="" id="{10BCB9AD-5E08-4FA3-93BE-A55B71BE9CE2}"/>
               </a:ext>
             </a:extLst>
           </p:cNvPr>
@@ -22725,7 +22725,7 @@
           <p:cNvPr id="36" name="TextBox 35">
             <a:extLst>
               <a:ext uri="{FF2B5EF4-FFF2-40B4-BE49-F238E27FC236}">
-                <a16:creationId xmlns="" xmlns:a16="http://schemas.microsoft.com/office/drawing/2014/main" id="{DEC81789-FCD6-4940-98AF-519B04C6CF98}"/>
+                <a16:creationId xmlns:a16="http://schemas.microsoft.com/office/drawing/2014/main" xmlns="" id="{DEC81789-FCD6-4940-98AF-519B04C6CF98}"/>
               </a:ext>
             </a:extLst>
           </p:cNvPr>
@@ -22760,7 +22760,7 @@
           <p:cNvPr id="38" name="TextBox 37">
             <a:extLst>
               <a:ext uri="{FF2B5EF4-FFF2-40B4-BE49-F238E27FC236}">
-                <a16:creationId xmlns="" xmlns:a16="http://schemas.microsoft.com/office/drawing/2014/main" id="{E89EEB9F-3091-4332-ADE5-E5E5B97078C7}"/>
+                <a16:creationId xmlns:a16="http://schemas.microsoft.com/office/drawing/2014/main" xmlns="" id="{E89EEB9F-3091-4332-ADE5-E5E5B97078C7}"/>
               </a:ext>
             </a:extLst>
           </p:cNvPr>
@@ -22795,7 +22795,7 @@
           <p:cNvPr id="39" name="TextBox 38">
             <a:extLst>
               <a:ext uri="{FF2B5EF4-FFF2-40B4-BE49-F238E27FC236}">
-                <a16:creationId xmlns="" xmlns:a16="http://schemas.microsoft.com/office/drawing/2014/main" id="{CC38EC3D-ACA8-48E1-8952-29397D31A629}"/>
+                <a16:creationId xmlns:a16="http://schemas.microsoft.com/office/drawing/2014/main" xmlns="" id="{CC38EC3D-ACA8-48E1-8952-29397D31A629}"/>
               </a:ext>
             </a:extLst>
           </p:cNvPr>
@@ -22848,7 +22848,7 @@
           <p:cNvPr id="41" name="Straight Arrow Connector 40">
             <a:extLst>
               <a:ext uri="{FF2B5EF4-FFF2-40B4-BE49-F238E27FC236}">
-                <a16:creationId xmlns="" xmlns:a16="http://schemas.microsoft.com/office/drawing/2014/main" id="{83F916DC-E0DE-46BE-836B-9413945D7963}"/>
+                <a16:creationId xmlns:a16="http://schemas.microsoft.com/office/drawing/2014/main" xmlns="" id="{83F916DC-E0DE-46BE-836B-9413945D7963}"/>
               </a:ext>
             </a:extLst>
           </p:cNvPr>
@@ -22889,7 +22889,7 @@
           <p:cNvPr id="42" name="Прямоугольник 33">
             <a:extLst>
               <a:ext uri="{FF2B5EF4-FFF2-40B4-BE49-F238E27FC236}">
-                <a16:creationId xmlns="" xmlns:a16="http://schemas.microsoft.com/office/drawing/2014/main" id="{CC5260BF-0DAB-4DFB-BA88-D2E52D4A91C1}"/>
+                <a16:creationId xmlns:a16="http://schemas.microsoft.com/office/drawing/2014/main" xmlns="" id="{CC5260BF-0DAB-4DFB-BA88-D2E52D4A91C1}"/>
               </a:ext>
             </a:extLst>
           </p:cNvPr>
@@ -22941,7 +22941,7 @@
           <p:cNvPr id="45" name="Straight Arrow Connector 44">
             <a:extLst>
               <a:ext uri="{FF2B5EF4-FFF2-40B4-BE49-F238E27FC236}">
-                <a16:creationId xmlns="" xmlns:a16="http://schemas.microsoft.com/office/drawing/2014/main" id="{6E2DE6A8-AC93-4620-8EC4-7F3D587891CC}"/>
+                <a16:creationId xmlns:a16="http://schemas.microsoft.com/office/drawing/2014/main" xmlns="" id="{6E2DE6A8-AC93-4620-8EC4-7F3D587891CC}"/>
               </a:ext>
             </a:extLst>
           </p:cNvPr>
@@ -22980,7 +22980,7 @@
           <p:cNvPr id="46" name="Прямоугольник 33">
             <a:extLst>
               <a:ext uri="{FF2B5EF4-FFF2-40B4-BE49-F238E27FC236}">
-                <a16:creationId xmlns="" xmlns:a16="http://schemas.microsoft.com/office/drawing/2014/main" id="{05C92E9F-DF52-4ED7-9E25-92C70145E0E7}"/>
+                <a16:creationId xmlns:a16="http://schemas.microsoft.com/office/drawing/2014/main" xmlns="" id="{05C92E9F-DF52-4ED7-9E25-92C70145E0E7}"/>
               </a:ext>
             </a:extLst>
           </p:cNvPr>
@@ -23032,7 +23032,7 @@
           <p:cNvPr id="49" name="TextBox 48">
             <a:extLst>
               <a:ext uri="{FF2B5EF4-FFF2-40B4-BE49-F238E27FC236}">
-                <a16:creationId xmlns="" xmlns:a16="http://schemas.microsoft.com/office/drawing/2014/main" id="{1FA9D8A8-0D49-4141-A7BD-4E77C85EEE4C}"/>
+                <a16:creationId xmlns:a16="http://schemas.microsoft.com/office/drawing/2014/main" xmlns="" id="{1FA9D8A8-0D49-4141-A7BD-4E77C85EEE4C}"/>
               </a:ext>
             </a:extLst>
           </p:cNvPr>
@@ -23084,7 +23084,7 @@
           <p:cNvPr id="50" name="TextBox 49">
             <a:extLst>
               <a:ext uri="{FF2B5EF4-FFF2-40B4-BE49-F238E27FC236}">
-                <a16:creationId xmlns="" xmlns:a16="http://schemas.microsoft.com/office/drawing/2014/main" id="{3EEC7D17-3D62-4439-A09E-A8BEA5343523}"/>
+                <a16:creationId xmlns:a16="http://schemas.microsoft.com/office/drawing/2014/main" xmlns="" id="{3EEC7D17-3D62-4439-A09E-A8BEA5343523}"/>
               </a:ext>
             </a:extLst>
           </p:cNvPr>
@@ -23150,7 +23150,7 @@
           <p:cNvPr id="3" name="Content Placeholder 2">
             <a:extLst>
               <a:ext uri="{FF2B5EF4-FFF2-40B4-BE49-F238E27FC236}">
-                <a16:creationId xmlns="" xmlns:a16="http://schemas.microsoft.com/office/drawing/2014/main" id="{FAC609DF-7BF5-461E-B80C-BB01BBF2514D}"/>
+                <a16:creationId xmlns:a16="http://schemas.microsoft.com/office/drawing/2014/main" xmlns="" id="{FAC609DF-7BF5-461E-B80C-BB01BBF2514D}"/>
               </a:ext>
             </a:extLst>
           </p:cNvPr>
@@ -23230,7 +23230,7 @@
           <p:cNvPr id="4" name="Title 1">
             <a:extLst>
               <a:ext uri="{FF2B5EF4-FFF2-40B4-BE49-F238E27FC236}">
-                <a16:creationId xmlns="" xmlns:a16="http://schemas.microsoft.com/office/drawing/2014/main" id="{64D935B4-3EB5-4509-A437-256F909540A9}"/>
+                <a16:creationId xmlns:a16="http://schemas.microsoft.com/office/drawing/2014/main" xmlns="" id="{64D935B4-3EB5-4509-A437-256F909540A9}"/>
               </a:ext>
             </a:extLst>
           </p:cNvPr>
@@ -23347,7 +23347,7 @@
           <p:cNvPr id="5" name="Picture 4">
             <a:extLst>
               <a:ext uri="{FF2B5EF4-FFF2-40B4-BE49-F238E27FC236}">
-                <a16:creationId xmlns="" xmlns:a16="http://schemas.microsoft.com/office/drawing/2014/main" id="{EAEE0A21-4DA3-4186-B1CE-5B587FB9A103}"/>
+                <a16:creationId xmlns:a16="http://schemas.microsoft.com/office/drawing/2014/main" xmlns="" id="{EAEE0A21-4DA3-4186-B1CE-5B587FB9A103}"/>
               </a:ext>
             </a:extLst>
           </p:cNvPr>
@@ -23377,7 +23377,7 @@
           <p:cNvPr id="6" name="Picture 5">
             <a:extLst>
               <a:ext uri="{FF2B5EF4-FFF2-40B4-BE49-F238E27FC236}">
-                <a16:creationId xmlns="" xmlns:a16="http://schemas.microsoft.com/office/drawing/2014/main" id="{D8EFC1C0-49F1-437B-9FDE-A2D27F5EA830}"/>
+                <a16:creationId xmlns:a16="http://schemas.microsoft.com/office/drawing/2014/main" xmlns="" id="{D8EFC1C0-49F1-437B-9FDE-A2D27F5EA830}"/>
               </a:ext>
             </a:extLst>
           </p:cNvPr>
@@ -23409,7 +23409,7 @@
               <p:cNvPr id="7" name="TextBox 6">
                 <a:extLst>
                   <a:ext uri="{FF2B5EF4-FFF2-40B4-BE49-F238E27FC236}">
-                    <a16:creationId xmlns="" xmlns:a16="http://schemas.microsoft.com/office/drawing/2014/main" id="{D3D749A8-FA36-4046-B47E-69B97D4205E7}"/>
+                    <a16:creationId xmlns:a16="http://schemas.microsoft.com/office/drawing/2014/main" xmlns="" id="{D3D749A8-FA36-4046-B47E-69B97D4205E7}"/>
                   </a:ext>
                 </a:extLst>
               </p:cNvPr>
@@ -23699,7 +23699,7 @@
           <p:cNvPr id="8" name="TextBox 7">
             <a:extLst>
               <a:ext uri="{FF2B5EF4-FFF2-40B4-BE49-F238E27FC236}">
-                <a16:creationId xmlns="" xmlns:a16="http://schemas.microsoft.com/office/drawing/2014/main" id="{1ADEE9B8-4E75-4F11-89BB-792BCB2439F9}"/>
+                <a16:creationId xmlns:a16="http://schemas.microsoft.com/office/drawing/2014/main" xmlns="" id="{1ADEE9B8-4E75-4F11-89BB-792BCB2439F9}"/>
               </a:ext>
             </a:extLst>
           </p:cNvPr>
@@ -23800,7 +23800,7 @@
           <p:cNvPr id="4" name="Title 1">
             <a:extLst>
               <a:ext uri="{FF2B5EF4-FFF2-40B4-BE49-F238E27FC236}">
-                <a16:creationId xmlns="" xmlns:a16="http://schemas.microsoft.com/office/drawing/2014/main" id="{4CA55238-3C9D-4C38-A104-D409C9FA14AF}"/>
+                <a16:creationId xmlns:a16="http://schemas.microsoft.com/office/drawing/2014/main" xmlns="" id="{4CA55238-3C9D-4C38-A104-D409C9FA14AF}"/>
               </a:ext>
             </a:extLst>
           </p:cNvPr>
@@ -24524,8 +24524,8 @@
           </p:sp>
         </mc:Fallback>
       </mc:AlternateContent>
-      <mc:AlternateContent xmlns:mc="http://schemas.openxmlformats.org/markup-compatibility/2006">
-        <mc:Choice xmlns:a14="http://schemas.microsoft.com/office/drawing/2010/main" Requires="a14">
+      <mc:AlternateContent xmlns:mc="http://schemas.openxmlformats.org/markup-compatibility/2006" xmlns:a14="http://schemas.microsoft.com/office/drawing/2010/main">
+        <mc:Choice Requires="a14">
           <p:sp>
             <p:nvSpPr>
               <p:cNvPr id="7" name="Объект 2"/>
@@ -26075,18 +26075,13 @@
               <a:p>
                 <a:r>
                   <a:rPr lang="ru-RU" dirty="0" smtClean="0"/>
-                  <a:t>Настоящее аксиоматическое определение гораздо </a:t>
-                </a:r>
-                <a:r>
-                  <a:rPr lang="ru-RU" dirty="0" smtClean="0"/>
-                  <a:t>сложнее. См., например, учебник В.П. Чистякова «Курс теории вероятностей»</a:t>
-                </a:r>
-                <a:endParaRPr lang="ru-RU" dirty="0" smtClean="0"/>
+                  <a:t>Настоящее аксиоматическое определение гораздо сложнее. См., например, учебник В.П. Чистякова «Курс теории вероятностей»</a:t>
+                </a:r>
               </a:p>
             </p:txBody>
           </p:sp>
         </mc:Choice>
-        <mc:Fallback>
+        <mc:Fallback xmlns="">
           <p:sp>
             <p:nvSpPr>
               <p:cNvPr id="7" name="Объект 2"/>
@@ -26162,7 +26157,7 @@
               <p:cNvPr id="3" name="Content Placeholder 2">
                 <a:extLst>
                   <a:ext uri="{FF2B5EF4-FFF2-40B4-BE49-F238E27FC236}">
-                    <a16:creationId xmlns="" xmlns:a16="http://schemas.microsoft.com/office/drawing/2014/main" id="{B9782EDF-C8FD-4793-BCC6-1123C297EB58}"/>
+                    <a16:creationId xmlns:a16="http://schemas.microsoft.com/office/drawing/2014/main" xmlns="" id="{B9782EDF-C8FD-4793-BCC6-1123C297EB58}"/>
                   </a:ext>
                 </a:extLst>
               </p:cNvPr>
@@ -27035,7 +27030,7 @@
           <p:cNvPr id="4" name="Title 1">
             <a:extLst>
               <a:ext uri="{FF2B5EF4-FFF2-40B4-BE49-F238E27FC236}">
-                <a16:creationId xmlns="" xmlns:a16="http://schemas.microsoft.com/office/drawing/2014/main" id="{4CA55238-3C9D-4C38-A104-D409C9FA14AF}"/>
+                <a16:creationId xmlns:a16="http://schemas.microsoft.com/office/drawing/2014/main" xmlns="" id="{4CA55238-3C9D-4C38-A104-D409C9FA14AF}"/>
               </a:ext>
             </a:extLst>
           </p:cNvPr>
@@ -27334,7 +27329,7 @@
           <p:cNvPr id="4" name="Title 1">
             <a:extLst>
               <a:ext uri="{FF2B5EF4-FFF2-40B4-BE49-F238E27FC236}">
-                <a16:creationId xmlns="" xmlns:a16="http://schemas.microsoft.com/office/drawing/2014/main" id="{4CA55238-3C9D-4C38-A104-D409C9FA14AF}"/>
+                <a16:creationId xmlns:a16="http://schemas.microsoft.com/office/drawing/2014/main" xmlns="" id="{4CA55238-3C9D-4C38-A104-D409C9FA14AF}"/>
               </a:ext>
             </a:extLst>
           </p:cNvPr>
@@ -29498,7 +29493,7 @@
           <p:cNvPr id="4" name="Title 1">
             <a:extLst>
               <a:ext uri="{FF2B5EF4-FFF2-40B4-BE49-F238E27FC236}">
-                <a16:creationId xmlns="" xmlns:a16="http://schemas.microsoft.com/office/drawing/2014/main" id="{4CA55238-3C9D-4C38-A104-D409C9FA14AF}"/>
+                <a16:creationId xmlns:a16="http://schemas.microsoft.com/office/drawing/2014/main" xmlns="" id="{4CA55238-3C9D-4C38-A104-D409C9FA14AF}"/>
               </a:ext>
             </a:extLst>
           </p:cNvPr>

</xml_diff>